<commit_message>
Small commit to prepare next part of work
</commit_message>
<xml_diff>
--- a/Third Part - Physical Layer Device Authentication/Slides/PLA Bluetooth Environment.pptx
+++ b/Third Part - Physical Layer Device Authentication/Slides/PLA Bluetooth Environment.pptx
@@ -205,7 +205,7 @@
           <a:p>
             <a:fld id="{0E4AAC6D-2322-45B9-8ECA-34DF280B0776}" type="datetimeFigureOut">
               <a:rPr lang="en-US" smtClean="0"/>
-              <a:t>6/7/2024</a:t>
+              <a:t>6/13/2024</a:t>
             </a:fld>
             <a:endParaRPr lang="en-US"/>
           </a:p>
@@ -1758,7 +1758,12 @@
             <p:ph type="ctrTitle"/>
           </p:nvPr>
         </p:nvSpPr>
-        <p:spPr/>
+        <p:spPr>
+          <a:xfrm>
+            <a:off x="685800" y="274994"/>
+            <a:ext cx="7772400" cy="2387600"/>
+          </a:xfrm>
+        </p:spPr>
         <p:txBody>
           <a:bodyPr/>
           <a:lstStyle/>
@@ -1791,7 +1796,7 @@
         </p:nvSpPr>
         <p:spPr>
           <a:xfrm>
-            <a:off x="1043246" y="2541532"/>
+            <a:off x="1059873" y="2209023"/>
             <a:ext cx="6858000" cy="2099047"/>
           </a:xfrm>
         </p:spPr>
@@ -1828,6 +1833,21 @@
                 <a:cs typeface="Segoe UI" panose="020B0502040204020203" pitchFamily="34" charset="0"/>
               </a:rPr>
               <a:t>, 2024</a:t>
+            </a:r>
+          </a:p>
+          <a:p>
+            <a:endParaRPr lang="en-US" sz="1400" dirty="0">
+              <a:latin typeface="Segoe UI" panose="020B0502040204020203" pitchFamily="34" charset="0"/>
+              <a:cs typeface="Segoe UI" panose="020B0502040204020203" pitchFamily="34" charset="0"/>
+            </a:endParaRPr>
+          </a:p>
+          <a:p>
+            <a:r>
+              <a:rPr lang="en-US" sz="1800" dirty="0">
+                <a:latin typeface="Segoe UI" panose="020B0502040204020203" pitchFamily="34" charset="0"/>
+                <a:cs typeface="Segoe UI" panose="020B0502040204020203" pitchFamily="34" charset="0"/>
+              </a:rPr>
+              <a:t>Supervisor: Alessandro Lotto</a:t>
             </a:r>
           </a:p>
           <a:p>
@@ -2135,21 +2155,7 @@
                 <a:latin typeface="Segoe UI" panose="020B0502040204020203" pitchFamily="34" charset="0"/>
                 <a:cs typeface="Segoe UI" panose="020B0502040204020203" pitchFamily="34" charset="0"/>
               </a:rPr>
-              <a:t>Results and </a:t>
-            </a:r>
-            <a:r>
-              <a:rPr lang="it-IT" sz="2000" dirty="0" err="1">
-                <a:latin typeface="Segoe UI" panose="020B0502040204020203" pitchFamily="34" charset="0"/>
-                <a:cs typeface="Segoe UI" panose="020B0502040204020203" pitchFamily="34" charset="0"/>
-              </a:rPr>
-              <a:t>conclusions</a:t>
-            </a:r>
-            <a:r>
-              <a:rPr lang="it-IT" sz="2000" dirty="0">
-                <a:latin typeface="Segoe UI" panose="020B0502040204020203" pitchFamily="34" charset="0"/>
-                <a:cs typeface="Segoe UI" panose="020B0502040204020203" pitchFamily="34" charset="0"/>
-              </a:rPr>
-              <a:t> + future works</a:t>
+              <a:t>Results and conclusions + future works</a:t>
             </a:r>
           </a:p>
           <a:p>

</xml_diff>

<commit_message>
Inizial draft of slides + paper archival (minor fixes)
</commit_message>
<xml_diff>
--- a/Third Part - Physical Layer Device Authentication/Slides/PLA Bluetooth Environment.pptx
+++ b/Third Part - Physical Layer Device Authentication/Slides/PLA Bluetooth Environment.pptx
@@ -5,7 +5,7 @@
     <p:sldMasterId id="2147483660" r:id="rId1"/>
   </p:sldMasterIdLst>
   <p:notesMasterIdLst>
-    <p:notesMasterId r:id="rId11"/>
+    <p:notesMasterId r:id="rId14"/>
   </p:notesMasterIdLst>
   <p:sldIdLst>
     <p:sldId id="256" r:id="rId2"/>
@@ -14,9 +14,12 @@
     <p:sldId id="260" r:id="rId5"/>
     <p:sldId id="261" r:id="rId6"/>
     <p:sldId id="262" r:id="rId7"/>
-    <p:sldId id="263" r:id="rId8"/>
-    <p:sldId id="264" r:id="rId9"/>
-    <p:sldId id="265" r:id="rId10"/>
+    <p:sldId id="268" r:id="rId8"/>
+    <p:sldId id="263" r:id="rId9"/>
+    <p:sldId id="266" r:id="rId10"/>
+    <p:sldId id="264" r:id="rId11"/>
+    <p:sldId id="267" r:id="rId12"/>
+    <p:sldId id="265" r:id="rId13"/>
   </p:sldIdLst>
   <p:sldSz cx="9144000" cy="6858000" type="screen4x3"/>
   <p:notesSz cx="6858000" cy="9144000"/>
@@ -205,7 +208,7 @@
           <a:p>
             <a:fld id="{0E4AAC6D-2322-45B9-8ECA-34DF280B0776}" type="datetimeFigureOut">
               <a:rPr lang="en-US" smtClean="0"/>
-              <a:t>6/13/2024</a:t>
+              <a:t>6/14/2024</a:t>
             </a:fld>
             <a:endParaRPr lang="en-US"/>
           </a:p>
@@ -1889,6 +1892,1216 @@
 </p:sld>
 </file>
 
+<file path=ppt/slides/slide10.xml><?xml version="1.0" encoding="utf-8"?>
+<p:sld xmlns:a="http://schemas.openxmlformats.org/drawingml/2006/main" xmlns:r="http://schemas.openxmlformats.org/officeDocument/2006/relationships" xmlns:p="http://schemas.openxmlformats.org/presentationml/2006/main">
+  <p:cSld>
+    <p:spTree>
+      <p:nvGrpSpPr>
+        <p:cNvPr id="1" name=""/>
+        <p:cNvGrpSpPr/>
+        <p:nvPr/>
+      </p:nvGrpSpPr>
+      <p:grpSpPr>
+        <a:xfrm>
+          <a:off x="0" y="0"/>
+          <a:ext cx="0" cy="0"/>
+          <a:chOff x="0" y="0"/>
+          <a:chExt cx="0" cy="0"/>
+        </a:xfrm>
+      </p:grpSpPr>
+      <p:sp>
+        <p:nvSpPr>
+          <p:cNvPr id="2" name="Title 1">
+            <a:extLst>
+              <a:ext uri="{FF2B5EF4-FFF2-40B4-BE49-F238E27FC236}">
+                <a16:creationId xmlns:a16="http://schemas.microsoft.com/office/drawing/2014/main" id="{A20241D5-7C6B-45F6-9B01-BE455CD8AD0B}"/>
+              </a:ext>
+            </a:extLst>
+          </p:cNvPr>
+          <p:cNvSpPr>
+            <a:spLocks noGrp="1"/>
+          </p:cNvSpPr>
+          <p:nvPr>
+            <p:ph type="title"/>
+          </p:nvPr>
+        </p:nvSpPr>
+        <p:spPr>
+          <a:xfrm>
+            <a:off x="0" y="26902"/>
+            <a:ext cx="7061507" cy="1114425"/>
+          </a:xfrm>
+        </p:spPr>
+        <p:txBody>
+          <a:bodyPr>
+            <a:noAutofit/>
+          </a:bodyPr>
+          <a:lstStyle/>
+          <a:p>
+            <a:r>
+              <a:rPr lang="en-US" sz="3600" dirty="0">
+                <a:latin typeface="Segoe UI" panose="020B0502040204020203" pitchFamily="34" charset="0"/>
+                <a:cs typeface="Segoe UI" panose="020B0502040204020203" pitchFamily="34" charset="0"/>
+              </a:rPr>
+              <a:t>MD (Miss Detection) Study</a:t>
+            </a:r>
+          </a:p>
+        </p:txBody>
+      </p:sp>
+      <p:sp>
+        <p:nvSpPr>
+          <p:cNvPr id="4" name="Slide Number Placeholder 3">
+            <a:extLst>
+              <a:ext uri="{FF2B5EF4-FFF2-40B4-BE49-F238E27FC236}">
+                <a16:creationId xmlns:a16="http://schemas.microsoft.com/office/drawing/2014/main" id="{0FD64D78-A03B-45A9-9177-047825E632C0}"/>
+              </a:ext>
+            </a:extLst>
+          </p:cNvPr>
+          <p:cNvSpPr>
+            <a:spLocks noGrp="1"/>
+          </p:cNvSpPr>
+          <p:nvPr>
+            <p:ph type="sldNum" sz="quarter" idx="4"/>
+          </p:nvPr>
+        </p:nvSpPr>
+        <p:spPr>
+          <a:xfrm>
+            <a:off x="6143105" y="6365195"/>
+            <a:ext cx="2841321" cy="365125"/>
+          </a:xfrm>
+        </p:spPr>
+        <p:txBody>
+          <a:bodyPr/>
+          <a:lstStyle/>
+          <a:p>
+            <a:r>
+              <a:rPr lang="en-US" sz="1200" dirty="0">
+                <a:latin typeface="Segoe UI" panose="020B0502040204020203" pitchFamily="34" charset="0"/>
+                <a:cs typeface="Segoe UI" panose="020B0502040204020203" pitchFamily="34" charset="0"/>
+              </a:rPr>
+              <a:t>PLA Bluetooth Environment– 2/N</a:t>
+            </a:r>
+          </a:p>
+        </p:txBody>
+      </p:sp>
+      <p:sp>
+        <p:nvSpPr>
+          <p:cNvPr id="7" name="CasellaDiTesto 6">
+            <a:extLst>
+              <a:ext uri="{FF2B5EF4-FFF2-40B4-BE49-F238E27FC236}">
+                <a16:creationId xmlns:a16="http://schemas.microsoft.com/office/drawing/2014/main" id="{3D360244-5C2D-E0AE-5CC8-59298765925D}"/>
+              </a:ext>
+            </a:extLst>
+          </p:cNvPr>
+          <p:cNvSpPr txBox="1"/>
+          <p:nvPr/>
+        </p:nvSpPr>
+        <p:spPr>
+          <a:xfrm>
+            <a:off x="426307" y="1994746"/>
+            <a:ext cx="8291385" cy="3785652"/>
+          </a:xfrm>
+          <a:prstGeom prst="rect">
+            <a:avLst/>
+          </a:prstGeom>
+          <a:noFill/>
+        </p:spPr>
+        <p:txBody>
+          <a:bodyPr wrap="square">
+            <a:spAutoFit/>
+          </a:bodyPr>
+          <a:lstStyle/>
+          <a:p>
+            <a:r>
+              <a:rPr lang="it-IT" sz="2000" u="sng" dirty="0">
+                <a:latin typeface="Segoe UI" panose="020B0502040204020203" pitchFamily="34" charset="0"/>
+                <a:cs typeface="Segoe UI" panose="020B0502040204020203" pitchFamily="34" charset="0"/>
+              </a:rPr>
+              <a:t>Miss Detection</a:t>
+            </a:r>
+            <a:r>
+              <a:rPr lang="it-IT" sz="2000" dirty="0">
+                <a:latin typeface="Segoe UI" panose="020B0502040204020203" pitchFamily="34" charset="0"/>
+                <a:cs typeface="Segoe UI" panose="020B0502040204020203" pitchFamily="34" charset="0"/>
+              </a:rPr>
+              <a:t>: only </a:t>
+            </a:r>
+            <a:r>
+              <a:rPr lang="it-IT" sz="2000" i="1" dirty="0">
+                <a:latin typeface="Segoe UI" panose="020B0502040204020203" pitchFamily="34" charset="0"/>
+                <a:cs typeface="Segoe UI" panose="020B0502040204020203" pitchFamily="34" charset="0"/>
+              </a:rPr>
+              <a:t>non-</a:t>
+            </a:r>
+            <a:r>
+              <a:rPr lang="it-IT" sz="2000" i="1" dirty="0" err="1">
+                <a:latin typeface="Segoe UI" panose="020B0502040204020203" pitchFamily="34" charset="0"/>
+                <a:cs typeface="Segoe UI" panose="020B0502040204020203" pitchFamily="34" charset="0"/>
+              </a:rPr>
+              <a:t>authenticate</a:t>
+            </a:r>
+            <a:r>
+              <a:rPr lang="it-IT" sz="2000" dirty="0">
+                <a:latin typeface="Segoe UI" panose="020B0502040204020203" pitchFamily="34" charset="0"/>
+                <a:cs typeface="Segoe UI" panose="020B0502040204020203" pitchFamily="34" charset="0"/>
+              </a:rPr>
+              <a:t> </a:t>
+            </a:r>
+            <a:r>
+              <a:rPr lang="it-IT" sz="2000" dirty="0" err="1">
+                <a:latin typeface="Segoe UI" panose="020B0502040204020203" pitchFamily="34" charset="0"/>
+                <a:cs typeface="Segoe UI" panose="020B0502040204020203" pitchFamily="34" charset="0"/>
+              </a:rPr>
+              <a:t>messages</a:t>
+            </a:r>
+            <a:r>
+              <a:rPr lang="it-IT" sz="2000" dirty="0">
+                <a:latin typeface="Segoe UI" panose="020B0502040204020203" pitchFamily="34" charset="0"/>
+                <a:cs typeface="Segoe UI" panose="020B0502040204020203" pitchFamily="34" charset="0"/>
+              </a:rPr>
+              <a:t> are </a:t>
+            </a:r>
+            <a:r>
+              <a:rPr lang="it-IT" sz="2000" dirty="0" err="1">
+                <a:latin typeface="Segoe UI" panose="020B0502040204020203" pitchFamily="34" charset="0"/>
+                <a:cs typeface="Segoe UI" panose="020B0502040204020203" pitchFamily="34" charset="0"/>
+              </a:rPr>
+              <a:t>sent</a:t>
+            </a:r>
+            <a:r>
+              <a:rPr lang="it-IT" sz="2000" dirty="0">
+                <a:latin typeface="Segoe UI" panose="020B0502040204020203" pitchFamily="34" charset="0"/>
+                <a:cs typeface="Segoe UI" panose="020B0502040204020203" pitchFamily="34" charset="0"/>
+              </a:rPr>
+              <a:t> and check how many of those are </a:t>
+            </a:r>
+            <a:r>
+              <a:rPr lang="it-IT" sz="2000" dirty="0" err="1">
+                <a:latin typeface="Segoe UI" panose="020B0502040204020203" pitchFamily="34" charset="0"/>
+                <a:cs typeface="Segoe UI" panose="020B0502040204020203" pitchFamily="34" charset="0"/>
+              </a:rPr>
+              <a:t>interpreted</a:t>
+            </a:r>
+            <a:r>
+              <a:rPr lang="it-IT" sz="2000" dirty="0">
+                <a:latin typeface="Segoe UI" panose="020B0502040204020203" pitchFamily="34" charset="0"/>
+                <a:cs typeface="Segoe UI" panose="020B0502040204020203" pitchFamily="34" charset="0"/>
+              </a:rPr>
+              <a:t> as </a:t>
+            </a:r>
+            <a:r>
+              <a:rPr lang="it-IT" sz="2000" i="1" dirty="0" err="1">
+                <a:latin typeface="Segoe UI" panose="020B0502040204020203" pitchFamily="34" charset="0"/>
+                <a:cs typeface="Segoe UI" panose="020B0502040204020203" pitchFamily="34" charset="0"/>
+              </a:rPr>
+              <a:t>legitimate</a:t>
+            </a:r>
+            <a:r>
+              <a:rPr lang="it-IT" sz="2000" dirty="0">
+                <a:latin typeface="Segoe UI" panose="020B0502040204020203" pitchFamily="34" charset="0"/>
+                <a:cs typeface="Segoe UI" panose="020B0502040204020203" pitchFamily="34" charset="0"/>
+              </a:rPr>
+              <a:t> (false </a:t>
+            </a:r>
+            <a:r>
+              <a:rPr lang="it-IT" sz="2000" dirty="0" err="1">
+                <a:latin typeface="Segoe UI" panose="020B0502040204020203" pitchFamily="34" charset="0"/>
+                <a:cs typeface="Segoe UI" panose="020B0502040204020203" pitchFamily="34" charset="0"/>
+              </a:rPr>
+              <a:t>positives</a:t>
+            </a:r>
+            <a:r>
+              <a:rPr lang="it-IT" sz="2000" dirty="0">
+                <a:latin typeface="Segoe UI" panose="020B0502040204020203" pitchFamily="34" charset="0"/>
+                <a:cs typeface="Segoe UI" panose="020B0502040204020203" pitchFamily="34" charset="0"/>
+              </a:rPr>
+              <a:t>)</a:t>
+            </a:r>
+          </a:p>
+          <a:p>
+            <a:pPr marL="285750" indent="-285750">
+              <a:buFontTx/>
+              <a:buChar char="-"/>
+            </a:pPr>
+            <a:endParaRPr lang="it-IT" sz="2000" dirty="0">
+              <a:latin typeface="Segoe UI" panose="020B0502040204020203" pitchFamily="34" charset="0"/>
+              <a:cs typeface="Segoe UI" panose="020B0502040204020203" pitchFamily="34" charset="0"/>
+            </a:endParaRPr>
+          </a:p>
+          <a:p>
+            <a:r>
+              <a:rPr lang="it-IT" altLang="it-IT" sz="2000" u="sng" dirty="0">
+                <a:latin typeface="Segoe UI" panose="020B0502040204020203" pitchFamily="34" charset="0"/>
+                <a:cs typeface="Segoe UI" panose="020B0502040204020203" pitchFamily="34" charset="0"/>
+              </a:rPr>
+              <a:t>Parametrized</a:t>
+            </a:r>
+            <a:r>
+              <a:rPr lang="it-IT" altLang="it-IT" sz="2000" dirty="0">
+                <a:latin typeface="Segoe UI" panose="020B0502040204020203" pitchFamily="34" charset="0"/>
+                <a:cs typeface="Segoe UI" panose="020B0502040204020203" pitchFamily="34" charset="0"/>
+              </a:rPr>
+              <a:t> simulation to test the transmissions:</a:t>
+            </a:r>
+          </a:p>
+          <a:p>
+            <a:endParaRPr lang="it-IT" altLang="it-IT" sz="2000" dirty="0">
+              <a:latin typeface="Segoe UI" panose="020B0502040204020203" pitchFamily="34" charset="0"/>
+              <a:cs typeface="Segoe UI" panose="020B0502040204020203" pitchFamily="34" charset="0"/>
+            </a:endParaRPr>
+          </a:p>
+          <a:p>
+            <a:pPr marL="457200" indent="-457200">
+              <a:buFont typeface="+mj-lt"/>
+              <a:buAutoNum type="arabicPeriod"/>
+            </a:pPr>
+            <a:r>
+              <a:rPr lang="it-IT" altLang="it-IT" sz="2000" dirty="0" err="1">
+                <a:latin typeface="Segoe UI" panose="020B0502040204020203" pitchFamily="34" charset="0"/>
+                <a:cs typeface="Segoe UI" panose="020B0502040204020203" pitchFamily="34" charset="0"/>
+              </a:rPr>
+              <a:t>Varied</a:t>
+            </a:r>
+            <a:r>
+              <a:rPr lang="it-IT" altLang="it-IT" sz="2000" dirty="0">
+                <a:latin typeface="Segoe UI" panose="020B0502040204020203" pitchFamily="34" charset="0"/>
+                <a:cs typeface="Segoe UI" panose="020B0502040204020203" pitchFamily="34" charset="0"/>
+              </a:rPr>
+              <a:t> parameters as previous </a:t>
+            </a:r>
+            <a:r>
+              <a:rPr lang="it-IT" altLang="it-IT" sz="2000" dirty="0" err="1">
+                <a:latin typeface="Segoe UI" panose="020B0502040204020203" pitchFamily="34" charset="0"/>
+                <a:cs typeface="Segoe UI" panose="020B0502040204020203" pitchFamily="34" charset="0"/>
+              </a:rPr>
+              <a:t>configurations</a:t>
+            </a:r>
+            <a:r>
+              <a:rPr lang="it-IT" altLang="it-IT" sz="2000" dirty="0">
+                <a:latin typeface="Segoe UI" panose="020B0502040204020203" pitchFamily="34" charset="0"/>
+                <a:cs typeface="Segoe UI" panose="020B0502040204020203" pitchFamily="34" charset="0"/>
+              </a:rPr>
+              <a:t> </a:t>
+            </a:r>
+            <a:r>
+              <a:rPr lang="it-IT" altLang="it-IT" sz="2000" dirty="0" err="1">
+                <a:latin typeface="Segoe UI" panose="020B0502040204020203" pitchFamily="34" charset="0"/>
+                <a:cs typeface="Segoe UI" panose="020B0502040204020203" pitchFamily="34" charset="0"/>
+              </a:rPr>
+              <a:t>showed</a:t>
+            </a:r>
+            <a:endParaRPr lang="it-IT" altLang="it-IT" sz="2000" dirty="0">
+              <a:latin typeface="Segoe UI" panose="020B0502040204020203" pitchFamily="34" charset="0"/>
+              <a:cs typeface="Segoe UI" panose="020B0502040204020203" pitchFamily="34" charset="0"/>
+            </a:endParaRPr>
+          </a:p>
+          <a:p>
+            <a:pPr marL="457200" indent="-457200">
+              <a:buFont typeface="+mj-lt"/>
+              <a:buAutoNum type="arabicPeriod"/>
+            </a:pPr>
+            <a:endParaRPr lang="it-IT" altLang="it-IT" sz="2000" dirty="0">
+              <a:latin typeface="Segoe UI" panose="020B0502040204020203" pitchFamily="34" charset="0"/>
+              <a:cs typeface="Segoe UI" panose="020B0502040204020203" pitchFamily="34" charset="0"/>
+            </a:endParaRPr>
+          </a:p>
+          <a:p>
+            <a:pPr marL="457200" indent="-457200">
+              <a:buFont typeface="+mj-lt"/>
+              <a:buAutoNum type="arabicPeriod"/>
+            </a:pPr>
+            <a:r>
+              <a:rPr lang="it-IT" altLang="it-IT" sz="2000" dirty="0">
+                <a:latin typeface="Segoe UI" panose="020B0502040204020203" pitchFamily="34" charset="0"/>
+                <a:cs typeface="Segoe UI" panose="020B0502040204020203" pitchFamily="34" charset="0"/>
+              </a:rPr>
+              <a:t>Assumed </a:t>
+            </a:r>
+            <a:r>
+              <a:rPr lang="it-IT" altLang="it-IT" sz="2000" dirty="0" err="1">
+                <a:latin typeface="Segoe UI" panose="020B0502040204020203" pitchFamily="34" charset="0"/>
+                <a:cs typeface="Segoe UI" panose="020B0502040204020203" pitchFamily="34" charset="0"/>
+              </a:rPr>
+              <a:t>realistic</a:t>
+            </a:r>
+            <a:r>
+              <a:rPr lang="it-IT" altLang="it-IT" sz="2000" dirty="0">
+                <a:latin typeface="Segoe UI" panose="020B0502040204020203" pitchFamily="34" charset="0"/>
+                <a:cs typeface="Segoe UI" panose="020B0502040204020203" pitchFamily="34" charset="0"/>
+              </a:rPr>
+              <a:t> threat model: </a:t>
+            </a:r>
+            <a:r>
+              <a:rPr lang="it-IT" altLang="it-IT" sz="2000" dirty="0" err="1">
+                <a:latin typeface="Segoe UI" panose="020B0502040204020203" pitchFamily="34" charset="0"/>
+                <a:cs typeface="Segoe UI" panose="020B0502040204020203" pitchFamily="34" charset="0"/>
+              </a:rPr>
+              <a:t>attacker</a:t>
+            </a:r>
+            <a:r>
+              <a:rPr lang="it-IT" altLang="it-IT" sz="2000" dirty="0">
+                <a:latin typeface="Segoe UI" panose="020B0502040204020203" pitchFamily="34" charset="0"/>
+                <a:cs typeface="Segoe UI" panose="020B0502040204020203" pitchFamily="34" charset="0"/>
+              </a:rPr>
+              <a:t> </a:t>
+            </a:r>
+            <a:r>
+              <a:rPr lang="it-IT" altLang="it-IT" sz="2000" dirty="0" err="1">
+                <a:latin typeface="Segoe UI" panose="020B0502040204020203" pitchFamily="34" charset="0"/>
+                <a:cs typeface="Segoe UI" panose="020B0502040204020203" pitchFamily="34" charset="0"/>
+              </a:rPr>
+              <a:t>having</a:t>
+            </a:r>
+            <a:r>
+              <a:rPr lang="it-IT" altLang="it-IT" sz="2000" dirty="0">
+                <a:latin typeface="Segoe UI" panose="020B0502040204020203" pitchFamily="34" charset="0"/>
+                <a:cs typeface="Segoe UI" panose="020B0502040204020203" pitchFamily="34" charset="0"/>
+              </a:rPr>
+              <a:t> knowledge of channel </a:t>
+            </a:r>
+            <a:r>
+              <a:rPr lang="it-IT" altLang="it-IT" sz="2000" dirty="0" err="1">
+                <a:latin typeface="Segoe UI" panose="020B0502040204020203" pitchFamily="34" charset="0"/>
+                <a:cs typeface="Segoe UI" panose="020B0502040204020203" pitchFamily="34" charset="0"/>
+              </a:rPr>
+              <a:t>parameteres</a:t>
+            </a:r>
+            <a:r>
+              <a:rPr lang="it-IT" altLang="it-IT" sz="2000" dirty="0">
+                <a:latin typeface="Segoe UI" panose="020B0502040204020203" pitchFamily="34" charset="0"/>
+                <a:cs typeface="Segoe UI" panose="020B0502040204020203" pitchFamily="34" charset="0"/>
+              </a:rPr>
+              <a:t> and structure (MITM scenario)</a:t>
+            </a:r>
+          </a:p>
+          <a:p>
+            <a:pPr marL="457200" indent="-457200">
+              <a:buFont typeface="+mj-lt"/>
+              <a:buAutoNum type="arabicPeriod"/>
+            </a:pPr>
+            <a:endParaRPr lang="it-IT" altLang="it-IT" sz="2000" dirty="0">
+              <a:latin typeface="Segoe UI" panose="020B0502040204020203" pitchFamily="34" charset="0"/>
+              <a:cs typeface="Segoe UI" panose="020B0502040204020203" pitchFamily="34" charset="0"/>
+            </a:endParaRPr>
+          </a:p>
+          <a:p>
+            <a:pPr marL="457200" indent="-457200">
+              <a:buFont typeface="+mj-lt"/>
+              <a:buAutoNum type="arabicPeriod"/>
+            </a:pPr>
+            <a:r>
+              <a:rPr lang="it-IT" altLang="it-IT" sz="2000" dirty="0" err="1">
+                <a:latin typeface="Segoe UI" panose="020B0502040204020203" pitchFamily="34" charset="0"/>
+                <a:cs typeface="Segoe UI" panose="020B0502040204020203" pitchFamily="34" charset="0"/>
+              </a:rPr>
+              <a:t>Attacker</a:t>
+            </a:r>
+            <a:r>
+              <a:rPr lang="it-IT" altLang="it-IT" sz="2000" dirty="0">
+                <a:latin typeface="Segoe UI" panose="020B0502040204020203" pitchFamily="34" charset="0"/>
+                <a:cs typeface="Segoe UI" panose="020B0502040204020203" pitchFamily="34" charset="0"/>
+              </a:rPr>
+              <a:t> </a:t>
+            </a:r>
+            <a:r>
+              <a:rPr lang="it-IT" altLang="it-IT" sz="2000" dirty="0" err="1">
+                <a:latin typeface="Segoe UI" panose="020B0502040204020203" pitchFamily="34" charset="0"/>
+                <a:cs typeface="Segoe UI" panose="020B0502040204020203" pitchFamily="34" charset="0"/>
+              </a:rPr>
+              <a:t>trying</a:t>
+            </a:r>
+            <a:r>
+              <a:rPr lang="it-IT" altLang="it-IT" sz="2000" dirty="0">
+                <a:latin typeface="Segoe UI" panose="020B0502040204020203" pitchFamily="34" charset="0"/>
+                <a:cs typeface="Segoe UI" panose="020B0502040204020203" pitchFamily="34" charset="0"/>
+              </a:rPr>
+              <a:t> to decode signal based on </a:t>
+            </a:r>
+            <a:r>
+              <a:rPr lang="it-IT" altLang="it-IT" sz="2000" dirty="0" err="1">
+                <a:latin typeface="Segoe UI" panose="020B0502040204020203" pitchFamily="34" charset="0"/>
+                <a:cs typeface="Segoe UI" panose="020B0502040204020203" pitchFamily="34" charset="0"/>
+              </a:rPr>
+              <a:t>peaks</a:t>
+            </a:r>
+            <a:r>
+              <a:rPr lang="it-IT" altLang="it-IT" sz="2000" dirty="0">
+                <a:latin typeface="Segoe UI" panose="020B0502040204020203" pitchFamily="34" charset="0"/>
+                <a:cs typeface="Segoe UI" panose="020B0502040204020203" pitchFamily="34" charset="0"/>
+              </a:rPr>
+              <a:t> </a:t>
+            </a:r>
+            <a:r>
+              <a:rPr lang="it-IT" altLang="it-IT" sz="2000" dirty="0" err="1">
+                <a:latin typeface="Segoe UI" panose="020B0502040204020203" pitchFamily="34" charset="0"/>
+                <a:cs typeface="Segoe UI" panose="020B0502040204020203" pitchFamily="34" charset="0"/>
+              </a:rPr>
+              <a:t>similarly</a:t>
+            </a:r>
+            <a:r>
+              <a:rPr lang="it-IT" altLang="it-IT" sz="2000" dirty="0">
+                <a:latin typeface="Segoe UI" panose="020B0502040204020203" pitchFamily="34" charset="0"/>
+                <a:cs typeface="Segoe UI" panose="020B0502040204020203" pitchFamily="34" charset="0"/>
+              </a:rPr>
+              <a:t> to </a:t>
+            </a:r>
+            <a:r>
+              <a:rPr lang="it-IT" altLang="it-IT" sz="2000" dirty="0" err="1">
+                <a:latin typeface="Segoe UI" panose="020B0502040204020203" pitchFamily="34" charset="0"/>
+                <a:cs typeface="Segoe UI" panose="020B0502040204020203" pitchFamily="34" charset="0"/>
+              </a:rPr>
+              <a:t>legitimate</a:t>
+            </a:r>
+            <a:r>
+              <a:rPr lang="it-IT" altLang="it-IT" sz="2000" dirty="0">
+                <a:latin typeface="Segoe UI" panose="020B0502040204020203" pitchFamily="34" charset="0"/>
+                <a:cs typeface="Segoe UI" panose="020B0502040204020203" pitchFamily="34" charset="0"/>
+              </a:rPr>
+              <a:t> receiver</a:t>
+            </a:r>
+          </a:p>
+        </p:txBody>
+      </p:sp>
+    </p:spTree>
+    <p:extLst>
+      <p:ext uri="{BB962C8B-B14F-4D97-AF65-F5344CB8AC3E}">
+        <p14:creationId xmlns:p14="http://schemas.microsoft.com/office/powerpoint/2010/main" val="1263005583"/>
+      </p:ext>
+    </p:extLst>
+  </p:cSld>
+  <p:clrMapOvr>
+    <a:masterClrMapping/>
+  </p:clrMapOvr>
+</p:sld>
+</file>
+
+<file path=ppt/slides/slide11.xml><?xml version="1.0" encoding="utf-8"?>
+<p:sld xmlns:a="http://schemas.openxmlformats.org/drawingml/2006/main" xmlns:r="http://schemas.openxmlformats.org/officeDocument/2006/relationships" xmlns:p="http://schemas.openxmlformats.org/presentationml/2006/main">
+  <p:cSld>
+    <p:spTree>
+      <p:nvGrpSpPr>
+        <p:cNvPr id="1" name=""/>
+        <p:cNvGrpSpPr/>
+        <p:nvPr/>
+      </p:nvGrpSpPr>
+      <p:grpSpPr>
+        <a:xfrm>
+          <a:off x="0" y="0"/>
+          <a:ext cx="0" cy="0"/>
+          <a:chOff x="0" y="0"/>
+          <a:chExt cx="0" cy="0"/>
+        </a:xfrm>
+      </p:grpSpPr>
+      <p:sp>
+        <p:nvSpPr>
+          <p:cNvPr id="2" name="Title 1">
+            <a:extLst>
+              <a:ext uri="{FF2B5EF4-FFF2-40B4-BE49-F238E27FC236}">
+                <a16:creationId xmlns:a16="http://schemas.microsoft.com/office/drawing/2014/main" id="{A20241D5-7C6B-45F6-9B01-BE455CD8AD0B}"/>
+              </a:ext>
+            </a:extLst>
+          </p:cNvPr>
+          <p:cNvSpPr>
+            <a:spLocks noGrp="1"/>
+          </p:cNvSpPr>
+          <p:nvPr>
+            <p:ph type="title"/>
+          </p:nvPr>
+        </p:nvSpPr>
+        <p:spPr>
+          <a:xfrm>
+            <a:off x="0" y="26902"/>
+            <a:ext cx="7061507" cy="1114425"/>
+          </a:xfrm>
+        </p:spPr>
+        <p:txBody>
+          <a:bodyPr>
+            <a:noAutofit/>
+          </a:bodyPr>
+          <a:lstStyle/>
+          <a:p>
+            <a:r>
+              <a:rPr lang="en-US" sz="3200" dirty="0">
+                <a:latin typeface="Segoe UI" panose="020B0502040204020203" pitchFamily="34" charset="0"/>
+                <a:cs typeface="Segoe UI" panose="020B0502040204020203" pitchFamily="34" charset="0"/>
+              </a:rPr>
+              <a:t>MD (Miss Detection) Study - Results</a:t>
+            </a:r>
+          </a:p>
+        </p:txBody>
+      </p:sp>
+      <p:sp>
+        <p:nvSpPr>
+          <p:cNvPr id="4" name="Slide Number Placeholder 3">
+            <a:extLst>
+              <a:ext uri="{FF2B5EF4-FFF2-40B4-BE49-F238E27FC236}">
+                <a16:creationId xmlns:a16="http://schemas.microsoft.com/office/drawing/2014/main" id="{0FD64D78-A03B-45A9-9177-047825E632C0}"/>
+              </a:ext>
+            </a:extLst>
+          </p:cNvPr>
+          <p:cNvSpPr>
+            <a:spLocks noGrp="1"/>
+          </p:cNvSpPr>
+          <p:nvPr>
+            <p:ph type="sldNum" sz="quarter" idx="4"/>
+          </p:nvPr>
+        </p:nvSpPr>
+        <p:spPr>
+          <a:xfrm>
+            <a:off x="6143105" y="6365195"/>
+            <a:ext cx="2841321" cy="365125"/>
+          </a:xfrm>
+        </p:spPr>
+        <p:txBody>
+          <a:bodyPr/>
+          <a:lstStyle/>
+          <a:p>
+            <a:r>
+              <a:rPr lang="en-US" sz="1200" dirty="0">
+                <a:latin typeface="Segoe UI" panose="020B0502040204020203" pitchFamily="34" charset="0"/>
+                <a:cs typeface="Segoe UI" panose="020B0502040204020203" pitchFamily="34" charset="0"/>
+              </a:rPr>
+              <a:t>PLA Bluetooth Environment– 2/N</a:t>
+            </a:r>
+          </a:p>
+        </p:txBody>
+      </p:sp>
+      <p:sp>
+        <p:nvSpPr>
+          <p:cNvPr id="3" name="CasellaDiTesto 2">
+            <a:extLst>
+              <a:ext uri="{FF2B5EF4-FFF2-40B4-BE49-F238E27FC236}">
+                <a16:creationId xmlns:a16="http://schemas.microsoft.com/office/drawing/2014/main" id="{F4F05D58-B23C-429D-2F53-355F728B29DF}"/>
+              </a:ext>
+            </a:extLst>
+          </p:cNvPr>
+          <p:cNvSpPr txBox="1"/>
+          <p:nvPr/>
+        </p:nvSpPr>
+        <p:spPr>
+          <a:xfrm>
+            <a:off x="400050" y="2168211"/>
+            <a:ext cx="8343900" cy="3170099"/>
+          </a:xfrm>
+          <a:prstGeom prst="rect">
+            <a:avLst/>
+          </a:prstGeom>
+          <a:noFill/>
+        </p:spPr>
+        <p:txBody>
+          <a:bodyPr wrap="square" rtlCol="0">
+            <a:spAutoFit/>
+          </a:bodyPr>
+          <a:lstStyle/>
+          <a:p>
+            <a:r>
+              <a:rPr lang="it-IT" altLang="it-IT" sz="2000" dirty="0">
+                <a:latin typeface="Segoe UI" panose="020B0502040204020203" pitchFamily="34" charset="0"/>
+                <a:cs typeface="Segoe UI" panose="020B0502040204020203" pitchFamily="34" charset="0"/>
+              </a:rPr>
+              <a:t>This simulation </a:t>
+            </a:r>
+            <a:r>
+              <a:rPr lang="it-IT" altLang="it-IT" sz="2000" dirty="0" err="1">
+                <a:latin typeface="Segoe UI" panose="020B0502040204020203" pitchFamily="34" charset="0"/>
+                <a:cs typeface="Segoe UI" panose="020B0502040204020203" pitchFamily="34" charset="0"/>
+              </a:rPr>
+              <a:t>reported</a:t>
+            </a:r>
+            <a:r>
+              <a:rPr lang="it-IT" altLang="it-IT" sz="2000" dirty="0">
+                <a:latin typeface="Segoe UI" panose="020B0502040204020203" pitchFamily="34" charset="0"/>
+                <a:cs typeface="Segoe UI" panose="020B0502040204020203" pitchFamily="34" charset="0"/>
+              </a:rPr>
+              <a:t> the following results:</a:t>
+            </a:r>
+          </a:p>
+          <a:p>
+            <a:endParaRPr lang="it-IT" altLang="it-IT" sz="2000" dirty="0">
+              <a:latin typeface="Segoe UI" panose="020B0502040204020203" pitchFamily="34" charset="0"/>
+              <a:cs typeface="Segoe UI" panose="020B0502040204020203" pitchFamily="34" charset="0"/>
+            </a:endParaRPr>
+          </a:p>
+          <a:p>
+            <a:pPr marL="342900" indent="-342900">
+              <a:buFont typeface="Arial" panose="020B0604020202020204" pitchFamily="34" charset="0"/>
+              <a:buChar char="•"/>
+            </a:pPr>
+            <a:r>
+              <a:rPr lang="it-IT" altLang="it-IT" sz="2000" dirty="0">
+                <a:latin typeface="Segoe UI" panose="020B0502040204020203" pitchFamily="34" charset="0"/>
+                <a:cs typeface="Segoe UI" panose="020B0502040204020203" pitchFamily="34" charset="0"/>
+              </a:rPr>
+              <a:t>Miss detection rates </a:t>
+            </a:r>
+            <a:r>
+              <a:rPr lang="it-IT" altLang="it-IT" sz="2000" dirty="0" err="1">
+                <a:latin typeface="Segoe UI" panose="020B0502040204020203" pitchFamily="34" charset="0"/>
+                <a:cs typeface="Segoe UI" panose="020B0502040204020203" pitchFamily="34" charset="0"/>
+              </a:rPr>
+              <a:t>varies</a:t>
+            </a:r>
+            <a:r>
+              <a:rPr lang="it-IT" altLang="it-IT" sz="2000" dirty="0">
+                <a:latin typeface="Segoe UI" panose="020B0502040204020203" pitchFamily="34" charset="0"/>
+                <a:cs typeface="Segoe UI" panose="020B0502040204020203" pitchFamily="34" charset="0"/>
+              </a:rPr>
+              <a:t> between 20% and 35% </a:t>
+            </a:r>
+            <a:r>
+              <a:rPr lang="it-IT" altLang="it-IT" sz="2000" dirty="0" err="1">
+                <a:latin typeface="Segoe UI" panose="020B0502040204020203" pitchFamily="34" charset="0"/>
+                <a:cs typeface="Segoe UI" panose="020B0502040204020203" pitchFamily="34" charset="0"/>
+              </a:rPr>
+              <a:t>across</a:t>
+            </a:r>
+            <a:r>
+              <a:rPr lang="it-IT" altLang="it-IT" sz="2000" dirty="0">
+                <a:latin typeface="Segoe UI" panose="020B0502040204020203" pitchFamily="34" charset="0"/>
+                <a:cs typeface="Segoe UI" panose="020B0502040204020203" pitchFamily="34" charset="0"/>
+              </a:rPr>
+              <a:t> </a:t>
+            </a:r>
+            <a:r>
+              <a:rPr lang="it-IT" altLang="it-IT" sz="2000" dirty="0" err="1">
+                <a:latin typeface="Segoe UI" panose="020B0502040204020203" pitchFamily="34" charset="0"/>
+                <a:cs typeface="Segoe UI" panose="020B0502040204020203" pitchFamily="34" charset="0"/>
+              </a:rPr>
+              <a:t>simulations</a:t>
+            </a:r>
+            <a:endParaRPr lang="it-IT" altLang="it-IT" sz="2000" dirty="0">
+              <a:latin typeface="Segoe UI" panose="020B0502040204020203" pitchFamily="34" charset="0"/>
+              <a:cs typeface="Segoe UI" panose="020B0502040204020203" pitchFamily="34" charset="0"/>
+            </a:endParaRPr>
+          </a:p>
+          <a:p>
+            <a:pPr marL="342900" indent="-342900">
+              <a:buFont typeface="Arial" panose="020B0604020202020204" pitchFamily="34" charset="0"/>
+              <a:buChar char="•"/>
+            </a:pPr>
+            <a:endParaRPr lang="it-IT" altLang="it-IT" sz="2000" dirty="0">
+              <a:latin typeface="Segoe UI" panose="020B0502040204020203" pitchFamily="34" charset="0"/>
+              <a:cs typeface="Segoe UI" panose="020B0502040204020203" pitchFamily="34" charset="0"/>
+            </a:endParaRPr>
+          </a:p>
+          <a:p>
+            <a:pPr marL="342900" indent="-342900">
+              <a:buFont typeface="Arial" panose="020B0604020202020204" pitchFamily="34" charset="0"/>
+              <a:buChar char="•"/>
+            </a:pPr>
+            <a:r>
+              <a:rPr lang="en-US" altLang="it-IT" sz="2000" dirty="0">
+                <a:latin typeface="Segoe UI" panose="020B0502040204020203" pitchFamily="34" charset="0"/>
+                <a:cs typeface="Segoe UI" panose="020B0502040204020203" pitchFamily="34" charset="0"/>
+              </a:rPr>
+              <a:t>Attacker unable to reconstruct messages perfectly due to partial knowledge of transmission powers</a:t>
+            </a:r>
+          </a:p>
+          <a:p>
+            <a:pPr marL="342900" indent="-342900">
+              <a:buFont typeface="Arial" panose="020B0604020202020204" pitchFamily="34" charset="0"/>
+              <a:buChar char="•"/>
+            </a:pPr>
+            <a:endParaRPr lang="en-US" altLang="it-IT" sz="2000" dirty="0">
+              <a:latin typeface="Segoe UI" panose="020B0502040204020203" pitchFamily="34" charset="0"/>
+              <a:cs typeface="Segoe UI" panose="020B0502040204020203" pitchFamily="34" charset="0"/>
+            </a:endParaRPr>
+          </a:p>
+          <a:p>
+            <a:pPr marL="342900" indent="-342900">
+              <a:buFont typeface="Arial" panose="020B0604020202020204" pitchFamily="34" charset="0"/>
+              <a:buChar char="•"/>
+            </a:pPr>
+            <a:r>
+              <a:rPr lang="it-IT" altLang="it-IT" sz="2000" dirty="0">
+                <a:latin typeface="Segoe UI" panose="020B0502040204020203" pitchFamily="34" charset="0"/>
+                <a:cs typeface="Segoe UI" panose="020B0502040204020203" pitchFamily="34" charset="0"/>
+              </a:rPr>
+              <a:t>Results </a:t>
+            </a:r>
+            <a:r>
+              <a:rPr lang="it-IT" altLang="it-IT" sz="2000" dirty="0" err="1">
+                <a:latin typeface="Segoe UI" panose="020B0502040204020203" pitchFamily="34" charset="0"/>
+                <a:cs typeface="Segoe UI" panose="020B0502040204020203" pitchFamily="34" charset="0"/>
+              </a:rPr>
+              <a:t>confirm</a:t>
+            </a:r>
+            <a:r>
+              <a:rPr lang="it-IT" altLang="it-IT" sz="2000" dirty="0">
+                <a:latin typeface="Segoe UI" panose="020B0502040204020203" pitchFamily="34" charset="0"/>
+                <a:cs typeface="Segoe UI" panose="020B0502040204020203" pitchFamily="34" charset="0"/>
+              </a:rPr>
+              <a:t> the solidity of the decoding methods, </a:t>
+            </a:r>
+            <a:r>
+              <a:rPr lang="it-IT" altLang="it-IT" sz="2000" dirty="0" err="1">
+                <a:latin typeface="Segoe UI" panose="020B0502040204020203" pitchFamily="34" charset="0"/>
+                <a:cs typeface="Segoe UI" panose="020B0502040204020203" pitchFamily="34" charset="0"/>
+              </a:rPr>
+              <a:t>able</a:t>
+            </a:r>
+            <a:r>
+              <a:rPr lang="it-IT" altLang="it-IT" sz="2000" dirty="0">
+                <a:latin typeface="Segoe UI" panose="020B0502040204020203" pitchFamily="34" charset="0"/>
+                <a:cs typeface="Segoe UI" panose="020B0502040204020203" pitchFamily="34" charset="0"/>
+              </a:rPr>
+              <a:t> to </a:t>
+            </a:r>
+            <a:r>
+              <a:rPr lang="it-IT" altLang="it-IT" sz="2000" dirty="0" err="1">
+                <a:latin typeface="Segoe UI" panose="020B0502040204020203" pitchFamily="34" charset="0"/>
+                <a:cs typeface="Segoe UI" panose="020B0502040204020203" pitchFamily="34" charset="0"/>
+              </a:rPr>
+              <a:t>detect</a:t>
+            </a:r>
+            <a:r>
+              <a:rPr lang="it-IT" altLang="it-IT" sz="2000" dirty="0">
+                <a:latin typeface="Segoe UI" panose="020B0502040204020203" pitchFamily="34" charset="0"/>
+                <a:cs typeface="Segoe UI" panose="020B0502040204020203" pitchFamily="34" charset="0"/>
+              </a:rPr>
+              <a:t> good </a:t>
+            </a:r>
+            <a:r>
+              <a:rPr lang="it-IT" altLang="it-IT" sz="2000" dirty="0" err="1">
+                <a:latin typeface="Segoe UI" panose="020B0502040204020203" pitchFamily="34" charset="0"/>
+                <a:cs typeface="Segoe UI" panose="020B0502040204020203" pitchFamily="34" charset="0"/>
+              </a:rPr>
+              <a:t>portions</a:t>
+            </a:r>
+            <a:r>
+              <a:rPr lang="it-IT" altLang="it-IT" sz="2000" dirty="0">
+                <a:latin typeface="Segoe UI" panose="020B0502040204020203" pitchFamily="34" charset="0"/>
+                <a:cs typeface="Segoe UI" panose="020B0502040204020203" pitchFamily="34" charset="0"/>
+              </a:rPr>
+              <a:t> of </a:t>
+            </a:r>
+            <a:r>
+              <a:rPr lang="it-IT" altLang="it-IT" sz="2000" dirty="0" err="1">
+                <a:latin typeface="Segoe UI" panose="020B0502040204020203" pitchFamily="34" charset="0"/>
+                <a:cs typeface="Segoe UI" panose="020B0502040204020203" pitchFamily="34" charset="0"/>
+              </a:rPr>
+              <a:t>invalid</a:t>
+            </a:r>
+            <a:r>
+              <a:rPr lang="it-IT" altLang="it-IT" sz="2000" dirty="0">
+                <a:latin typeface="Segoe UI" panose="020B0502040204020203" pitchFamily="34" charset="0"/>
+                <a:cs typeface="Segoe UI" panose="020B0502040204020203" pitchFamily="34" charset="0"/>
+              </a:rPr>
+              <a:t> </a:t>
+            </a:r>
+            <a:r>
+              <a:rPr lang="it-IT" altLang="it-IT" sz="2000" dirty="0" err="1">
+                <a:latin typeface="Segoe UI" panose="020B0502040204020203" pitchFamily="34" charset="0"/>
+                <a:cs typeface="Segoe UI" panose="020B0502040204020203" pitchFamily="34" charset="0"/>
+              </a:rPr>
+              <a:t>messages</a:t>
+            </a:r>
+            <a:endParaRPr lang="it-IT" altLang="it-IT" sz="2000" dirty="0">
+              <a:latin typeface="Segoe UI" panose="020B0502040204020203" pitchFamily="34" charset="0"/>
+              <a:cs typeface="Segoe UI" panose="020B0502040204020203" pitchFamily="34" charset="0"/>
+            </a:endParaRPr>
+          </a:p>
+          <a:p>
+            <a:pPr marL="285750" indent="-285750">
+              <a:buFontTx/>
+              <a:buChar char="-"/>
+            </a:pPr>
+            <a:endParaRPr lang="it-IT" sz="2000" dirty="0">
+              <a:latin typeface="Segoe UI" panose="020B0502040204020203" pitchFamily="34" charset="0"/>
+              <a:cs typeface="Segoe UI" panose="020B0502040204020203" pitchFamily="34" charset="0"/>
+            </a:endParaRPr>
+          </a:p>
+        </p:txBody>
+      </p:sp>
+    </p:spTree>
+    <p:extLst>
+      <p:ext uri="{BB962C8B-B14F-4D97-AF65-F5344CB8AC3E}">
+        <p14:creationId xmlns:p14="http://schemas.microsoft.com/office/powerpoint/2010/main" val="3384419873"/>
+      </p:ext>
+    </p:extLst>
+  </p:cSld>
+  <p:clrMapOvr>
+    <a:masterClrMapping/>
+  </p:clrMapOvr>
+</p:sld>
+</file>
+
+<file path=ppt/slides/slide12.xml><?xml version="1.0" encoding="utf-8"?>
+<p:sld xmlns:a="http://schemas.openxmlformats.org/drawingml/2006/main" xmlns:r="http://schemas.openxmlformats.org/officeDocument/2006/relationships" xmlns:p="http://schemas.openxmlformats.org/presentationml/2006/main">
+  <p:cSld>
+    <p:spTree>
+      <p:nvGrpSpPr>
+        <p:cNvPr id="1" name=""/>
+        <p:cNvGrpSpPr/>
+        <p:nvPr/>
+      </p:nvGrpSpPr>
+      <p:grpSpPr>
+        <a:xfrm>
+          <a:off x="0" y="0"/>
+          <a:ext cx="0" cy="0"/>
+          <a:chOff x="0" y="0"/>
+          <a:chExt cx="0" cy="0"/>
+        </a:xfrm>
+      </p:grpSpPr>
+      <p:sp>
+        <p:nvSpPr>
+          <p:cNvPr id="2" name="Title 1">
+            <a:extLst>
+              <a:ext uri="{FF2B5EF4-FFF2-40B4-BE49-F238E27FC236}">
+                <a16:creationId xmlns:a16="http://schemas.microsoft.com/office/drawing/2014/main" id="{A20241D5-7C6B-45F6-9B01-BE455CD8AD0B}"/>
+              </a:ext>
+            </a:extLst>
+          </p:cNvPr>
+          <p:cNvSpPr>
+            <a:spLocks noGrp="1"/>
+          </p:cNvSpPr>
+          <p:nvPr>
+            <p:ph type="title"/>
+          </p:nvPr>
+        </p:nvSpPr>
+        <p:spPr>
+          <a:xfrm>
+            <a:off x="0" y="26902"/>
+            <a:ext cx="7061507" cy="1114425"/>
+          </a:xfrm>
+        </p:spPr>
+        <p:txBody>
+          <a:bodyPr>
+            <a:noAutofit/>
+          </a:bodyPr>
+          <a:lstStyle/>
+          <a:p>
+            <a:r>
+              <a:rPr lang="en-US" sz="3600" dirty="0">
+                <a:latin typeface="Segoe UI" panose="020B0502040204020203" pitchFamily="34" charset="0"/>
+                <a:cs typeface="Segoe UI" panose="020B0502040204020203" pitchFamily="34" charset="0"/>
+              </a:rPr>
+              <a:t>Conclusions &amp; Future Work</a:t>
+            </a:r>
+          </a:p>
+        </p:txBody>
+      </p:sp>
+      <p:sp>
+        <p:nvSpPr>
+          <p:cNvPr id="4" name="Slide Number Placeholder 3">
+            <a:extLst>
+              <a:ext uri="{FF2B5EF4-FFF2-40B4-BE49-F238E27FC236}">
+                <a16:creationId xmlns:a16="http://schemas.microsoft.com/office/drawing/2014/main" id="{0FD64D78-A03B-45A9-9177-047825E632C0}"/>
+              </a:ext>
+            </a:extLst>
+          </p:cNvPr>
+          <p:cNvSpPr>
+            <a:spLocks noGrp="1"/>
+          </p:cNvSpPr>
+          <p:nvPr>
+            <p:ph type="sldNum" sz="quarter" idx="4"/>
+          </p:nvPr>
+        </p:nvSpPr>
+        <p:spPr>
+          <a:xfrm>
+            <a:off x="6143105" y="6365195"/>
+            <a:ext cx="2841321" cy="365125"/>
+          </a:xfrm>
+        </p:spPr>
+        <p:txBody>
+          <a:bodyPr/>
+          <a:lstStyle/>
+          <a:p>
+            <a:r>
+              <a:rPr lang="en-US" sz="1200" dirty="0">
+                <a:latin typeface="Segoe UI" panose="020B0502040204020203" pitchFamily="34" charset="0"/>
+                <a:cs typeface="Segoe UI" panose="020B0502040204020203" pitchFamily="34" charset="0"/>
+              </a:rPr>
+              <a:t>PLA Bluetooth Environment– 2/N</a:t>
+            </a:r>
+          </a:p>
+        </p:txBody>
+      </p:sp>
+      <p:sp>
+        <p:nvSpPr>
+          <p:cNvPr id="3" name="CasellaDiTesto 2">
+            <a:extLst>
+              <a:ext uri="{FF2B5EF4-FFF2-40B4-BE49-F238E27FC236}">
+                <a16:creationId xmlns:a16="http://schemas.microsoft.com/office/drawing/2014/main" id="{1F0BF33E-A1F3-FAA9-8F63-B9085F902DAC}"/>
+              </a:ext>
+            </a:extLst>
+          </p:cNvPr>
+          <p:cNvSpPr txBox="1"/>
+          <p:nvPr/>
+        </p:nvSpPr>
+        <p:spPr>
+          <a:xfrm>
+            <a:off x="400050" y="1488589"/>
+            <a:ext cx="8343900" cy="4708981"/>
+          </a:xfrm>
+          <a:prstGeom prst="rect">
+            <a:avLst/>
+          </a:prstGeom>
+          <a:noFill/>
+        </p:spPr>
+        <p:txBody>
+          <a:bodyPr wrap="square" rtlCol="0">
+            <a:spAutoFit/>
+          </a:bodyPr>
+          <a:lstStyle/>
+          <a:p>
+            <a:r>
+              <a:rPr lang="it-IT" altLang="it-IT" sz="2000" u="sng" dirty="0">
+                <a:latin typeface="Segoe UI" panose="020B0502040204020203" pitchFamily="34" charset="0"/>
+                <a:cs typeface="Segoe UI" panose="020B0502040204020203" pitchFamily="34" charset="0"/>
+              </a:rPr>
+              <a:t>Final considerations</a:t>
+            </a:r>
+            <a:r>
+              <a:rPr lang="it-IT" altLang="it-IT" sz="2000" dirty="0">
+                <a:latin typeface="Segoe UI" panose="020B0502040204020203" pitchFamily="34" charset="0"/>
+                <a:cs typeface="Segoe UI" panose="020B0502040204020203" pitchFamily="34" charset="0"/>
+              </a:rPr>
+              <a:t>:</a:t>
+            </a:r>
+          </a:p>
+          <a:p>
+            <a:endParaRPr lang="it-IT" altLang="it-IT" sz="2000" dirty="0">
+              <a:latin typeface="Segoe UI" panose="020B0502040204020203" pitchFamily="34" charset="0"/>
+              <a:cs typeface="Segoe UI" panose="020B0502040204020203" pitchFamily="34" charset="0"/>
+            </a:endParaRPr>
+          </a:p>
+          <a:p>
+            <a:pPr marL="342900" indent="-342900">
+              <a:buFont typeface="Arial" panose="020B0604020202020204" pitchFamily="34" charset="0"/>
+              <a:buChar char="•"/>
+            </a:pPr>
+            <a:r>
+              <a:rPr lang="it-IT" altLang="it-IT" sz="2000" dirty="0">
+                <a:latin typeface="Segoe UI" panose="020B0502040204020203" pitchFamily="34" charset="0"/>
+                <a:cs typeface="Segoe UI" panose="020B0502040204020203" pitchFamily="34" charset="0"/>
+              </a:rPr>
+              <a:t>Parametrized simulation </a:t>
+            </a:r>
+            <a:r>
+              <a:rPr lang="it-IT" altLang="it-IT" sz="2000" dirty="0" err="1">
+                <a:latin typeface="Segoe UI" panose="020B0502040204020203" pitchFamily="34" charset="0"/>
+                <a:cs typeface="Segoe UI" panose="020B0502040204020203" pitchFamily="34" charset="0"/>
+              </a:rPr>
+              <a:t>demonstrates</a:t>
+            </a:r>
+            <a:r>
+              <a:rPr lang="it-IT" altLang="it-IT" sz="2000" dirty="0">
+                <a:latin typeface="Segoe UI" panose="020B0502040204020203" pitchFamily="34" charset="0"/>
+                <a:cs typeface="Segoe UI" panose="020B0502040204020203" pitchFamily="34" charset="0"/>
+              </a:rPr>
+              <a:t> promise for real PLA </a:t>
+            </a:r>
+            <a:r>
+              <a:rPr lang="it-IT" altLang="it-IT" sz="2000" dirty="0" err="1">
+                <a:latin typeface="Segoe UI" panose="020B0502040204020203" pitchFamily="34" charset="0"/>
+                <a:cs typeface="Segoe UI" panose="020B0502040204020203" pitchFamily="34" charset="0"/>
+              </a:rPr>
+              <a:t>schemes</a:t>
+            </a:r>
+            <a:endParaRPr lang="it-IT" altLang="it-IT" sz="2000" dirty="0">
+              <a:latin typeface="Segoe UI" panose="020B0502040204020203" pitchFamily="34" charset="0"/>
+              <a:cs typeface="Segoe UI" panose="020B0502040204020203" pitchFamily="34" charset="0"/>
+            </a:endParaRPr>
+          </a:p>
+          <a:p>
+            <a:pPr marL="342900" indent="-342900">
+              <a:buFont typeface="Arial" panose="020B0604020202020204" pitchFamily="34" charset="0"/>
+              <a:buChar char="•"/>
+            </a:pPr>
+            <a:endParaRPr lang="it-IT" altLang="it-IT" sz="2000" dirty="0">
+              <a:latin typeface="Segoe UI" panose="020B0502040204020203" pitchFamily="34" charset="0"/>
+              <a:cs typeface="Segoe UI" panose="020B0502040204020203" pitchFamily="34" charset="0"/>
+            </a:endParaRPr>
+          </a:p>
+          <a:p>
+            <a:pPr marL="342900" indent="-342900">
+              <a:buFont typeface="Arial" panose="020B0604020202020204" pitchFamily="34" charset="0"/>
+              <a:buChar char="•"/>
+            </a:pPr>
+            <a:r>
+              <a:rPr lang="en-US" altLang="it-IT" sz="2000" dirty="0">
+                <a:latin typeface="Segoe UI" panose="020B0502040204020203" pitchFamily="34" charset="0"/>
+                <a:cs typeface="Segoe UI" panose="020B0502040204020203" pitchFamily="34" charset="0"/>
+              </a:rPr>
+              <a:t>Tested decoding methods proved more effectiveness in variable-threshold decoding methods, minimizing false alarms</a:t>
+            </a:r>
+          </a:p>
+          <a:p>
+            <a:pPr marL="342900" indent="-342900">
+              <a:buFont typeface="Arial" panose="020B0604020202020204" pitchFamily="34" charset="0"/>
+              <a:buChar char="•"/>
+            </a:pPr>
+            <a:endParaRPr lang="en-US" altLang="it-IT" sz="2000" dirty="0">
+              <a:latin typeface="Segoe UI" panose="020B0502040204020203" pitchFamily="34" charset="0"/>
+              <a:cs typeface="Segoe UI" panose="020B0502040204020203" pitchFamily="34" charset="0"/>
+            </a:endParaRPr>
+          </a:p>
+          <a:p>
+            <a:pPr marL="342900" indent="-342900">
+              <a:buFont typeface="Arial" panose="020B0604020202020204" pitchFamily="34" charset="0"/>
+              <a:buChar char="•"/>
+            </a:pPr>
+            <a:r>
+              <a:rPr lang="it-IT" altLang="it-IT" sz="2000" dirty="0">
+                <a:latin typeface="Segoe UI" panose="020B0502040204020203" pitchFamily="34" charset="0"/>
+                <a:cs typeface="Segoe UI" panose="020B0502040204020203" pitchFamily="34" charset="0"/>
+              </a:rPr>
+              <a:t>Miss detection rates indicate room for </a:t>
+            </a:r>
+            <a:r>
+              <a:rPr lang="it-IT" altLang="it-IT" sz="2000" dirty="0" err="1">
+                <a:latin typeface="Segoe UI" panose="020B0502040204020203" pitchFamily="34" charset="0"/>
+                <a:cs typeface="Segoe UI" panose="020B0502040204020203" pitchFamily="34" charset="0"/>
+              </a:rPr>
+              <a:t>improvement</a:t>
+            </a:r>
+            <a:r>
+              <a:rPr lang="it-IT" altLang="it-IT" sz="2000" dirty="0">
+                <a:latin typeface="Segoe UI" panose="020B0502040204020203" pitchFamily="34" charset="0"/>
+                <a:cs typeface="Segoe UI" panose="020B0502040204020203" pitchFamily="34" charset="0"/>
+              </a:rPr>
+              <a:t>, further </a:t>
+            </a:r>
+            <a:r>
+              <a:rPr lang="it-IT" altLang="it-IT" sz="2000" dirty="0" err="1">
+                <a:latin typeface="Segoe UI" panose="020B0502040204020203" pitchFamily="34" charset="0"/>
+                <a:cs typeface="Segoe UI" panose="020B0502040204020203" pitchFamily="34" charset="0"/>
+              </a:rPr>
+              <a:t>refining</a:t>
+            </a:r>
+            <a:r>
+              <a:rPr lang="it-IT" altLang="it-IT" sz="2000" dirty="0">
+                <a:latin typeface="Segoe UI" panose="020B0502040204020203" pitchFamily="34" charset="0"/>
+                <a:cs typeface="Segoe UI" panose="020B0502040204020203" pitchFamily="34" charset="0"/>
+              </a:rPr>
+              <a:t> thresholds and decoding methods</a:t>
+            </a:r>
+          </a:p>
+          <a:p>
+            <a:pPr marL="285750" indent="-285750">
+              <a:buFontTx/>
+              <a:buChar char="-"/>
+            </a:pPr>
+            <a:endParaRPr lang="it-IT" sz="2000" dirty="0">
+              <a:latin typeface="Segoe UI" panose="020B0502040204020203" pitchFamily="34" charset="0"/>
+              <a:cs typeface="Segoe UI" panose="020B0502040204020203" pitchFamily="34" charset="0"/>
+            </a:endParaRPr>
+          </a:p>
+          <a:p>
+            <a:r>
+              <a:rPr lang="it-IT" sz="2000" u="sng" dirty="0">
+                <a:latin typeface="Segoe UI" panose="020B0502040204020203" pitchFamily="34" charset="0"/>
+                <a:cs typeface="Segoe UI" panose="020B0502040204020203" pitchFamily="34" charset="0"/>
+              </a:rPr>
+              <a:t>Future development</a:t>
+            </a:r>
+            <a:r>
+              <a:rPr lang="it-IT" sz="2000" dirty="0">
+                <a:latin typeface="Segoe UI" panose="020B0502040204020203" pitchFamily="34" charset="0"/>
+                <a:cs typeface="Segoe UI" panose="020B0502040204020203" pitchFamily="34" charset="0"/>
+              </a:rPr>
+              <a:t>:</a:t>
+            </a:r>
+          </a:p>
+          <a:p>
+            <a:endParaRPr lang="it-IT" sz="2000" dirty="0">
+              <a:latin typeface="Segoe UI" panose="020B0502040204020203" pitchFamily="34" charset="0"/>
+              <a:cs typeface="Segoe UI" panose="020B0502040204020203" pitchFamily="34" charset="0"/>
+            </a:endParaRPr>
+          </a:p>
+          <a:p>
+            <a:pPr marL="342900" indent="-342900">
+              <a:buFont typeface="Arial" panose="020B0604020202020204" pitchFamily="34" charset="0"/>
+              <a:buChar char="•"/>
+            </a:pPr>
+            <a:r>
+              <a:rPr lang="it-IT" sz="2000" i="1" dirty="0">
+                <a:latin typeface="Segoe UI" panose="020B0502040204020203" pitchFamily="34" charset="0"/>
+                <a:cs typeface="Segoe UI" panose="020B0502040204020203" pitchFamily="34" charset="0"/>
+              </a:rPr>
+              <a:t>Noise-based</a:t>
+            </a:r>
+            <a:r>
+              <a:rPr lang="it-IT" sz="2000" dirty="0">
+                <a:latin typeface="Segoe UI" panose="020B0502040204020203" pitchFamily="34" charset="0"/>
+                <a:cs typeface="Segoe UI" panose="020B0502040204020203" pitchFamily="34" charset="0"/>
+              </a:rPr>
+              <a:t> simulation (additive noise) to </a:t>
+            </a:r>
+            <a:r>
+              <a:rPr lang="it-IT" sz="2000" dirty="0" err="1">
+                <a:latin typeface="Segoe UI" panose="020B0502040204020203" pitchFamily="34" charset="0"/>
+                <a:cs typeface="Segoe UI" panose="020B0502040204020203" pitchFamily="34" charset="0"/>
+              </a:rPr>
+              <a:t>improve</a:t>
+            </a:r>
+            <a:r>
+              <a:rPr lang="it-IT" sz="2000" dirty="0">
+                <a:latin typeface="Segoe UI" panose="020B0502040204020203" pitchFamily="34" charset="0"/>
+                <a:cs typeface="Segoe UI" panose="020B0502040204020203" pitchFamily="34" charset="0"/>
+              </a:rPr>
+              <a:t> MD performance</a:t>
+            </a:r>
+          </a:p>
+          <a:p>
+            <a:pPr marL="342900" indent="-342900">
+              <a:buFont typeface="Arial" panose="020B0604020202020204" pitchFamily="34" charset="0"/>
+              <a:buChar char="•"/>
+            </a:pPr>
+            <a:endParaRPr lang="it-IT" sz="2000" dirty="0">
+              <a:latin typeface="Segoe UI" panose="020B0502040204020203" pitchFamily="34" charset="0"/>
+              <a:cs typeface="Segoe UI" panose="020B0502040204020203" pitchFamily="34" charset="0"/>
+            </a:endParaRPr>
+          </a:p>
+          <a:p>
+            <a:pPr marL="342900" indent="-342900">
+              <a:buFont typeface="Arial" panose="020B0604020202020204" pitchFamily="34" charset="0"/>
+              <a:buChar char="•"/>
+            </a:pPr>
+            <a:r>
+              <a:rPr lang="it-IT" sz="2000" i="1" dirty="0">
+                <a:latin typeface="Segoe UI" panose="020B0502040204020203" pitchFamily="34" charset="0"/>
+                <a:cs typeface="Segoe UI" panose="020B0502040204020203" pitchFamily="34" charset="0"/>
+              </a:rPr>
+              <a:t>Filtering systems </a:t>
+            </a:r>
+            <a:r>
+              <a:rPr lang="it-IT" sz="2000" dirty="0">
+                <a:latin typeface="Segoe UI" panose="020B0502040204020203" pitchFamily="34" charset="0"/>
+                <a:cs typeface="Segoe UI" panose="020B0502040204020203" pitchFamily="34" charset="0"/>
+              </a:rPr>
+              <a:t>and </a:t>
+            </a:r>
+            <a:r>
+              <a:rPr lang="it-IT" sz="2000" dirty="0" err="1">
+                <a:latin typeface="Segoe UI" panose="020B0502040204020203" pitchFamily="34" charset="0"/>
+                <a:cs typeface="Segoe UI" panose="020B0502040204020203" pitchFamily="34" charset="0"/>
+              </a:rPr>
+              <a:t>improved</a:t>
+            </a:r>
+            <a:r>
+              <a:rPr lang="it-IT" sz="2000" dirty="0">
+                <a:latin typeface="Segoe UI" panose="020B0502040204020203" pitchFamily="34" charset="0"/>
+                <a:cs typeface="Segoe UI" panose="020B0502040204020203" pitchFamily="34" charset="0"/>
+              </a:rPr>
+              <a:t> auth techniques </a:t>
+            </a:r>
+          </a:p>
+        </p:txBody>
+      </p:sp>
+    </p:spTree>
+    <p:extLst>
+      <p:ext uri="{BB962C8B-B14F-4D97-AF65-F5344CB8AC3E}">
+        <p14:creationId xmlns:p14="http://schemas.microsoft.com/office/powerpoint/2010/main" val="496337869"/>
+      </p:ext>
+    </p:extLst>
+  </p:cSld>
+  <p:clrMapOvr>
+    <a:masterClrMapping/>
+  </p:clrMapOvr>
+</p:sld>
+</file>
+
 <file path=ppt/slides/slide2.xml><?xml version="1.0" encoding="utf-8"?>
 <p:sld xmlns:a="http://schemas.openxmlformats.org/drawingml/2006/main" xmlns:r="http://schemas.openxmlformats.org/officeDocument/2006/relationships" xmlns:p="http://schemas.openxmlformats.org/presentationml/2006/main">
   <p:cSld>
@@ -2155,7 +3368,7 @@
                 <a:latin typeface="Segoe UI" panose="020B0502040204020203" pitchFamily="34" charset="0"/>
                 <a:cs typeface="Segoe UI" panose="020B0502040204020203" pitchFamily="34" charset="0"/>
               </a:rPr>
-              <a:t>Results and conclusions + future works</a:t>
+              <a:t>Conclusions + future works</a:t>
             </a:r>
           </a:p>
           <a:p>
@@ -2786,7 +3999,7 @@
         </p:nvSpPr>
         <p:spPr>
           <a:xfrm>
-            <a:off x="446809" y="1433945"/>
+            <a:off x="800100" y="3695231"/>
             <a:ext cx="8343900" cy="1200329"/>
           </a:xfrm>
           <a:prstGeom prst="rect">
@@ -2804,19 +4017,6 @@
               <a:buFontTx/>
               <a:buChar char="-"/>
             </a:pPr>
-            <a:r>
-              <a:rPr lang="it-IT" sz="2400" dirty="0">
-                <a:latin typeface="Segoe UI" panose="020B0502040204020203" pitchFamily="34" charset="0"/>
-                <a:cs typeface="Segoe UI" panose="020B0502040204020203" pitchFamily="34" charset="0"/>
-              </a:rPr>
-              <a:t>aaa</a:t>
-            </a:r>
-          </a:p>
-          <a:p>
-            <a:pPr marL="285750" indent="-285750">
-              <a:buFontTx/>
-              <a:buChar char="-"/>
-            </a:pPr>
             <a:endParaRPr lang="it-IT" sz="2400" dirty="0">
               <a:latin typeface="Segoe UI" panose="020B0502040204020203" pitchFamily="34" charset="0"/>
               <a:cs typeface="Segoe UI" panose="020B0502040204020203" pitchFamily="34" charset="0"/>
@@ -2831,6 +4031,494 @@
               <a:latin typeface="Segoe UI" panose="020B0502040204020203" pitchFamily="34" charset="0"/>
               <a:cs typeface="Segoe UI" panose="020B0502040204020203" pitchFamily="34" charset="0"/>
             </a:endParaRPr>
+          </a:p>
+          <a:p>
+            <a:pPr marL="285750" indent="-285750">
+              <a:buFontTx/>
+              <a:buChar char="-"/>
+            </a:pPr>
+            <a:endParaRPr lang="it-IT" sz="2400" dirty="0">
+              <a:latin typeface="Segoe UI" panose="020B0502040204020203" pitchFamily="34" charset="0"/>
+              <a:cs typeface="Segoe UI" panose="020B0502040204020203" pitchFamily="34" charset="0"/>
+            </a:endParaRPr>
+          </a:p>
+        </p:txBody>
+      </p:sp>
+      <p:sp>
+        <p:nvSpPr>
+          <p:cNvPr id="7" name="Rectangle 3">
+            <a:extLst>
+              <a:ext uri="{FF2B5EF4-FFF2-40B4-BE49-F238E27FC236}">
+                <a16:creationId xmlns:a16="http://schemas.microsoft.com/office/drawing/2014/main" id="{1EACD30B-677E-6840-098B-6CE29A3F488D}"/>
+              </a:ext>
+            </a:extLst>
+          </p:cNvPr>
+          <p:cNvSpPr>
+            <a:spLocks noChangeArrowheads="1"/>
+          </p:cNvSpPr>
+          <p:nvPr/>
+        </p:nvSpPr>
+        <p:spPr bwMode="auto">
+          <a:xfrm>
+            <a:off x="210065" y="1449103"/>
+            <a:ext cx="8774361" cy="4401205"/>
+          </a:xfrm>
+          <a:prstGeom prst="rect">
+            <a:avLst/>
+          </a:prstGeom>
+          <a:noFill/>
+          <a:ln>
+            <a:noFill/>
+          </a:ln>
+          <a:effectLst/>
+          <a:extLst>
+            <a:ext uri="{909E8E84-426E-40DD-AFC4-6F175D3DCCD1}">
+              <a14:hiddenFill xmlns:a14="http://schemas.microsoft.com/office/drawing/2010/main">
+                <a:solidFill>
+                  <a:schemeClr val="accent1"/>
+                </a:solidFill>
+              </a14:hiddenFill>
+            </a:ext>
+            <a:ext uri="{91240B29-F687-4F45-9708-019B960494DF}">
+              <a14:hiddenLine xmlns:a14="http://schemas.microsoft.com/office/drawing/2010/main" w="9525">
+                <a:solidFill>
+                  <a:schemeClr val="tx1"/>
+                </a:solidFill>
+                <a:miter lim="800000"/>
+                <a:headEnd/>
+                <a:tailEnd/>
+              </a14:hiddenLine>
+            </a:ext>
+            <a:ext uri="{AF507438-7753-43E0-B8FC-AC1667EBCBE1}">
+              <a14:hiddenEffects xmlns:a14="http://schemas.microsoft.com/office/drawing/2010/main">
+                <a:effectLst>
+                  <a:outerShdw dist="35921" dir="2700000" algn="ctr" rotWithShape="0">
+                    <a:schemeClr val="bg2"/>
+                  </a:outerShdw>
+                </a:effectLst>
+              </a14:hiddenEffects>
+            </a:ext>
+          </a:extLst>
+        </p:spPr>
+        <p:txBody>
+          <a:bodyPr vert="horz" wrap="square" lIns="91440" tIns="45720" rIns="91440" bIns="45720" numCol="1" anchor="ctr" anchorCtr="0" compatLnSpc="1">
+            <a:prstTxWarp prst="textNoShape">
+              <a:avLst/>
+            </a:prstTxWarp>
+            <a:spAutoFit/>
+          </a:bodyPr>
+          <a:lstStyle/>
+          <a:p>
+            <a:pPr marR="0" lvl="0" fontAlgn="base">
+              <a:lnSpc>
+                <a:spcPct val="100000"/>
+              </a:lnSpc>
+              <a:spcBef>
+                <a:spcPct val="0"/>
+              </a:spcBef>
+              <a:spcAft>
+                <a:spcPct val="0"/>
+              </a:spcAft>
+              <a:buClrTx/>
+              <a:buSzTx/>
+              <a:tabLst/>
+            </a:pPr>
+            <a:r>
+              <a:rPr lang="it-IT" altLang="it-IT" sz="2000" u="sng" dirty="0">
+                <a:latin typeface="Segoe UI" panose="020B0502040204020203" pitchFamily="34" charset="0"/>
+                <a:cs typeface="Segoe UI" panose="020B0502040204020203" pitchFamily="34" charset="0"/>
+              </a:rPr>
+              <a:t>Objective</a:t>
+            </a:r>
+            <a:r>
+              <a:rPr lang="it-IT" altLang="it-IT" sz="2000" dirty="0">
+                <a:latin typeface="Segoe UI" panose="020B0502040204020203" pitchFamily="34" charset="0"/>
+                <a:cs typeface="Segoe UI" panose="020B0502040204020203" pitchFamily="34" charset="0"/>
+              </a:rPr>
+              <a:t>: Leverage channel state information to </a:t>
+            </a:r>
+            <a:r>
+              <a:rPr lang="it-IT" altLang="it-IT" sz="2000" dirty="0" err="1">
+                <a:latin typeface="Segoe UI" panose="020B0502040204020203" pitchFamily="34" charset="0"/>
+                <a:cs typeface="Segoe UI" panose="020B0502040204020203" pitchFamily="34" charset="0"/>
+              </a:rPr>
+              <a:t>authenticate</a:t>
+            </a:r>
+            <a:r>
+              <a:rPr lang="it-IT" altLang="it-IT" sz="2000" dirty="0">
+                <a:latin typeface="Segoe UI" panose="020B0502040204020203" pitchFamily="34" charset="0"/>
+                <a:cs typeface="Segoe UI" panose="020B0502040204020203" pitchFamily="34" charset="0"/>
+              </a:rPr>
+              <a:t> </a:t>
+            </a:r>
+            <a:r>
+              <a:rPr lang="it-IT" altLang="it-IT" sz="2000" dirty="0" err="1">
+                <a:latin typeface="Segoe UI" panose="020B0502040204020203" pitchFamily="34" charset="0"/>
+                <a:cs typeface="Segoe UI" panose="020B0502040204020203" pitchFamily="34" charset="0"/>
+              </a:rPr>
+              <a:t>legitimate</a:t>
+            </a:r>
+            <a:r>
+              <a:rPr lang="it-IT" altLang="it-IT" sz="2000" dirty="0">
+                <a:latin typeface="Segoe UI" panose="020B0502040204020203" pitchFamily="34" charset="0"/>
+                <a:cs typeface="Segoe UI" panose="020B0502040204020203" pitchFamily="34" charset="0"/>
+              </a:rPr>
+              <a:t> transmissions and </a:t>
+            </a:r>
+            <a:r>
+              <a:rPr lang="it-IT" altLang="it-IT" sz="2000" dirty="0" err="1">
+                <a:latin typeface="Segoe UI" panose="020B0502040204020203" pitchFamily="34" charset="0"/>
+                <a:cs typeface="Segoe UI" panose="020B0502040204020203" pitchFamily="34" charset="0"/>
+              </a:rPr>
+              <a:t>distinguish</a:t>
+            </a:r>
+            <a:r>
+              <a:rPr lang="it-IT" altLang="it-IT" sz="2000" dirty="0">
+                <a:latin typeface="Segoe UI" panose="020B0502040204020203" pitchFamily="34" charset="0"/>
+                <a:cs typeface="Segoe UI" panose="020B0502040204020203" pitchFamily="34" charset="0"/>
+              </a:rPr>
+              <a:t> them from spoofing attempts.</a:t>
+            </a:r>
+          </a:p>
+          <a:p>
+            <a:pPr marL="457200" marR="0" lvl="0" indent="-457200" fontAlgn="base">
+              <a:lnSpc>
+                <a:spcPct val="100000"/>
+              </a:lnSpc>
+              <a:spcBef>
+                <a:spcPct val="0"/>
+              </a:spcBef>
+              <a:spcAft>
+                <a:spcPct val="0"/>
+              </a:spcAft>
+              <a:buClrTx/>
+              <a:buSzTx/>
+              <a:buFont typeface="+mj-lt"/>
+              <a:buAutoNum type="arabicPeriod"/>
+              <a:tabLst/>
+            </a:pPr>
+            <a:endParaRPr lang="it-IT" altLang="it-IT" sz="2000" dirty="0">
+              <a:latin typeface="Segoe UI" panose="020B0502040204020203" pitchFamily="34" charset="0"/>
+              <a:cs typeface="Segoe UI" panose="020B0502040204020203" pitchFamily="34" charset="0"/>
+            </a:endParaRPr>
+          </a:p>
+          <a:p>
+            <a:pPr marR="0" lvl="0" fontAlgn="base">
+              <a:lnSpc>
+                <a:spcPct val="100000"/>
+              </a:lnSpc>
+              <a:spcBef>
+                <a:spcPct val="0"/>
+              </a:spcBef>
+              <a:spcAft>
+                <a:spcPct val="0"/>
+              </a:spcAft>
+              <a:buClrTx/>
+              <a:buSzTx/>
+              <a:tabLst/>
+            </a:pPr>
+            <a:r>
+              <a:rPr lang="it-IT" altLang="it-IT" sz="2000" u="sng" dirty="0">
+                <a:latin typeface="Segoe UI" panose="020B0502040204020203" pitchFamily="34" charset="0"/>
+                <a:cs typeface="Segoe UI" panose="020B0502040204020203" pitchFamily="34" charset="0"/>
+              </a:rPr>
+              <a:t>Parametrized</a:t>
+            </a:r>
+            <a:r>
+              <a:rPr lang="it-IT" altLang="it-IT" sz="2000" dirty="0">
+                <a:latin typeface="Segoe UI" panose="020B0502040204020203" pitchFamily="34" charset="0"/>
+                <a:cs typeface="Segoe UI" panose="020B0502040204020203" pitchFamily="34" charset="0"/>
+              </a:rPr>
+              <a:t> simulation to test the best simulation performance:</a:t>
+            </a:r>
+          </a:p>
+          <a:p>
+            <a:pPr marR="0" lvl="0" fontAlgn="base">
+              <a:lnSpc>
+                <a:spcPct val="100000"/>
+              </a:lnSpc>
+              <a:spcBef>
+                <a:spcPct val="0"/>
+              </a:spcBef>
+              <a:spcAft>
+                <a:spcPct val="0"/>
+              </a:spcAft>
+              <a:buClrTx/>
+              <a:buSzTx/>
+              <a:tabLst/>
+            </a:pPr>
+            <a:endParaRPr lang="it-IT" altLang="it-IT" sz="2000" dirty="0">
+              <a:latin typeface="Segoe UI" panose="020B0502040204020203" pitchFamily="34" charset="0"/>
+              <a:cs typeface="Segoe UI" panose="020B0502040204020203" pitchFamily="34" charset="0"/>
+            </a:endParaRPr>
+          </a:p>
+          <a:p>
+            <a:pPr marL="457200" marR="0" lvl="0" indent="-457200" fontAlgn="base">
+              <a:lnSpc>
+                <a:spcPct val="100000"/>
+              </a:lnSpc>
+              <a:spcBef>
+                <a:spcPct val="0"/>
+              </a:spcBef>
+              <a:spcAft>
+                <a:spcPct val="0"/>
+              </a:spcAft>
+              <a:buClrTx/>
+              <a:buSzTx/>
+              <a:buFont typeface="+mj-lt"/>
+              <a:buAutoNum type="arabicPeriod"/>
+              <a:tabLst/>
+            </a:pPr>
+            <a:r>
+              <a:rPr lang="it-IT" altLang="it-IT" sz="2000" dirty="0" err="1">
+                <a:latin typeface="Segoe UI" panose="020B0502040204020203" pitchFamily="34" charset="0"/>
+                <a:cs typeface="Segoe UI" panose="020B0502040204020203" pitchFamily="34" charset="0"/>
+              </a:rPr>
+              <a:t>Combined</a:t>
+            </a:r>
+            <a:r>
+              <a:rPr lang="it-IT" altLang="it-IT" sz="2000" dirty="0">
+                <a:latin typeface="Segoe UI" panose="020B0502040204020203" pitchFamily="34" charset="0"/>
+                <a:cs typeface="Segoe UI" panose="020B0502040204020203" pitchFamily="34" charset="0"/>
+              </a:rPr>
+              <a:t> data and authentication signals with different power levels based on the </a:t>
+            </a:r>
+            <a:r>
+              <a:rPr lang="it-IT" altLang="it-IT" sz="2000" dirty="0" err="1">
+                <a:latin typeface="Segoe UI" panose="020B0502040204020203" pitchFamily="34" charset="0"/>
+                <a:cs typeface="Segoe UI" panose="020B0502040204020203" pitchFamily="34" charset="0"/>
+              </a:rPr>
+              <a:t>peaks</a:t>
+            </a:r>
+            <a:r>
+              <a:rPr lang="it-IT" altLang="it-IT" sz="2000" dirty="0">
+                <a:latin typeface="Segoe UI" panose="020B0502040204020203" pitchFamily="34" charset="0"/>
+                <a:cs typeface="Segoe UI" panose="020B0502040204020203" pitchFamily="34" charset="0"/>
+              </a:rPr>
+              <a:t> as binary </a:t>
+            </a:r>
+            <a:r>
+              <a:rPr lang="it-IT" altLang="it-IT" sz="2000" dirty="0" err="1">
+                <a:latin typeface="Segoe UI" panose="020B0502040204020203" pitchFamily="34" charset="0"/>
+                <a:cs typeface="Segoe UI" panose="020B0502040204020203" pitchFamily="34" charset="0"/>
+              </a:rPr>
+              <a:t>waveforms</a:t>
+            </a:r>
+            <a:endParaRPr lang="it-IT" altLang="it-IT" sz="2000" dirty="0">
+              <a:latin typeface="Segoe UI" panose="020B0502040204020203" pitchFamily="34" charset="0"/>
+              <a:cs typeface="Segoe UI" panose="020B0502040204020203" pitchFamily="34" charset="0"/>
+            </a:endParaRPr>
+          </a:p>
+          <a:p>
+            <a:pPr marL="457200" marR="0" lvl="0" indent="-457200" fontAlgn="base">
+              <a:lnSpc>
+                <a:spcPct val="100000"/>
+              </a:lnSpc>
+              <a:spcBef>
+                <a:spcPct val="0"/>
+              </a:spcBef>
+              <a:spcAft>
+                <a:spcPct val="0"/>
+              </a:spcAft>
+              <a:buClrTx/>
+              <a:buSzTx/>
+              <a:buFont typeface="+mj-lt"/>
+              <a:buAutoNum type="arabicPeriod"/>
+              <a:tabLst/>
+            </a:pPr>
+            <a:endParaRPr lang="it-IT" altLang="it-IT" sz="2000" dirty="0">
+              <a:latin typeface="Segoe UI" panose="020B0502040204020203" pitchFamily="34" charset="0"/>
+              <a:cs typeface="Segoe UI" panose="020B0502040204020203" pitchFamily="34" charset="0"/>
+            </a:endParaRPr>
+          </a:p>
+          <a:p>
+            <a:pPr marL="457200" marR="0" lvl="0" indent="-457200" fontAlgn="base">
+              <a:lnSpc>
+                <a:spcPct val="100000"/>
+              </a:lnSpc>
+              <a:spcBef>
+                <a:spcPct val="0"/>
+              </a:spcBef>
+              <a:spcAft>
+                <a:spcPct val="0"/>
+              </a:spcAft>
+              <a:buClrTx/>
+              <a:buSzTx/>
+              <a:buFont typeface="+mj-lt"/>
+              <a:buAutoNum type="arabicPeriod"/>
+              <a:tabLst/>
+            </a:pPr>
+            <a:r>
+              <a:rPr lang="it-IT" altLang="it-IT" sz="2000" dirty="0" err="1">
+                <a:latin typeface="Segoe UI" panose="020B0502040204020203" pitchFamily="34" charset="0"/>
+                <a:cs typeface="Segoe UI" panose="020B0502040204020203" pitchFamily="34" charset="0"/>
+              </a:rPr>
+              <a:t>Varied</a:t>
+            </a:r>
+            <a:r>
+              <a:rPr lang="it-IT" altLang="it-IT" sz="2000" dirty="0">
+                <a:latin typeface="Segoe UI" panose="020B0502040204020203" pitchFamily="34" charset="0"/>
+                <a:cs typeface="Segoe UI" panose="020B0502040204020203" pitchFamily="34" charset="0"/>
+              </a:rPr>
+              <a:t> distance (1-50 meters) and SNR (10-30 dB) to </a:t>
+            </a:r>
+            <a:r>
+              <a:rPr lang="it-IT" altLang="it-IT" sz="2000" dirty="0" err="1">
+                <a:latin typeface="Segoe UI" panose="020B0502040204020203" pitchFamily="34" charset="0"/>
+                <a:cs typeface="Segoe UI" panose="020B0502040204020203" pitchFamily="34" charset="0"/>
+              </a:rPr>
+              <a:t>represent</a:t>
+            </a:r>
+            <a:r>
+              <a:rPr lang="it-IT" altLang="it-IT" sz="2000" dirty="0">
+                <a:latin typeface="Segoe UI" panose="020B0502040204020203" pitchFamily="34" charset="0"/>
+                <a:cs typeface="Segoe UI" panose="020B0502040204020203" pitchFamily="34" charset="0"/>
+              </a:rPr>
+              <a:t> </a:t>
+            </a:r>
+            <a:r>
+              <a:rPr lang="it-IT" altLang="it-IT" sz="2000" dirty="0" err="1">
+                <a:latin typeface="Segoe UI" panose="020B0502040204020203" pitchFamily="34" charset="0"/>
+                <a:cs typeface="Segoe UI" panose="020B0502040204020203" pitchFamily="34" charset="0"/>
+              </a:rPr>
+              <a:t>realistic</a:t>
+            </a:r>
+            <a:r>
+              <a:rPr lang="it-IT" altLang="it-IT" sz="2000" dirty="0">
+                <a:latin typeface="Segoe UI" panose="020B0502040204020203" pitchFamily="34" charset="0"/>
+                <a:cs typeface="Segoe UI" panose="020B0502040204020203" pitchFamily="34" charset="0"/>
+              </a:rPr>
+              <a:t> signal </a:t>
+            </a:r>
+            <a:r>
+              <a:rPr lang="it-IT" altLang="it-IT" sz="2000" dirty="0" err="1">
+                <a:latin typeface="Segoe UI" panose="020B0502040204020203" pitchFamily="34" charset="0"/>
+                <a:cs typeface="Segoe UI" panose="020B0502040204020203" pitchFamily="34" charset="0"/>
+              </a:rPr>
+              <a:t>decay</a:t>
+            </a:r>
+            <a:r>
+              <a:rPr lang="it-IT" altLang="it-IT" sz="2000" dirty="0">
+                <a:latin typeface="Segoe UI" panose="020B0502040204020203" pitchFamily="34" charset="0"/>
+                <a:cs typeface="Segoe UI" panose="020B0502040204020203" pitchFamily="34" charset="0"/>
+              </a:rPr>
+              <a:t> </a:t>
+            </a:r>
+          </a:p>
+          <a:p>
+            <a:pPr marL="457200" marR="0" lvl="0" indent="-457200" fontAlgn="base">
+              <a:lnSpc>
+                <a:spcPct val="100000"/>
+              </a:lnSpc>
+              <a:spcBef>
+                <a:spcPct val="0"/>
+              </a:spcBef>
+              <a:spcAft>
+                <a:spcPct val="0"/>
+              </a:spcAft>
+              <a:buClrTx/>
+              <a:buSzTx/>
+              <a:buFont typeface="+mj-lt"/>
+              <a:buAutoNum type="arabicPeriod"/>
+              <a:tabLst/>
+            </a:pPr>
+            <a:endParaRPr lang="it-IT" altLang="it-IT" sz="2000" dirty="0">
+              <a:latin typeface="Segoe UI" panose="020B0502040204020203" pitchFamily="34" charset="0"/>
+              <a:cs typeface="Segoe UI" panose="020B0502040204020203" pitchFamily="34" charset="0"/>
+            </a:endParaRPr>
+          </a:p>
+          <a:p>
+            <a:pPr marL="457200" marR="0" lvl="0" indent="-457200" fontAlgn="base">
+              <a:lnSpc>
+                <a:spcPct val="100000"/>
+              </a:lnSpc>
+              <a:spcBef>
+                <a:spcPct val="0"/>
+              </a:spcBef>
+              <a:spcAft>
+                <a:spcPct val="0"/>
+              </a:spcAft>
+              <a:buClrTx/>
+              <a:buSzTx/>
+              <a:buFont typeface="+mj-lt"/>
+              <a:buAutoNum type="arabicPeriod"/>
+              <a:tabLst/>
+            </a:pPr>
+            <a:r>
+              <a:rPr lang="it-IT" altLang="it-IT" sz="2000" dirty="0">
+                <a:latin typeface="Segoe UI" panose="020B0502040204020203" pitchFamily="34" charset="0"/>
+                <a:cs typeface="Segoe UI" panose="020B0502040204020203" pitchFamily="34" charset="0"/>
+              </a:rPr>
+              <a:t>Applied white noise (AWGN) to simulate channel effect</a:t>
+            </a:r>
+          </a:p>
+          <a:p>
+            <a:pPr marL="457200" marR="0" lvl="0" indent="-457200" fontAlgn="base">
+              <a:lnSpc>
+                <a:spcPct val="100000"/>
+              </a:lnSpc>
+              <a:spcBef>
+                <a:spcPct val="0"/>
+              </a:spcBef>
+              <a:spcAft>
+                <a:spcPct val="0"/>
+              </a:spcAft>
+              <a:buClrTx/>
+              <a:buSzTx/>
+              <a:buFont typeface="+mj-lt"/>
+              <a:buAutoNum type="arabicPeriod"/>
+              <a:tabLst/>
+            </a:pPr>
+            <a:endParaRPr lang="it-IT" altLang="it-IT" sz="2000" dirty="0">
+              <a:latin typeface="Segoe UI" panose="020B0502040204020203" pitchFamily="34" charset="0"/>
+              <a:cs typeface="Segoe UI" panose="020B0502040204020203" pitchFamily="34" charset="0"/>
+            </a:endParaRPr>
+          </a:p>
+          <a:p>
+            <a:pPr marL="457200" marR="0" lvl="0" indent="-457200" fontAlgn="base">
+              <a:lnSpc>
+                <a:spcPct val="100000"/>
+              </a:lnSpc>
+              <a:spcBef>
+                <a:spcPct val="0"/>
+              </a:spcBef>
+              <a:spcAft>
+                <a:spcPct val="0"/>
+              </a:spcAft>
+              <a:buClrTx/>
+              <a:buSzTx/>
+              <a:buFont typeface="+mj-lt"/>
+              <a:buAutoNum type="arabicPeriod"/>
+              <a:tabLst/>
+            </a:pPr>
+            <a:r>
+              <a:rPr lang="it-IT" altLang="it-IT" sz="2000" dirty="0" err="1">
+                <a:latin typeface="Segoe UI" panose="020B0502040204020203" pitchFamily="34" charset="0"/>
+                <a:cs typeface="Segoe UI" panose="020B0502040204020203" pitchFamily="34" charset="0"/>
+              </a:rPr>
+              <a:t>Tested</a:t>
+            </a:r>
+            <a:r>
+              <a:rPr lang="it-IT" altLang="it-IT" sz="2000" dirty="0">
+                <a:latin typeface="Segoe UI" panose="020B0502040204020203" pitchFamily="34" charset="0"/>
+                <a:cs typeface="Segoe UI" panose="020B0502040204020203" pitchFamily="34" charset="0"/>
+              </a:rPr>
+              <a:t> </a:t>
+            </a:r>
+            <a:r>
+              <a:rPr lang="it-IT" altLang="it-IT" sz="2000" dirty="0" err="1">
+                <a:latin typeface="Segoe UI" panose="020B0502040204020203" pitchFamily="34" charset="0"/>
+                <a:cs typeface="Segoe UI" panose="020B0502040204020203" pitchFamily="34" charset="0"/>
+              </a:rPr>
+              <a:t>fixed</a:t>
+            </a:r>
+            <a:r>
+              <a:rPr lang="it-IT" altLang="it-IT" sz="2000" dirty="0">
+                <a:latin typeface="Segoe UI" panose="020B0502040204020203" pitchFamily="34" charset="0"/>
+                <a:cs typeface="Segoe UI" panose="020B0502040204020203" pitchFamily="34" charset="0"/>
+              </a:rPr>
+              <a:t>-threshold/variable-threshold decoding methods</a:t>
+            </a:r>
           </a:p>
         </p:txBody>
       </p:sp>
@@ -2893,11 +4581,11 @@
           <a:lstStyle/>
           <a:p>
             <a:r>
-              <a:rPr lang="en-US" sz="3600" dirty="0">
-                <a:latin typeface="Segoe UI" panose="020B0502040204020203" pitchFamily="34" charset="0"/>
-                <a:cs typeface="Segoe UI" panose="020B0502040204020203" pitchFamily="34" charset="0"/>
-              </a:rPr>
-              <a:t>FA (False Alarm) Study</a:t>
+              <a:rPr lang="en-US" sz="3200" dirty="0">
+                <a:latin typeface="Segoe UI" panose="020B0502040204020203" pitchFamily="34" charset="0"/>
+                <a:cs typeface="Segoe UI" panose="020B0502040204020203" pitchFamily="34" charset="0"/>
+              </a:rPr>
+              <a:t>False Alarm and Miss Detection Study</a:t>
             </a:r>
           </a:p>
         </p:txBody>
@@ -2938,12 +4626,48 @@
           </a:p>
         </p:txBody>
       </p:sp>
+      <p:pic>
+        <p:nvPicPr>
+          <p:cNvPr id="5" name="Immagine 4" descr="Immagine che contiene testo, diagramma, Carattere, schermata&#10;&#10;Descrizione generata automaticamente">
+            <a:extLst>
+              <a:ext uri="{FF2B5EF4-FFF2-40B4-BE49-F238E27FC236}">
+                <a16:creationId xmlns:a16="http://schemas.microsoft.com/office/drawing/2014/main" id="{0E8E772C-5482-1063-449A-9207B9A21511}"/>
+              </a:ext>
+            </a:extLst>
+          </p:cNvPr>
+          <p:cNvPicPr>
+            <a:picLocks noChangeAspect="1"/>
+          </p:cNvPicPr>
+          <p:nvPr/>
+        </p:nvPicPr>
+        <p:blipFill>
+          <a:blip r:embed="rId2">
+            <a:extLst>
+              <a:ext uri="{28A0092B-C50C-407E-A947-70E740481C1C}">
+                <a14:useLocalDpi xmlns:a14="http://schemas.microsoft.com/office/drawing/2010/main" val="0"/>
+              </a:ext>
+            </a:extLst>
+          </a:blip>
+          <a:stretch>
+            <a:fillRect/>
+          </a:stretch>
+        </p:blipFill>
+        <p:spPr>
+          <a:xfrm>
+            <a:off x="1695519" y="1519237"/>
+            <a:ext cx="5419725" cy="3819525"/>
+          </a:xfrm>
+          <a:prstGeom prst="rect">
+            <a:avLst/>
+          </a:prstGeom>
+        </p:spPr>
+      </p:pic>
       <p:sp>
         <p:nvSpPr>
-          <p:cNvPr id="6" name="CasellaDiTesto 5">
+          <p:cNvPr id="8" name="CasellaDiTesto 7">
             <a:extLst>
               <a:ext uri="{FF2B5EF4-FFF2-40B4-BE49-F238E27FC236}">
-                <a16:creationId xmlns:a16="http://schemas.microsoft.com/office/drawing/2014/main" id="{0C3825A1-BC2D-A575-E5DA-F3AAE95E3E9E}"/>
+                <a16:creationId xmlns:a16="http://schemas.microsoft.com/office/drawing/2014/main" id="{13448BF0-9D44-F098-BAD9-74D45F5A4869}"/>
               </a:ext>
             </a:extLst>
           </p:cNvPr>
@@ -2952,8 +4676,8 @@
         </p:nvSpPr>
         <p:spPr>
           <a:xfrm>
-            <a:off x="446809" y="1433945"/>
-            <a:ext cx="8343900" cy="1200329"/>
+            <a:off x="2413879" y="5544201"/>
+            <a:ext cx="4316241" cy="307777"/>
           </a:xfrm>
           <a:prstGeom prst="rect">
             <a:avLst/>
@@ -2966,44 +4690,27 @@
           </a:bodyPr>
           <a:lstStyle/>
           <a:p>
-            <a:pPr marL="285750" indent="-285750">
-              <a:buFontTx/>
-              <a:buChar char="-"/>
-            </a:pPr>
-            <a:r>
-              <a:rPr lang="it-IT" sz="2400" dirty="0">
-                <a:latin typeface="Segoe UI" panose="020B0502040204020203" pitchFamily="34" charset="0"/>
-                <a:cs typeface="Segoe UI" panose="020B0502040204020203" pitchFamily="34" charset="0"/>
-              </a:rPr>
-              <a:t>aaa</a:t>
-            </a:r>
-          </a:p>
-          <a:p>
-            <a:pPr marL="285750" indent="-285750">
-              <a:buFontTx/>
-              <a:buChar char="-"/>
-            </a:pPr>
-            <a:endParaRPr lang="it-IT" sz="2400" dirty="0">
-              <a:latin typeface="Segoe UI" panose="020B0502040204020203" pitchFamily="34" charset="0"/>
-              <a:cs typeface="Segoe UI" panose="020B0502040204020203" pitchFamily="34" charset="0"/>
-            </a:endParaRPr>
-          </a:p>
-          <a:p>
-            <a:pPr marL="285750" indent="-285750">
-              <a:buFontTx/>
-              <a:buChar char="-"/>
-            </a:pPr>
-            <a:endParaRPr lang="it-IT" sz="2400" dirty="0">
-              <a:latin typeface="Segoe UI" panose="020B0502040204020203" pitchFamily="34" charset="0"/>
-              <a:cs typeface="Segoe UI" panose="020B0502040204020203" pitchFamily="34" charset="0"/>
-            </a:endParaRPr>
+            <a:r>
+              <a:rPr lang="it-IT" sz="1400" dirty="0"/>
+              <a:t>Source: </a:t>
+            </a:r>
+            <a:r>
+              <a:rPr lang="it-IT" sz="1400" dirty="0">
+                <a:hlinkClick r:id="rId3"/>
+              </a:rPr>
+              <a:t>https://gru.stanford.edu/doku.php/tutorials/sdt</a:t>
+            </a:r>
+            <a:r>
+              <a:rPr lang="it-IT" sz="1400" dirty="0"/>
+              <a:t> </a:t>
+            </a:r>
           </a:p>
         </p:txBody>
       </p:sp>
     </p:spTree>
     <p:extLst>
       <p:ext uri="{BB962C8B-B14F-4D97-AF65-F5344CB8AC3E}">
-        <p14:creationId xmlns:p14="http://schemas.microsoft.com/office/powerpoint/2010/main" val="26372625"/>
+        <p14:creationId xmlns:p14="http://schemas.microsoft.com/office/powerpoint/2010/main" val="1131974987"/>
       </p:ext>
     </p:extLst>
   </p:cSld>
@@ -3063,7 +4770,7 @@
                 <a:latin typeface="Segoe UI" panose="020B0502040204020203" pitchFamily="34" charset="0"/>
                 <a:cs typeface="Segoe UI" panose="020B0502040204020203" pitchFamily="34" charset="0"/>
               </a:rPr>
-              <a:t>MD (Miss Detection) study</a:t>
+              <a:t>FA (False Alarm) Study</a:t>
             </a:r>
           </a:p>
         </p:txBody>
@@ -3118,8 +4825,8 @@
         </p:nvSpPr>
         <p:spPr>
           <a:xfrm>
-            <a:off x="446809" y="1433945"/>
-            <a:ext cx="8343900" cy="1200329"/>
+            <a:off x="508593" y="2138280"/>
+            <a:ext cx="8343900" cy="3785652"/>
           </a:xfrm>
           <a:prstGeom prst="rect">
             <a:avLst/>
@@ -3132,34 +4839,283 @@
           </a:bodyPr>
           <a:lstStyle/>
           <a:p>
+            <a:r>
+              <a:rPr lang="it-IT" sz="2000" u="sng" dirty="0">
+                <a:latin typeface="Segoe UI" panose="020B0502040204020203" pitchFamily="34" charset="0"/>
+                <a:cs typeface="Segoe UI" panose="020B0502040204020203" pitchFamily="34" charset="0"/>
+              </a:rPr>
+              <a:t>False Alarm</a:t>
+            </a:r>
+            <a:r>
+              <a:rPr lang="it-IT" sz="2000" dirty="0">
+                <a:latin typeface="Segoe UI" panose="020B0502040204020203" pitchFamily="34" charset="0"/>
+                <a:cs typeface="Segoe UI" panose="020B0502040204020203" pitchFamily="34" charset="0"/>
+              </a:rPr>
+              <a:t>: only </a:t>
+            </a:r>
+            <a:r>
+              <a:rPr lang="it-IT" sz="2000" i="1" dirty="0" err="1">
+                <a:latin typeface="Segoe UI" panose="020B0502040204020203" pitchFamily="34" charset="0"/>
+                <a:cs typeface="Segoe UI" panose="020B0502040204020203" pitchFamily="34" charset="0"/>
+              </a:rPr>
+              <a:t>authenticate</a:t>
+            </a:r>
+            <a:r>
+              <a:rPr lang="it-IT" sz="2000" dirty="0">
+                <a:latin typeface="Segoe UI" panose="020B0502040204020203" pitchFamily="34" charset="0"/>
+                <a:cs typeface="Segoe UI" panose="020B0502040204020203" pitchFamily="34" charset="0"/>
+              </a:rPr>
+              <a:t> </a:t>
+            </a:r>
+            <a:r>
+              <a:rPr lang="it-IT" sz="2000" dirty="0" err="1">
+                <a:latin typeface="Segoe UI" panose="020B0502040204020203" pitchFamily="34" charset="0"/>
+                <a:cs typeface="Segoe UI" panose="020B0502040204020203" pitchFamily="34" charset="0"/>
+              </a:rPr>
+              <a:t>messages</a:t>
+            </a:r>
+            <a:r>
+              <a:rPr lang="it-IT" sz="2000" dirty="0">
+                <a:latin typeface="Segoe UI" panose="020B0502040204020203" pitchFamily="34" charset="0"/>
+                <a:cs typeface="Segoe UI" panose="020B0502040204020203" pitchFamily="34" charset="0"/>
+              </a:rPr>
+              <a:t> are </a:t>
+            </a:r>
+            <a:r>
+              <a:rPr lang="it-IT" sz="2000" dirty="0" err="1">
+                <a:latin typeface="Segoe UI" panose="020B0502040204020203" pitchFamily="34" charset="0"/>
+                <a:cs typeface="Segoe UI" panose="020B0502040204020203" pitchFamily="34" charset="0"/>
+              </a:rPr>
+              <a:t>sent</a:t>
+            </a:r>
+            <a:r>
+              <a:rPr lang="it-IT" sz="2000" dirty="0">
+                <a:latin typeface="Segoe UI" panose="020B0502040204020203" pitchFamily="34" charset="0"/>
+                <a:cs typeface="Segoe UI" panose="020B0502040204020203" pitchFamily="34" charset="0"/>
+              </a:rPr>
+              <a:t> and check how many of those are </a:t>
+            </a:r>
+            <a:r>
+              <a:rPr lang="it-IT" sz="2000" dirty="0" err="1">
+                <a:latin typeface="Segoe UI" panose="020B0502040204020203" pitchFamily="34" charset="0"/>
+                <a:cs typeface="Segoe UI" panose="020B0502040204020203" pitchFamily="34" charset="0"/>
+              </a:rPr>
+              <a:t>interpreted</a:t>
+            </a:r>
+            <a:r>
+              <a:rPr lang="it-IT" sz="2000" dirty="0">
+                <a:latin typeface="Segoe UI" panose="020B0502040204020203" pitchFamily="34" charset="0"/>
+                <a:cs typeface="Segoe UI" panose="020B0502040204020203" pitchFamily="34" charset="0"/>
+              </a:rPr>
+              <a:t> as </a:t>
+            </a:r>
+            <a:r>
+              <a:rPr lang="it-IT" sz="2000" i="1" dirty="0" err="1">
+                <a:latin typeface="Segoe UI" panose="020B0502040204020203" pitchFamily="34" charset="0"/>
+                <a:cs typeface="Segoe UI" panose="020B0502040204020203" pitchFamily="34" charset="0"/>
+              </a:rPr>
+              <a:t>wrong</a:t>
+            </a:r>
+            <a:r>
+              <a:rPr lang="it-IT" sz="2000" dirty="0">
+                <a:latin typeface="Segoe UI" panose="020B0502040204020203" pitchFamily="34" charset="0"/>
+                <a:cs typeface="Segoe UI" panose="020B0502040204020203" pitchFamily="34" charset="0"/>
+              </a:rPr>
+              <a:t> (</a:t>
+            </a:r>
+            <a:r>
+              <a:rPr lang="it-IT" sz="2000" i="1" dirty="0">
+                <a:latin typeface="Segoe UI" panose="020B0502040204020203" pitchFamily="34" charset="0"/>
+                <a:cs typeface="Segoe UI" panose="020B0502040204020203" pitchFamily="34" charset="0"/>
+              </a:rPr>
+              <a:t>false </a:t>
+            </a:r>
+            <a:r>
+              <a:rPr lang="it-IT" sz="2000" i="1" dirty="0" err="1">
+                <a:latin typeface="Segoe UI" panose="020B0502040204020203" pitchFamily="34" charset="0"/>
+                <a:cs typeface="Segoe UI" panose="020B0502040204020203" pitchFamily="34" charset="0"/>
+              </a:rPr>
+              <a:t>negatives</a:t>
+            </a:r>
+            <a:r>
+              <a:rPr lang="it-IT" sz="2000" dirty="0">
+                <a:latin typeface="Segoe UI" panose="020B0502040204020203" pitchFamily="34" charset="0"/>
+                <a:cs typeface="Segoe UI" panose="020B0502040204020203" pitchFamily="34" charset="0"/>
+              </a:rPr>
+              <a:t>)</a:t>
+            </a:r>
+          </a:p>
+          <a:p>
             <a:pPr marL="285750" indent="-285750">
               <a:buFontTx/>
               <a:buChar char="-"/>
             </a:pPr>
-            <a:r>
-              <a:rPr lang="it-IT" sz="2400" dirty="0">
-                <a:latin typeface="Segoe UI" panose="020B0502040204020203" pitchFamily="34" charset="0"/>
-                <a:cs typeface="Segoe UI" panose="020B0502040204020203" pitchFamily="34" charset="0"/>
-              </a:rPr>
-              <a:t>aaa</a:t>
-            </a:r>
+            <a:endParaRPr lang="it-IT" sz="2000" dirty="0">
+              <a:latin typeface="Segoe UI" panose="020B0502040204020203" pitchFamily="34" charset="0"/>
+              <a:cs typeface="Segoe UI" panose="020B0502040204020203" pitchFamily="34" charset="0"/>
+            </a:endParaRPr>
+          </a:p>
+          <a:p>
+            <a:r>
+              <a:rPr lang="it-IT" altLang="it-IT" sz="2000" u="sng" dirty="0">
+                <a:latin typeface="Segoe UI" panose="020B0502040204020203" pitchFamily="34" charset="0"/>
+                <a:cs typeface="Segoe UI" panose="020B0502040204020203" pitchFamily="34" charset="0"/>
+              </a:rPr>
+              <a:t>Parametrized</a:t>
+            </a:r>
+            <a:r>
+              <a:rPr lang="it-IT" altLang="it-IT" sz="2000" dirty="0">
+                <a:latin typeface="Segoe UI" panose="020B0502040204020203" pitchFamily="34" charset="0"/>
+                <a:cs typeface="Segoe UI" panose="020B0502040204020203" pitchFamily="34" charset="0"/>
+              </a:rPr>
+              <a:t> simulation to test the transmissions:</a:t>
+            </a:r>
+          </a:p>
+          <a:p>
+            <a:endParaRPr lang="it-IT" altLang="it-IT" sz="2000" dirty="0">
+              <a:latin typeface="Segoe UI" panose="020B0502040204020203" pitchFamily="34" charset="0"/>
+              <a:cs typeface="Segoe UI" panose="020B0502040204020203" pitchFamily="34" charset="0"/>
+            </a:endParaRPr>
+          </a:p>
+          <a:p>
+            <a:pPr marL="457200" indent="-457200">
+              <a:buFont typeface="+mj-lt"/>
+              <a:buAutoNum type="arabicPeriod"/>
+            </a:pPr>
+            <a:r>
+              <a:rPr lang="it-IT" altLang="it-IT" sz="2000" dirty="0" err="1">
+                <a:latin typeface="Segoe UI" panose="020B0502040204020203" pitchFamily="34" charset="0"/>
+                <a:cs typeface="Segoe UI" panose="020B0502040204020203" pitchFamily="34" charset="0"/>
+              </a:rPr>
+              <a:t>Varied</a:t>
+            </a:r>
+            <a:r>
+              <a:rPr lang="it-IT" altLang="it-IT" sz="2000" dirty="0">
+                <a:latin typeface="Segoe UI" panose="020B0502040204020203" pitchFamily="34" charset="0"/>
+                <a:cs typeface="Segoe UI" panose="020B0502040204020203" pitchFamily="34" charset="0"/>
+              </a:rPr>
+              <a:t> distance and SNR to test different </a:t>
+            </a:r>
+            <a:r>
+              <a:rPr lang="it-IT" altLang="it-IT" sz="2000" dirty="0" err="1">
+                <a:latin typeface="Segoe UI" panose="020B0502040204020203" pitchFamily="34" charset="0"/>
+                <a:cs typeface="Segoe UI" panose="020B0502040204020203" pitchFamily="34" charset="0"/>
+              </a:rPr>
+              <a:t>configurations</a:t>
+            </a:r>
+            <a:endParaRPr lang="it-IT" altLang="it-IT" sz="2000" dirty="0">
+              <a:latin typeface="Segoe UI" panose="020B0502040204020203" pitchFamily="34" charset="0"/>
+              <a:cs typeface="Segoe UI" panose="020B0502040204020203" pitchFamily="34" charset="0"/>
+            </a:endParaRPr>
+          </a:p>
+          <a:p>
+            <a:pPr marL="457200" indent="-457200">
+              <a:buFont typeface="+mj-lt"/>
+              <a:buAutoNum type="arabicPeriod"/>
+            </a:pPr>
+            <a:endParaRPr lang="it-IT" altLang="it-IT" sz="2000" dirty="0">
+              <a:latin typeface="Segoe UI" panose="020B0502040204020203" pitchFamily="34" charset="0"/>
+              <a:cs typeface="Segoe UI" panose="020B0502040204020203" pitchFamily="34" charset="0"/>
+            </a:endParaRPr>
+          </a:p>
+          <a:p>
+            <a:pPr marL="457200" indent="-457200">
+              <a:buFont typeface="+mj-lt"/>
+              <a:buAutoNum type="arabicPeriod"/>
+            </a:pPr>
+            <a:r>
+              <a:rPr lang="it-IT" altLang="it-IT" sz="2000" dirty="0">
+                <a:latin typeface="Segoe UI" panose="020B0502040204020203" pitchFamily="34" charset="0"/>
+                <a:cs typeface="Segoe UI" panose="020B0502040204020203" pitchFamily="34" charset="0"/>
+              </a:rPr>
+              <a:t>Set error tolerance on key bits for authentication</a:t>
+            </a:r>
+          </a:p>
+          <a:p>
+            <a:pPr marL="457200" indent="-457200">
+              <a:buFont typeface="+mj-lt"/>
+              <a:buAutoNum type="arabicPeriod"/>
+            </a:pPr>
+            <a:endParaRPr lang="it-IT" altLang="it-IT" sz="2000" dirty="0">
+              <a:latin typeface="Segoe UI" panose="020B0502040204020203" pitchFamily="34" charset="0"/>
+              <a:cs typeface="Segoe UI" panose="020B0502040204020203" pitchFamily="34" charset="0"/>
+            </a:endParaRPr>
+          </a:p>
+          <a:p>
+            <a:pPr marL="457200" indent="-457200">
+              <a:buFont typeface="+mj-lt"/>
+              <a:buAutoNum type="arabicPeriod"/>
+            </a:pPr>
+            <a:r>
+              <a:rPr lang="it-IT" altLang="it-IT" sz="2000" dirty="0" err="1">
+                <a:latin typeface="Segoe UI" panose="020B0502040204020203" pitchFamily="34" charset="0"/>
+                <a:cs typeface="Segoe UI" panose="020B0502040204020203" pitchFamily="34" charset="0"/>
+              </a:rPr>
+              <a:t>Counted</a:t>
+            </a:r>
+            <a:r>
+              <a:rPr lang="it-IT" altLang="it-IT" sz="2000" dirty="0">
+                <a:latin typeface="Segoe UI" panose="020B0502040204020203" pitchFamily="34" charset="0"/>
+                <a:cs typeface="Segoe UI" panose="020B0502040204020203" pitchFamily="34" charset="0"/>
+              </a:rPr>
+              <a:t> </a:t>
+            </a:r>
+            <a:r>
+              <a:rPr lang="it-IT" altLang="it-IT" sz="2000" dirty="0" err="1">
+                <a:latin typeface="Segoe UI" panose="020B0502040204020203" pitchFamily="34" charset="0"/>
+                <a:cs typeface="Segoe UI" panose="020B0502040204020203" pitchFamily="34" charset="0"/>
+              </a:rPr>
+              <a:t>messages</a:t>
+            </a:r>
+            <a:r>
+              <a:rPr lang="it-IT" altLang="it-IT" sz="2000" dirty="0">
+                <a:latin typeface="Segoe UI" panose="020B0502040204020203" pitchFamily="34" charset="0"/>
+                <a:cs typeface="Segoe UI" panose="020B0502040204020203" pitchFamily="34" charset="0"/>
+              </a:rPr>
+              <a:t> </a:t>
+            </a:r>
+            <a:r>
+              <a:rPr lang="it-IT" altLang="it-IT" sz="2000" dirty="0" err="1">
+                <a:latin typeface="Segoe UI" panose="020B0502040204020203" pitchFamily="34" charset="0"/>
+                <a:cs typeface="Segoe UI" panose="020B0502040204020203" pitchFamily="34" charset="0"/>
+              </a:rPr>
+              <a:t>exceeding</a:t>
+            </a:r>
+            <a:r>
+              <a:rPr lang="it-IT" altLang="it-IT" sz="2000" dirty="0">
+                <a:latin typeface="Segoe UI" panose="020B0502040204020203" pitchFamily="34" charset="0"/>
+                <a:cs typeface="Segoe UI" panose="020B0502040204020203" pitchFamily="34" charset="0"/>
+              </a:rPr>
+              <a:t> tolerance as false </a:t>
+            </a:r>
+            <a:r>
+              <a:rPr lang="it-IT" altLang="it-IT" sz="2000" dirty="0" err="1">
+                <a:latin typeface="Segoe UI" panose="020B0502040204020203" pitchFamily="34" charset="0"/>
+                <a:cs typeface="Segoe UI" panose="020B0502040204020203" pitchFamily="34" charset="0"/>
+              </a:rPr>
+              <a:t>alarms</a:t>
+            </a:r>
+            <a:endParaRPr lang="it-IT" altLang="it-IT" sz="2000" dirty="0">
+              <a:latin typeface="Segoe UI" panose="020B0502040204020203" pitchFamily="34" charset="0"/>
+              <a:cs typeface="Segoe UI" panose="020B0502040204020203" pitchFamily="34" charset="0"/>
+            </a:endParaRPr>
+          </a:p>
+          <a:p>
+            <a:pPr marL="457200" indent="-457200">
+              <a:buFont typeface="+mj-lt"/>
+              <a:buAutoNum type="arabicPeriod"/>
+            </a:pPr>
+            <a:endParaRPr lang="it-IT" altLang="it-IT" sz="2000" dirty="0">
+              <a:latin typeface="Segoe UI" panose="020B0502040204020203" pitchFamily="34" charset="0"/>
+              <a:cs typeface="Segoe UI" panose="020B0502040204020203" pitchFamily="34" charset="0"/>
+            </a:endParaRPr>
           </a:p>
           <a:p>
             <a:pPr marL="285750" indent="-285750">
               <a:buFontTx/>
               <a:buChar char="-"/>
             </a:pPr>
-            <a:endParaRPr lang="it-IT" sz="2400" dirty="0">
-              <a:latin typeface="Segoe UI" panose="020B0502040204020203" pitchFamily="34" charset="0"/>
-              <a:cs typeface="Segoe UI" panose="020B0502040204020203" pitchFamily="34" charset="0"/>
-            </a:endParaRPr>
-          </a:p>
-          <a:p>
-            <a:pPr marL="285750" indent="-285750">
-              <a:buFontTx/>
-              <a:buChar char="-"/>
-            </a:pPr>
-            <a:endParaRPr lang="it-IT" sz="2400" dirty="0">
+            <a:endParaRPr lang="it-IT" sz="2000" dirty="0">
               <a:latin typeface="Segoe UI" panose="020B0502040204020203" pitchFamily="34" charset="0"/>
               <a:cs typeface="Segoe UI" panose="020B0502040204020203" pitchFamily="34" charset="0"/>
             </a:endParaRPr>
@@ -3169,7 +5125,7 @@
     </p:spTree>
     <p:extLst>
       <p:ext uri="{BB962C8B-B14F-4D97-AF65-F5344CB8AC3E}">
-        <p14:creationId xmlns:p14="http://schemas.microsoft.com/office/powerpoint/2010/main" val="1263005583"/>
+        <p14:creationId xmlns:p14="http://schemas.microsoft.com/office/powerpoint/2010/main" val="26372625"/>
       </p:ext>
     </p:extLst>
   </p:cSld>
@@ -3229,7 +5185,7 @@
                 <a:latin typeface="Segoe UI" panose="020B0502040204020203" pitchFamily="34" charset="0"/>
                 <a:cs typeface="Segoe UI" panose="020B0502040204020203" pitchFamily="34" charset="0"/>
               </a:rPr>
-              <a:t>Results and conclusion</a:t>
+              <a:t>FA (False Alarm) Study - Results</a:t>
             </a:r>
           </a:p>
         </p:txBody>
@@ -3284,8 +5240,8 @@
         </p:nvSpPr>
         <p:spPr>
           <a:xfrm>
-            <a:off x="446809" y="1433945"/>
-            <a:ext cx="8343900" cy="1200329"/>
+            <a:off x="400050" y="2168211"/>
+            <a:ext cx="8343900" cy="3170099"/>
           </a:xfrm>
           <a:prstGeom prst="rect">
             <a:avLst/>
@@ -3298,34 +5254,117 @@
           </a:bodyPr>
           <a:lstStyle/>
           <a:p>
+            <a:r>
+              <a:rPr lang="it-IT" altLang="it-IT" sz="2000" dirty="0">
+                <a:latin typeface="Segoe UI" panose="020B0502040204020203" pitchFamily="34" charset="0"/>
+                <a:cs typeface="Segoe UI" panose="020B0502040204020203" pitchFamily="34" charset="0"/>
+              </a:rPr>
+              <a:t>This simulation </a:t>
+            </a:r>
+            <a:r>
+              <a:rPr lang="it-IT" altLang="it-IT" sz="2000" dirty="0" err="1">
+                <a:latin typeface="Segoe UI" panose="020B0502040204020203" pitchFamily="34" charset="0"/>
+                <a:cs typeface="Segoe UI" panose="020B0502040204020203" pitchFamily="34" charset="0"/>
+              </a:rPr>
+              <a:t>reported</a:t>
+            </a:r>
+            <a:r>
+              <a:rPr lang="it-IT" altLang="it-IT" sz="2000" dirty="0">
+                <a:latin typeface="Segoe UI" panose="020B0502040204020203" pitchFamily="34" charset="0"/>
+                <a:cs typeface="Segoe UI" panose="020B0502040204020203" pitchFamily="34" charset="0"/>
+              </a:rPr>
+              <a:t> the following results:</a:t>
+            </a:r>
+          </a:p>
+          <a:p>
+            <a:endParaRPr lang="it-IT" altLang="it-IT" sz="2000" dirty="0">
+              <a:latin typeface="Segoe UI" panose="020B0502040204020203" pitchFamily="34" charset="0"/>
+              <a:cs typeface="Segoe UI" panose="020B0502040204020203" pitchFamily="34" charset="0"/>
+            </a:endParaRPr>
+          </a:p>
+          <a:p>
+            <a:pPr marL="342900" indent="-342900">
+              <a:buFont typeface="Arial" panose="020B0604020202020204" pitchFamily="34" charset="0"/>
+              <a:buChar char="•"/>
+            </a:pPr>
+            <a:r>
+              <a:rPr lang="it-IT" altLang="it-IT" sz="2000" dirty="0">
+                <a:latin typeface="Segoe UI" panose="020B0502040204020203" pitchFamily="34" charset="0"/>
+                <a:cs typeface="Segoe UI" panose="020B0502040204020203" pitchFamily="34" charset="0"/>
+              </a:rPr>
+              <a:t>Observed 0% false alarm rate </a:t>
+            </a:r>
+            <a:r>
+              <a:rPr lang="it-IT" altLang="it-IT" sz="2000" dirty="0" err="1">
+                <a:latin typeface="Segoe UI" panose="020B0502040204020203" pitchFamily="34" charset="0"/>
+                <a:cs typeface="Segoe UI" panose="020B0502040204020203" pitchFamily="34" charset="0"/>
+              </a:rPr>
+              <a:t>across</a:t>
+            </a:r>
+            <a:r>
+              <a:rPr lang="it-IT" altLang="it-IT" sz="2000" dirty="0">
+                <a:latin typeface="Segoe UI" panose="020B0502040204020203" pitchFamily="34" charset="0"/>
+                <a:cs typeface="Segoe UI" panose="020B0502040204020203" pitchFamily="34" charset="0"/>
+              </a:rPr>
+              <a:t> all distance-SNR pairs</a:t>
+            </a:r>
+          </a:p>
+          <a:p>
+            <a:pPr marL="342900" indent="-342900">
+              <a:buFont typeface="Arial" panose="020B0604020202020204" pitchFamily="34" charset="0"/>
+              <a:buChar char="•"/>
+            </a:pPr>
+            <a:endParaRPr lang="it-IT" altLang="it-IT" sz="2000" dirty="0">
+              <a:latin typeface="Segoe UI" panose="020B0502040204020203" pitchFamily="34" charset="0"/>
+              <a:cs typeface="Segoe UI" panose="020B0502040204020203" pitchFamily="34" charset="0"/>
+            </a:endParaRPr>
+          </a:p>
+          <a:p>
+            <a:pPr marL="342900" indent="-342900">
+              <a:buFont typeface="Arial" panose="020B0604020202020204" pitchFamily="34" charset="0"/>
+              <a:buChar char="•"/>
+            </a:pPr>
+            <a:r>
+              <a:rPr lang="en-US" altLang="it-IT" sz="2000" dirty="0">
+                <a:latin typeface="Segoe UI" panose="020B0502040204020203" pitchFamily="34" charset="0"/>
+                <a:cs typeface="Segoe UI" panose="020B0502040204020203" pitchFamily="34" charset="0"/>
+              </a:rPr>
+              <a:t>Variable decoding algorithm effectively kept key bit errors below the set threshold</a:t>
+            </a:r>
+          </a:p>
+          <a:p>
+            <a:pPr marL="342900" indent="-342900">
+              <a:buFont typeface="Arial" panose="020B0604020202020204" pitchFamily="34" charset="0"/>
+              <a:buChar char="•"/>
+            </a:pPr>
+            <a:endParaRPr lang="en-US" altLang="it-IT" sz="2000" dirty="0">
+              <a:latin typeface="Segoe UI" panose="020B0502040204020203" pitchFamily="34" charset="0"/>
+              <a:cs typeface="Segoe UI" panose="020B0502040204020203" pitchFamily="34" charset="0"/>
+            </a:endParaRPr>
+          </a:p>
+          <a:p>
+            <a:pPr marL="342900" indent="-342900">
+              <a:buFont typeface="Arial" panose="020B0604020202020204" pitchFamily="34" charset="0"/>
+              <a:buChar char="•"/>
+            </a:pPr>
+            <a:r>
+              <a:rPr lang="en-US" altLang="it-IT" sz="2000" dirty="0">
+                <a:latin typeface="Segoe UI" panose="020B0502040204020203" pitchFamily="34" charset="0"/>
+                <a:cs typeface="Segoe UI" panose="020B0502040204020203" pitchFamily="34" charset="0"/>
+              </a:rPr>
+              <a:t>Results validated the effectiveness of the tolerance and the decoding algorithm chosen</a:t>
+            </a:r>
+            <a:endParaRPr lang="it-IT" altLang="it-IT" sz="2000" dirty="0">
+              <a:latin typeface="Segoe UI" panose="020B0502040204020203" pitchFamily="34" charset="0"/>
+              <a:cs typeface="Segoe UI" panose="020B0502040204020203" pitchFamily="34" charset="0"/>
+            </a:endParaRPr>
+          </a:p>
+          <a:p>
             <a:pPr marL="285750" indent="-285750">
               <a:buFontTx/>
               <a:buChar char="-"/>
             </a:pPr>
-            <a:r>
-              <a:rPr lang="it-IT" sz="2400" dirty="0">
-                <a:latin typeface="Segoe UI" panose="020B0502040204020203" pitchFamily="34" charset="0"/>
-                <a:cs typeface="Segoe UI" panose="020B0502040204020203" pitchFamily="34" charset="0"/>
-              </a:rPr>
-              <a:t>aaa</a:t>
-            </a:r>
-          </a:p>
-          <a:p>
-            <a:pPr marL="285750" indent="-285750">
-              <a:buFontTx/>
-              <a:buChar char="-"/>
-            </a:pPr>
-            <a:endParaRPr lang="it-IT" sz="2400" dirty="0">
-              <a:latin typeface="Segoe UI" panose="020B0502040204020203" pitchFamily="34" charset="0"/>
-              <a:cs typeface="Segoe UI" panose="020B0502040204020203" pitchFamily="34" charset="0"/>
-            </a:endParaRPr>
-          </a:p>
-          <a:p>
-            <a:pPr marL="285750" indent="-285750">
-              <a:buFontTx/>
-              <a:buChar char="-"/>
-            </a:pPr>
-            <a:endParaRPr lang="it-IT" sz="2400" dirty="0">
+            <a:endParaRPr lang="it-IT" sz="2000" dirty="0">
               <a:latin typeface="Segoe UI" panose="020B0502040204020203" pitchFamily="34" charset="0"/>
               <a:cs typeface="Segoe UI" panose="020B0502040204020203" pitchFamily="34" charset="0"/>
             </a:endParaRPr>
@@ -3335,7 +5374,7 @@
     </p:spTree>
     <p:extLst>
       <p:ext uri="{BB962C8B-B14F-4D97-AF65-F5344CB8AC3E}">
-        <p14:creationId xmlns:p14="http://schemas.microsoft.com/office/powerpoint/2010/main" val="496337869"/>
+        <p14:creationId xmlns:p14="http://schemas.microsoft.com/office/powerpoint/2010/main" val="335616924"/>
       </p:ext>
     </p:extLst>
   </p:cSld>

</xml_diff>

<commit_message>
Minimal edits to slides
- Added some good figures + shapes
- Removed useless slide
- Added page numbers
</commit_message>
<xml_diff>
--- a/Third Part - Physical Layer Device Authentication/Slides/PLA Bluetooth Environment.pptx
+++ b/Third Part - Physical Layer Device Authentication/Slides/PLA Bluetooth Environment.pptx
@@ -5,7 +5,7 @@
     <p:sldMasterId id="2147483660" r:id="rId1"/>
   </p:sldMasterIdLst>
   <p:notesMasterIdLst>
-    <p:notesMasterId r:id="rId14"/>
+    <p:notesMasterId r:id="rId13"/>
   </p:notesMasterIdLst>
   <p:sldIdLst>
     <p:sldId id="256" r:id="rId2"/>
@@ -14,12 +14,11 @@
     <p:sldId id="260" r:id="rId5"/>
     <p:sldId id="261" r:id="rId6"/>
     <p:sldId id="262" r:id="rId7"/>
-    <p:sldId id="268" r:id="rId8"/>
-    <p:sldId id="263" r:id="rId9"/>
-    <p:sldId id="266" r:id="rId10"/>
-    <p:sldId id="264" r:id="rId11"/>
-    <p:sldId id="267" r:id="rId12"/>
-    <p:sldId id="265" r:id="rId13"/>
+    <p:sldId id="263" r:id="rId8"/>
+    <p:sldId id="266" r:id="rId9"/>
+    <p:sldId id="264" r:id="rId10"/>
+    <p:sldId id="267" r:id="rId11"/>
+    <p:sldId id="265" r:id="rId12"/>
   </p:sldIdLst>
   <p:sldSz cx="9144000" cy="6858000" type="screen4x3"/>
   <p:notesSz cx="6858000" cy="9144000"/>
@@ -208,7 +207,7 @@
           <a:p>
             <a:fld id="{0E4AAC6D-2322-45B9-8ECA-34DF280B0776}" type="datetimeFigureOut">
               <a:rPr lang="en-US" smtClean="0"/>
-              <a:t>6/14/2024</a:t>
+              <a:t>6/18/2024</a:t>
             </a:fld>
             <a:endParaRPr lang="en-US"/>
           </a:p>
@@ -1938,11 +1937,11 @@
           <a:lstStyle/>
           <a:p>
             <a:r>
-              <a:rPr lang="en-US" sz="3600" dirty="0">
-                <a:latin typeface="Segoe UI" panose="020B0502040204020203" pitchFamily="34" charset="0"/>
-                <a:cs typeface="Segoe UI" panose="020B0502040204020203" pitchFamily="34" charset="0"/>
-              </a:rPr>
-              <a:t>MD (Miss Detection) Study</a:t>
+              <a:rPr lang="en-US" sz="3200" dirty="0">
+                <a:latin typeface="Segoe UI" panose="020B0502040204020203" pitchFamily="34" charset="0"/>
+                <a:cs typeface="Segoe UI" panose="020B0502040204020203" pitchFamily="34" charset="0"/>
+              </a:rPr>
+              <a:t>MD (Miss Detection) Study - Results</a:t>
             </a:r>
           </a:p>
         </p:txBody>
@@ -1978,17 +1977,17 @@
                 <a:latin typeface="Segoe UI" panose="020B0502040204020203" pitchFamily="34" charset="0"/>
                 <a:cs typeface="Segoe UI" panose="020B0502040204020203" pitchFamily="34" charset="0"/>
               </a:rPr>
-              <a:t>PLA Bluetooth Environment– 2/N</a:t>
+              <a:t>PLA Bluetooth Environment– 10/11</a:t>
             </a:r>
           </a:p>
         </p:txBody>
       </p:sp>
       <p:sp>
         <p:nvSpPr>
-          <p:cNvPr id="7" name="CasellaDiTesto 6">
+          <p:cNvPr id="3" name="CasellaDiTesto 2">
             <a:extLst>
               <a:ext uri="{FF2B5EF4-FFF2-40B4-BE49-F238E27FC236}">
-                <a16:creationId xmlns:a16="http://schemas.microsoft.com/office/drawing/2014/main" id="{3D360244-5C2D-E0AE-5CC8-59298765925D}"/>
+                <a16:creationId xmlns:a16="http://schemas.microsoft.com/office/drawing/2014/main" id="{F4F05D58-B23C-429D-2F53-355F728B29DF}"/>
               </a:ext>
             </a:extLst>
           </p:cNvPr>
@@ -1997,8 +1996,8 @@
         </p:nvSpPr>
         <p:spPr>
           <a:xfrm>
-            <a:off x="426307" y="1994746"/>
-            <a:ext cx="8291385" cy="3785652"/>
+            <a:off x="400050" y="2168211"/>
+            <a:ext cx="8343900" cy="3170099"/>
           </a:xfrm>
           <a:prstGeom prst="rect">
             <a:avLst/>
@@ -2006,116 +2005,217 @@
           <a:noFill/>
         </p:spPr>
         <p:txBody>
-          <a:bodyPr wrap="square">
+          <a:bodyPr wrap="square" rtlCol="0">
             <a:spAutoFit/>
           </a:bodyPr>
           <a:lstStyle/>
           <a:p>
             <a:r>
-              <a:rPr lang="it-IT" sz="2000" u="sng" dirty="0">
-                <a:latin typeface="Segoe UI" panose="020B0502040204020203" pitchFamily="34" charset="0"/>
-                <a:cs typeface="Segoe UI" panose="020B0502040204020203" pitchFamily="34" charset="0"/>
-              </a:rPr>
-              <a:t>Miss Detection</a:t>
-            </a:r>
-            <a:r>
-              <a:rPr lang="it-IT" sz="2000" dirty="0">
-                <a:latin typeface="Segoe UI" panose="020B0502040204020203" pitchFamily="34" charset="0"/>
-                <a:cs typeface="Segoe UI" panose="020B0502040204020203" pitchFamily="34" charset="0"/>
-              </a:rPr>
-              <a:t>: only </a:t>
-            </a:r>
-            <a:r>
-              <a:rPr lang="it-IT" sz="2000" i="1" dirty="0">
-                <a:latin typeface="Segoe UI" panose="020B0502040204020203" pitchFamily="34" charset="0"/>
-                <a:cs typeface="Segoe UI" panose="020B0502040204020203" pitchFamily="34" charset="0"/>
-              </a:rPr>
-              <a:t>non-</a:t>
-            </a:r>
-            <a:r>
-              <a:rPr lang="it-IT" sz="2000" i="1" dirty="0" err="1">
-                <a:latin typeface="Segoe UI" panose="020B0502040204020203" pitchFamily="34" charset="0"/>
-                <a:cs typeface="Segoe UI" panose="020B0502040204020203" pitchFamily="34" charset="0"/>
-              </a:rPr>
-              <a:t>authenticate</a:t>
-            </a:r>
-            <a:r>
-              <a:rPr lang="it-IT" sz="2000" dirty="0">
+              <a:rPr lang="it-IT" altLang="it-IT" sz="2000" dirty="0">
+                <a:latin typeface="Segoe UI" panose="020B0502040204020203" pitchFamily="34" charset="0"/>
+                <a:cs typeface="Segoe UI" panose="020B0502040204020203" pitchFamily="34" charset="0"/>
+              </a:rPr>
+              <a:t>This simulation </a:t>
+            </a:r>
+            <a:r>
+              <a:rPr lang="it-IT" altLang="it-IT" sz="2000" dirty="0" err="1">
+                <a:latin typeface="Segoe UI" panose="020B0502040204020203" pitchFamily="34" charset="0"/>
+                <a:cs typeface="Segoe UI" panose="020B0502040204020203" pitchFamily="34" charset="0"/>
+              </a:rPr>
+              <a:t>reported</a:t>
+            </a:r>
+            <a:r>
+              <a:rPr lang="it-IT" altLang="it-IT" sz="2000" dirty="0">
+                <a:latin typeface="Segoe UI" panose="020B0502040204020203" pitchFamily="34" charset="0"/>
+                <a:cs typeface="Segoe UI" panose="020B0502040204020203" pitchFamily="34" charset="0"/>
+              </a:rPr>
+              <a:t> the following results:</a:t>
+            </a:r>
+          </a:p>
+          <a:p>
+            <a:endParaRPr lang="it-IT" altLang="it-IT" sz="2000" dirty="0">
+              <a:latin typeface="Segoe UI" panose="020B0502040204020203" pitchFamily="34" charset="0"/>
+              <a:cs typeface="Segoe UI" panose="020B0502040204020203" pitchFamily="34" charset="0"/>
+            </a:endParaRPr>
+          </a:p>
+          <a:p>
+            <a:pPr marL="342900" indent="-342900">
+              <a:buFont typeface="Arial" panose="020B0604020202020204" pitchFamily="34" charset="0"/>
+              <a:buChar char="•"/>
+            </a:pPr>
+            <a:r>
+              <a:rPr lang="it-IT" altLang="it-IT" sz="2000" dirty="0">
+                <a:latin typeface="Segoe UI" panose="020B0502040204020203" pitchFamily="34" charset="0"/>
+                <a:cs typeface="Segoe UI" panose="020B0502040204020203" pitchFamily="34" charset="0"/>
+              </a:rPr>
+              <a:t>Miss detection rates </a:t>
+            </a:r>
+            <a:r>
+              <a:rPr lang="it-IT" altLang="it-IT" sz="2000" dirty="0" err="1">
+                <a:latin typeface="Segoe UI" panose="020B0502040204020203" pitchFamily="34" charset="0"/>
+                <a:cs typeface="Segoe UI" panose="020B0502040204020203" pitchFamily="34" charset="0"/>
+              </a:rPr>
+              <a:t>varies</a:t>
+            </a:r>
+            <a:r>
+              <a:rPr lang="it-IT" altLang="it-IT" sz="2000" dirty="0">
+                <a:latin typeface="Segoe UI" panose="020B0502040204020203" pitchFamily="34" charset="0"/>
+                <a:cs typeface="Segoe UI" panose="020B0502040204020203" pitchFamily="34" charset="0"/>
+              </a:rPr>
+              <a:t> between 20% and 35% </a:t>
+            </a:r>
+            <a:r>
+              <a:rPr lang="it-IT" altLang="it-IT" sz="2000" dirty="0" err="1">
+                <a:latin typeface="Segoe UI" panose="020B0502040204020203" pitchFamily="34" charset="0"/>
+                <a:cs typeface="Segoe UI" panose="020B0502040204020203" pitchFamily="34" charset="0"/>
+              </a:rPr>
+              <a:t>across</a:t>
+            </a:r>
+            <a:r>
+              <a:rPr lang="it-IT" altLang="it-IT" sz="2000" dirty="0">
                 <a:latin typeface="Segoe UI" panose="020B0502040204020203" pitchFamily="34" charset="0"/>
                 <a:cs typeface="Segoe UI" panose="020B0502040204020203" pitchFamily="34" charset="0"/>
               </a:rPr>
               <a:t> </a:t>
             </a:r>
             <a:r>
-              <a:rPr lang="it-IT" sz="2000" dirty="0" err="1">
+              <a:rPr lang="it-IT" altLang="it-IT" sz="2000" dirty="0" err="1">
+                <a:latin typeface="Segoe UI" panose="020B0502040204020203" pitchFamily="34" charset="0"/>
+                <a:cs typeface="Segoe UI" panose="020B0502040204020203" pitchFamily="34" charset="0"/>
+              </a:rPr>
+              <a:t>simulations</a:t>
+            </a:r>
+            <a:endParaRPr lang="it-IT" altLang="it-IT" sz="2000" dirty="0">
+              <a:latin typeface="Segoe UI" panose="020B0502040204020203" pitchFamily="34" charset="0"/>
+              <a:cs typeface="Segoe UI" panose="020B0502040204020203" pitchFamily="34" charset="0"/>
+            </a:endParaRPr>
+          </a:p>
+          <a:p>
+            <a:pPr marL="342900" indent="-342900">
+              <a:buFont typeface="Arial" panose="020B0604020202020204" pitchFamily="34" charset="0"/>
+              <a:buChar char="•"/>
+            </a:pPr>
+            <a:endParaRPr lang="it-IT" altLang="it-IT" sz="2000" dirty="0">
+              <a:latin typeface="Segoe UI" panose="020B0502040204020203" pitchFamily="34" charset="0"/>
+              <a:cs typeface="Segoe UI" panose="020B0502040204020203" pitchFamily="34" charset="0"/>
+            </a:endParaRPr>
+          </a:p>
+          <a:p>
+            <a:pPr marL="342900" indent="-342900">
+              <a:buFont typeface="Arial" panose="020B0604020202020204" pitchFamily="34" charset="0"/>
+              <a:buChar char="•"/>
+            </a:pPr>
+            <a:r>
+              <a:rPr lang="en-US" altLang="it-IT" sz="2000" dirty="0">
+                <a:latin typeface="Segoe UI" panose="020B0502040204020203" pitchFamily="34" charset="0"/>
+                <a:cs typeface="Segoe UI" panose="020B0502040204020203" pitchFamily="34" charset="0"/>
+              </a:rPr>
+              <a:t>Attacker unable to reconstruct messages perfectly due to partial knowledge of transmission powers</a:t>
+            </a:r>
+          </a:p>
+          <a:p>
+            <a:pPr marL="342900" indent="-342900">
+              <a:buFont typeface="Arial" panose="020B0604020202020204" pitchFamily="34" charset="0"/>
+              <a:buChar char="•"/>
+            </a:pPr>
+            <a:endParaRPr lang="en-US" altLang="it-IT" sz="2000" dirty="0">
+              <a:latin typeface="Segoe UI" panose="020B0502040204020203" pitchFamily="34" charset="0"/>
+              <a:cs typeface="Segoe UI" panose="020B0502040204020203" pitchFamily="34" charset="0"/>
+            </a:endParaRPr>
+          </a:p>
+          <a:p>
+            <a:pPr marL="342900" indent="-342900">
+              <a:buFont typeface="Arial" panose="020B0604020202020204" pitchFamily="34" charset="0"/>
+              <a:buChar char="•"/>
+            </a:pPr>
+            <a:r>
+              <a:rPr lang="it-IT" altLang="it-IT" sz="2000" dirty="0">
+                <a:latin typeface="Segoe UI" panose="020B0502040204020203" pitchFamily="34" charset="0"/>
+                <a:cs typeface="Segoe UI" panose="020B0502040204020203" pitchFamily="34" charset="0"/>
+              </a:rPr>
+              <a:t>Results </a:t>
+            </a:r>
+            <a:r>
+              <a:rPr lang="it-IT" altLang="it-IT" sz="2000" dirty="0" err="1">
+                <a:latin typeface="Segoe UI" panose="020B0502040204020203" pitchFamily="34" charset="0"/>
+                <a:cs typeface="Segoe UI" panose="020B0502040204020203" pitchFamily="34" charset="0"/>
+              </a:rPr>
+              <a:t>confirm</a:t>
+            </a:r>
+            <a:r>
+              <a:rPr lang="it-IT" altLang="it-IT" sz="2000" dirty="0">
+                <a:latin typeface="Segoe UI" panose="020B0502040204020203" pitchFamily="34" charset="0"/>
+                <a:cs typeface="Segoe UI" panose="020B0502040204020203" pitchFamily="34" charset="0"/>
+              </a:rPr>
+              <a:t> the solidity of the decoding methods, </a:t>
+            </a:r>
+            <a:r>
+              <a:rPr lang="it-IT" altLang="it-IT" sz="2000" dirty="0" err="1">
+                <a:latin typeface="Segoe UI" panose="020B0502040204020203" pitchFamily="34" charset="0"/>
+                <a:cs typeface="Segoe UI" panose="020B0502040204020203" pitchFamily="34" charset="0"/>
+              </a:rPr>
+              <a:t>able</a:t>
+            </a:r>
+            <a:r>
+              <a:rPr lang="it-IT" altLang="it-IT" sz="2000" dirty="0">
+                <a:latin typeface="Segoe UI" panose="020B0502040204020203" pitchFamily="34" charset="0"/>
+                <a:cs typeface="Segoe UI" panose="020B0502040204020203" pitchFamily="34" charset="0"/>
+              </a:rPr>
+              <a:t> to </a:t>
+            </a:r>
+            <a:r>
+              <a:rPr lang="it-IT" altLang="it-IT" sz="2000" dirty="0" err="1">
+                <a:latin typeface="Segoe UI" panose="020B0502040204020203" pitchFamily="34" charset="0"/>
+                <a:cs typeface="Segoe UI" panose="020B0502040204020203" pitchFamily="34" charset="0"/>
+              </a:rPr>
+              <a:t>detect</a:t>
+            </a:r>
+            <a:r>
+              <a:rPr lang="it-IT" altLang="it-IT" sz="2000" dirty="0">
+                <a:latin typeface="Segoe UI" panose="020B0502040204020203" pitchFamily="34" charset="0"/>
+                <a:cs typeface="Segoe UI" panose="020B0502040204020203" pitchFamily="34" charset="0"/>
+              </a:rPr>
+              <a:t> good </a:t>
+            </a:r>
+            <a:r>
+              <a:rPr lang="it-IT" altLang="it-IT" sz="2000" dirty="0" err="1">
+                <a:latin typeface="Segoe UI" panose="020B0502040204020203" pitchFamily="34" charset="0"/>
+                <a:cs typeface="Segoe UI" panose="020B0502040204020203" pitchFamily="34" charset="0"/>
+              </a:rPr>
+              <a:t>portions</a:t>
+            </a:r>
+            <a:r>
+              <a:rPr lang="it-IT" altLang="it-IT" sz="2000" dirty="0">
+                <a:latin typeface="Segoe UI" panose="020B0502040204020203" pitchFamily="34" charset="0"/>
+                <a:cs typeface="Segoe UI" panose="020B0502040204020203" pitchFamily="34" charset="0"/>
+              </a:rPr>
+              <a:t> of </a:t>
+            </a:r>
+            <a:r>
+              <a:rPr lang="it-IT" altLang="it-IT" sz="2000" dirty="0" err="1">
+                <a:latin typeface="Segoe UI" panose="020B0502040204020203" pitchFamily="34" charset="0"/>
+                <a:cs typeface="Segoe UI" panose="020B0502040204020203" pitchFamily="34" charset="0"/>
+              </a:rPr>
+              <a:t>invalid</a:t>
+            </a:r>
+            <a:r>
+              <a:rPr lang="it-IT" altLang="it-IT" sz="2000" dirty="0">
+                <a:latin typeface="Segoe UI" panose="020B0502040204020203" pitchFamily="34" charset="0"/>
+                <a:cs typeface="Segoe UI" panose="020B0502040204020203" pitchFamily="34" charset="0"/>
+              </a:rPr>
+              <a:t> </a:t>
+            </a:r>
+            <a:r>
+              <a:rPr lang="it-IT" altLang="it-IT" sz="2000" dirty="0" err="1">
                 <a:latin typeface="Segoe UI" panose="020B0502040204020203" pitchFamily="34" charset="0"/>
                 <a:cs typeface="Segoe UI" panose="020B0502040204020203" pitchFamily="34" charset="0"/>
               </a:rPr>
               <a:t>messages</a:t>
             </a:r>
-            <a:r>
-              <a:rPr lang="it-IT" sz="2000" dirty="0">
-                <a:latin typeface="Segoe UI" panose="020B0502040204020203" pitchFamily="34" charset="0"/>
-                <a:cs typeface="Segoe UI" panose="020B0502040204020203" pitchFamily="34" charset="0"/>
-              </a:rPr>
-              <a:t> are </a:t>
-            </a:r>
-            <a:r>
-              <a:rPr lang="it-IT" sz="2000" dirty="0" err="1">
-                <a:latin typeface="Segoe UI" panose="020B0502040204020203" pitchFamily="34" charset="0"/>
-                <a:cs typeface="Segoe UI" panose="020B0502040204020203" pitchFamily="34" charset="0"/>
-              </a:rPr>
-              <a:t>sent</a:t>
-            </a:r>
-            <a:r>
-              <a:rPr lang="it-IT" sz="2000" dirty="0">
-                <a:latin typeface="Segoe UI" panose="020B0502040204020203" pitchFamily="34" charset="0"/>
-                <a:cs typeface="Segoe UI" panose="020B0502040204020203" pitchFamily="34" charset="0"/>
-              </a:rPr>
-              <a:t> and check how many of those are </a:t>
-            </a:r>
-            <a:r>
-              <a:rPr lang="it-IT" sz="2000" dirty="0" err="1">
-                <a:latin typeface="Segoe UI" panose="020B0502040204020203" pitchFamily="34" charset="0"/>
-                <a:cs typeface="Segoe UI" panose="020B0502040204020203" pitchFamily="34" charset="0"/>
-              </a:rPr>
-              <a:t>interpreted</a:t>
-            </a:r>
-            <a:r>
-              <a:rPr lang="it-IT" sz="2000" dirty="0">
-                <a:latin typeface="Segoe UI" panose="020B0502040204020203" pitchFamily="34" charset="0"/>
-                <a:cs typeface="Segoe UI" panose="020B0502040204020203" pitchFamily="34" charset="0"/>
-              </a:rPr>
-              <a:t> as </a:t>
-            </a:r>
-            <a:r>
-              <a:rPr lang="it-IT" sz="2000" i="1" dirty="0" err="1">
-                <a:latin typeface="Segoe UI" panose="020B0502040204020203" pitchFamily="34" charset="0"/>
-                <a:cs typeface="Segoe UI" panose="020B0502040204020203" pitchFamily="34" charset="0"/>
-              </a:rPr>
-              <a:t>legitimate</a:t>
-            </a:r>
-            <a:r>
-              <a:rPr lang="it-IT" sz="2000" dirty="0">
-                <a:latin typeface="Segoe UI" panose="020B0502040204020203" pitchFamily="34" charset="0"/>
-                <a:cs typeface="Segoe UI" panose="020B0502040204020203" pitchFamily="34" charset="0"/>
-              </a:rPr>
-              <a:t> (false </a:t>
-            </a:r>
-            <a:r>
-              <a:rPr lang="it-IT" sz="2000" dirty="0" err="1">
-                <a:latin typeface="Segoe UI" panose="020B0502040204020203" pitchFamily="34" charset="0"/>
-                <a:cs typeface="Segoe UI" panose="020B0502040204020203" pitchFamily="34" charset="0"/>
-              </a:rPr>
-              <a:t>positives</a:t>
-            </a:r>
-            <a:r>
-              <a:rPr lang="it-IT" sz="2000" dirty="0">
-                <a:latin typeface="Segoe UI" panose="020B0502040204020203" pitchFamily="34" charset="0"/>
-                <a:cs typeface="Segoe UI" panose="020B0502040204020203" pitchFamily="34" charset="0"/>
-              </a:rPr>
-              <a:t>)</a:t>
-            </a:r>
+            <a:endParaRPr lang="it-IT" altLang="it-IT" sz="2000" dirty="0">
+              <a:latin typeface="Segoe UI" panose="020B0502040204020203" pitchFamily="34" charset="0"/>
+              <a:cs typeface="Segoe UI" panose="020B0502040204020203" pitchFamily="34" charset="0"/>
+            </a:endParaRPr>
           </a:p>
           <a:p>
             <a:pPr marL="285750" indent="-285750">
@@ -2126,245 +2226,13 @@
               <a:latin typeface="Segoe UI" panose="020B0502040204020203" pitchFamily="34" charset="0"/>
               <a:cs typeface="Segoe UI" panose="020B0502040204020203" pitchFamily="34" charset="0"/>
             </a:endParaRPr>
-          </a:p>
-          <a:p>
-            <a:r>
-              <a:rPr lang="it-IT" altLang="it-IT" sz="2000" u="sng" dirty="0">
-                <a:latin typeface="Segoe UI" panose="020B0502040204020203" pitchFamily="34" charset="0"/>
-                <a:cs typeface="Segoe UI" panose="020B0502040204020203" pitchFamily="34" charset="0"/>
-              </a:rPr>
-              <a:t>Parametrized</a:t>
-            </a:r>
-            <a:r>
-              <a:rPr lang="it-IT" altLang="it-IT" sz="2000" dirty="0">
-                <a:latin typeface="Segoe UI" panose="020B0502040204020203" pitchFamily="34" charset="0"/>
-                <a:cs typeface="Segoe UI" panose="020B0502040204020203" pitchFamily="34" charset="0"/>
-              </a:rPr>
-              <a:t> simulation to test the transmissions:</a:t>
-            </a:r>
-          </a:p>
-          <a:p>
-            <a:endParaRPr lang="it-IT" altLang="it-IT" sz="2000" dirty="0">
-              <a:latin typeface="Segoe UI" panose="020B0502040204020203" pitchFamily="34" charset="0"/>
-              <a:cs typeface="Segoe UI" panose="020B0502040204020203" pitchFamily="34" charset="0"/>
-            </a:endParaRPr>
-          </a:p>
-          <a:p>
-            <a:pPr marL="457200" indent="-457200">
-              <a:buFont typeface="+mj-lt"/>
-              <a:buAutoNum type="arabicPeriod"/>
-            </a:pPr>
-            <a:r>
-              <a:rPr lang="it-IT" altLang="it-IT" sz="2000" dirty="0" err="1">
-                <a:latin typeface="Segoe UI" panose="020B0502040204020203" pitchFamily="34" charset="0"/>
-                <a:cs typeface="Segoe UI" panose="020B0502040204020203" pitchFamily="34" charset="0"/>
-              </a:rPr>
-              <a:t>Varied</a:t>
-            </a:r>
-            <a:r>
-              <a:rPr lang="it-IT" altLang="it-IT" sz="2000" dirty="0">
-                <a:latin typeface="Segoe UI" panose="020B0502040204020203" pitchFamily="34" charset="0"/>
-                <a:cs typeface="Segoe UI" panose="020B0502040204020203" pitchFamily="34" charset="0"/>
-              </a:rPr>
-              <a:t> parameters as previous </a:t>
-            </a:r>
-            <a:r>
-              <a:rPr lang="it-IT" altLang="it-IT" sz="2000" dirty="0" err="1">
-                <a:latin typeface="Segoe UI" panose="020B0502040204020203" pitchFamily="34" charset="0"/>
-                <a:cs typeface="Segoe UI" panose="020B0502040204020203" pitchFamily="34" charset="0"/>
-              </a:rPr>
-              <a:t>configurations</a:t>
-            </a:r>
-            <a:r>
-              <a:rPr lang="it-IT" altLang="it-IT" sz="2000" dirty="0">
-                <a:latin typeface="Segoe UI" panose="020B0502040204020203" pitchFamily="34" charset="0"/>
-                <a:cs typeface="Segoe UI" panose="020B0502040204020203" pitchFamily="34" charset="0"/>
-              </a:rPr>
-              <a:t> </a:t>
-            </a:r>
-            <a:r>
-              <a:rPr lang="it-IT" altLang="it-IT" sz="2000" dirty="0" err="1">
-                <a:latin typeface="Segoe UI" panose="020B0502040204020203" pitchFamily="34" charset="0"/>
-                <a:cs typeface="Segoe UI" panose="020B0502040204020203" pitchFamily="34" charset="0"/>
-              </a:rPr>
-              <a:t>showed</a:t>
-            </a:r>
-            <a:endParaRPr lang="it-IT" altLang="it-IT" sz="2000" dirty="0">
-              <a:latin typeface="Segoe UI" panose="020B0502040204020203" pitchFamily="34" charset="0"/>
-              <a:cs typeface="Segoe UI" panose="020B0502040204020203" pitchFamily="34" charset="0"/>
-            </a:endParaRPr>
-          </a:p>
-          <a:p>
-            <a:pPr marL="457200" indent="-457200">
-              <a:buFont typeface="+mj-lt"/>
-              <a:buAutoNum type="arabicPeriod"/>
-            </a:pPr>
-            <a:endParaRPr lang="it-IT" altLang="it-IT" sz="2000" dirty="0">
-              <a:latin typeface="Segoe UI" panose="020B0502040204020203" pitchFamily="34" charset="0"/>
-              <a:cs typeface="Segoe UI" panose="020B0502040204020203" pitchFamily="34" charset="0"/>
-            </a:endParaRPr>
-          </a:p>
-          <a:p>
-            <a:pPr marL="457200" indent="-457200">
-              <a:buFont typeface="+mj-lt"/>
-              <a:buAutoNum type="arabicPeriod"/>
-            </a:pPr>
-            <a:r>
-              <a:rPr lang="it-IT" altLang="it-IT" sz="2000" dirty="0">
-                <a:latin typeface="Segoe UI" panose="020B0502040204020203" pitchFamily="34" charset="0"/>
-                <a:cs typeface="Segoe UI" panose="020B0502040204020203" pitchFamily="34" charset="0"/>
-              </a:rPr>
-              <a:t>Assumed </a:t>
-            </a:r>
-            <a:r>
-              <a:rPr lang="it-IT" altLang="it-IT" sz="2000" dirty="0" err="1">
-                <a:latin typeface="Segoe UI" panose="020B0502040204020203" pitchFamily="34" charset="0"/>
-                <a:cs typeface="Segoe UI" panose="020B0502040204020203" pitchFamily="34" charset="0"/>
-              </a:rPr>
-              <a:t>realistic</a:t>
-            </a:r>
-            <a:r>
-              <a:rPr lang="it-IT" altLang="it-IT" sz="2000" dirty="0">
-                <a:latin typeface="Segoe UI" panose="020B0502040204020203" pitchFamily="34" charset="0"/>
-                <a:cs typeface="Segoe UI" panose="020B0502040204020203" pitchFamily="34" charset="0"/>
-              </a:rPr>
-              <a:t> threat model: </a:t>
-            </a:r>
-            <a:r>
-              <a:rPr lang="it-IT" altLang="it-IT" sz="2000" dirty="0" err="1">
-                <a:latin typeface="Segoe UI" panose="020B0502040204020203" pitchFamily="34" charset="0"/>
-                <a:cs typeface="Segoe UI" panose="020B0502040204020203" pitchFamily="34" charset="0"/>
-              </a:rPr>
-              <a:t>attacker</a:t>
-            </a:r>
-            <a:r>
-              <a:rPr lang="it-IT" altLang="it-IT" sz="2000" dirty="0">
-                <a:latin typeface="Segoe UI" panose="020B0502040204020203" pitchFamily="34" charset="0"/>
-                <a:cs typeface="Segoe UI" panose="020B0502040204020203" pitchFamily="34" charset="0"/>
-              </a:rPr>
-              <a:t> </a:t>
-            </a:r>
-            <a:r>
-              <a:rPr lang="it-IT" altLang="it-IT" sz="2000" dirty="0" err="1">
-                <a:latin typeface="Segoe UI" panose="020B0502040204020203" pitchFamily="34" charset="0"/>
-                <a:cs typeface="Segoe UI" panose="020B0502040204020203" pitchFamily="34" charset="0"/>
-              </a:rPr>
-              <a:t>having</a:t>
-            </a:r>
-            <a:r>
-              <a:rPr lang="it-IT" altLang="it-IT" sz="2000" dirty="0">
-                <a:latin typeface="Segoe UI" panose="020B0502040204020203" pitchFamily="34" charset="0"/>
-                <a:cs typeface="Segoe UI" panose="020B0502040204020203" pitchFamily="34" charset="0"/>
-              </a:rPr>
-              <a:t> knowledge of channel </a:t>
-            </a:r>
-            <a:r>
-              <a:rPr lang="it-IT" altLang="it-IT" sz="2000" dirty="0" err="1">
-                <a:latin typeface="Segoe UI" panose="020B0502040204020203" pitchFamily="34" charset="0"/>
-                <a:cs typeface="Segoe UI" panose="020B0502040204020203" pitchFamily="34" charset="0"/>
-              </a:rPr>
-              <a:t>parameteres</a:t>
-            </a:r>
-            <a:r>
-              <a:rPr lang="it-IT" altLang="it-IT" sz="2000" dirty="0">
-                <a:latin typeface="Segoe UI" panose="020B0502040204020203" pitchFamily="34" charset="0"/>
-                <a:cs typeface="Segoe UI" panose="020B0502040204020203" pitchFamily="34" charset="0"/>
-              </a:rPr>
-              <a:t> and structure (MITM scenario)</a:t>
-            </a:r>
-          </a:p>
-          <a:p>
-            <a:pPr marL="457200" indent="-457200">
-              <a:buFont typeface="+mj-lt"/>
-              <a:buAutoNum type="arabicPeriod"/>
-            </a:pPr>
-            <a:endParaRPr lang="it-IT" altLang="it-IT" sz="2000" dirty="0">
-              <a:latin typeface="Segoe UI" panose="020B0502040204020203" pitchFamily="34" charset="0"/>
-              <a:cs typeface="Segoe UI" panose="020B0502040204020203" pitchFamily="34" charset="0"/>
-            </a:endParaRPr>
-          </a:p>
-          <a:p>
-            <a:pPr marL="457200" indent="-457200">
-              <a:buFont typeface="+mj-lt"/>
-              <a:buAutoNum type="arabicPeriod"/>
-            </a:pPr>
-            <a:r>
-              <a:rPr lang="it-IT" altLang="it-IT" sz="2000" dirty="0" err="1">
-                <a:latin typeface="Segoe UI" panose="020B0502040204020203" pitchFamily="34" charset="0"/>
-                <a:cs typeface="Segoe UI" panose="020B0502040204020203" pitchFamily="34" charset="0"/>
-              </a:rPr>
-              <a:t>Attacker</a:t>
-            </a:r>
-            <a:r>
-              <a:rPr lang="it-IT" altLang="it-IT" sz="2000" dirty="0">
-                <a:latin typeface="Segoe UI" panose="020B0502040204020203" pitchFamily="34" charset="0"/>
-                <a:cs typeface="Segoe UI" panose="020B0502040204020203" pitchFamily="34" charset="0"/>
-              </a:rPr>
-              <a:t> </a:t>
-            </a:r>
-            <a:r>
-              <a:rPr lang="it-IT" altLang="it-IT" sz="2000" dirty="0" err="1">
-                <a:latin typeface="Segoe UI" panose="020B0502040204020203" pitchFamily="34" charset="0"/>
-                <a:cs typeface="Segoe UI" panose="020B0502040204020203" pitchFamily="34" charset="0"/>
-              </a:rPr>
-              <a:t>trying</a:t>
-            </a:r>
-            <a:r>
-              <a:rPr lang="it-IT" altLang="it-IT" sz="2000" dirty="0">
-                <a:latin typeface="Segoe UI" panose="020B0502040204020203" pitchFamily="34" charset="0"/>
-                <a:cs typeface="Segoe UI" panose="020B0502040204020203" pitchFamily="34" charset="0"/>
-              </a:rPr>
-              <a:t> to decode signal based on </a:t>
-            </a:r>
-            <a:r>
-              <a:rPr lang="it-IT" altLang="it-IT" sz="2000" dirty="0" err="1">
-                <a:latin typeface="Segoe UI" panose="020B0502040204020203" pitchFamily="34" charset="0"/>
-                <a:cs typeface="Segoe UI" panose="020B0502040204020203" pitchFamily="34" charset="0"/>
-              </a:rPr>
-              <a:t>peaks</a:t>
-            </a:r>
-            <a:r>
-              <a:rPr lang="it-IT" altLang="it-IT" sz="2000" dirty="0">
-                <a:latin typeface="Segoe UI" panose="020B0502040204020203" pitchFamily="34" charset="0"/>
-                <a:cs typeface="Segoe UI" panose="020B0502040204020203" pitchFamily="34" charset="0"/>
-              </a:rPr>
-              <a:t> </a:t>
-            </a:r>
-            <a:r>
-              <a:rPr lang="it-IT" altLang="it-IT" sz="2000" dirty="0" err="1">
-                <a:latin typeface="Segoe UI" panose="020B0502040204020203" pitchFamily="34" charset="0"/>
-                <a:cs typeface="Segoe UI" panose="020B0502040204020203" pitchFamily="34" charset="0"/>
-              </a:rPr>
-              <a:t>similarly</a:t>
-            </a:r>
-            <a:r>
-              <a:rPr lang="it-IT" altLang="it-IT" sz="2000" dirty="0">
-                <a:latin typeface="Segoe UI" panose="020B0502040204020203" pitchFamily="34" charset="0"/>
-                <a:cs typeface="Segoe UI" panose="020B0502040204020203" pitchFamily="34" charset="0"/>
-              </a:rPr>
-              <a:t> to </a:t>
-            </a:r>
-            <a:r>
-              <a:rPr lang="it-IT" altLang="it-IT" sz="2000" dirty="0" err="1">
-                <a:latin typeface="Segoe UI" panose="020B0502040204020203" pitchFamily="34" charset="0"/>
-                <a:cs typeface="Segoe UI" panose="020B0502040204020203" pitchFamily="34" charset="0"/>
-              </a:rPr>
-              <a:t>legitimate</a:t>
-            </a:r>
-            <a:r>
-              <a:rPr lang="it-IT" altLang="it-IT" sz="2000" dirty="0">
-                <a:latin typeface="Segoe UI" panose="020B0502040204020203" pitchFamily="34" charset="0"/>
-                <a:cs typeface="Segoe UI" panose="020B0502040204020203" pitchFamily="34" charset="0"/>
-              </a:rPr>
-              <a:t> receiver</a:t>
-            </a:r>
           </a:p>
         </p:txBody>
       </p:sp>
     </p:spTree>
     <p:extLst>
       <p:ext uri="{BB962C8B-B14F-4D97-AF65-F5344CB8AC3E}">
-        <p14:creationId xmlns:p14="http://schemas.microsoft.com/office/powerpoint/2010/main" val="1263005583"/>
+        <p14:creationId xmlns:p14="http://schemas.microsoft.com/office/powerpoint/2010/main" val="3384419873"/>
       </p:ext>
     </p:extLst>
   </p:cSld>
@@ -2420,11 +2288,11 @@
           <a:lstStyle/>
           <a:p>
             <a:r>
-              <a:rPr lang="en-US" sz="3200" dirty="0">
-                <a:latin typeface="Segoe UI" panose="020B0502040204020203" pitchFamily="34" charset="0"/>
-                <a:cs typeface="Segoe UI" panose="020B0502040204020203" pitchFamily="34" charset="0"/>
-              </a:rPr>
-              <a:t>MD (Miss Detection) Study - Results</a:t>
+              <a:rPr lang="en-US" sz="3600" dirty="0">
+                <a:latin typeface="Segoe UI" panose="020B0502040204020203" pitchFamily="34" charset="0"/>
+                <a:cs typeface="Segoe UI" panose="020B0502040204020203" pitchFamily="34" charset="0"/>
+              </a:rPr>
+              <a:t>Conclusions &amp; Future Work</a:t>
             </a:r>
           </a:p>
         </p:txBody>
@@ -2460,358 +2328,7 @@
                 <a:latin typeface="Segoe UI" panose="020B0502040204020203" pitchFamily="34" charset="0"/>
                 <a:cs typeface="Segoe UI" panose="020B0502040204020203" pitchFamily="34" charset="0"/>
               </a:rPr>
-              <a:t>PLA Bluetooth Environment– 2/N</a:t>
-            </a:r>
-          </a:p>
-        </p:txBody>
-      </p:sp>
-      <p:sp>
-        <p:nvSpPr>
-          <p:cNvPr id="3" name="CasellaDiTesto 2">
-            <a:extLst>
-              <a:ext uri="{FF2B5EF4-FFF2-40B4-BE49-F238E27FC236}">
-                <a16:creationId xmlns:a16="http://schemas.microsoft.com/office/drawing/2014/main" id="{F4F05D58-B23C-429D-2F53-355F728B29DF}"/>
-              </a:ext>
-            </a:extLst>
-          </p:cNvPr>
-          <p:cNvSpPr txBox="1"/>
-          <p:nvPr/>
-        </p:nvSpPr>
-        <p:spPr>
-          <a:xfrm>
-            <a:off x="400050" y="2168211"/>
-            <a:ext cx="8343900" cy="3170099"/>
-          </a:xfrm>
-          <a:prstGeom prst="rect">
-            <a:avLst/>
-          </a:prstGeom>
-          <a:noFill/>
-        </p:spPr>
-        <p:txBody>
-          <a:bodyPr wrap="square" rtlCol="0">
-            <a:spAutoFit/>
-          </a:bodyPr>
-          <a:lstStyle/>
-          <a:p>
-            <a:r>
-              <a:rPr lang="it-IT" altLang="it-IT" sz="2000" dirty="0">
-                <a:latin typeface="Segoe UI" panose="020B0502040204020203" pitchFamily="34" charset="0"/>
-                <a:cs typeface="Segoe UI" panose="020B0502040204020203" pitchFamily="34" charset="0"/>
-              </a:rPr>
-              <a:t>This simulation </a:t>
-            </a:r>
-            <a:r>
-              <a:rPr lang="it-IT" altLang="it-IT" sz="2000" dirty="0" err="1">
-                <a:latin typeface="Segoe UI" panose="020B0502040204020203" pitchFamily="34" charset="0"/>
-                <a:cs typeface="Segoe UI" panose="020B0502040204020203" pitchFamily="34" charset="0"/>
-              </a:rPr>
-              <a:t>reported</a:t>
-            </a:r>
-            <a:r>
-              <a:rPr lang="it-IT" altLang="it-IT" sz="2000" dirty="0">
-                <a:latin typeface="Segoe UI" panose="020B0502040204020203" pitchFamily="34" charset="0"/>
-                <a:cs typeface="Segoe UI" panose="020B0502040204020203" pitchFamily="34" charset="0"/>
-              </a:rPr>
-              <a:t> the following results:</a:t>
-            </a:r>
-          </a:p>
-          <a:p>
-            <a:endParaRPr lang="it-IT" altLang="it-IT" sz="2000" dirty="0">
-              <a:latin typeface="Segoe UI" panose="020B0502040204020203" pitchFamily="34" charset="0"/>
-              <a:cs typeface="Segoe UI" panose="020B0502040204020203" pitchFamily="34" charset="0"/>
-            </a:endParaRPr>
-          </a:p>
-          <a:p>
-            <a:pPr marL="342900" indent="-342900">
-              <a:buFont typeface="Arial" panose="020B0604020202020204" pitchFamily="34" charset="0"/>
-              <a:buChar char="•"/>
-            </a:pPr>
-            <a:r>
-              <a:rPr lang="it-IT" altLang="it-IT" sz="2000" dirty="0">
-                <a:latin typeface="Segoe UI" panose="020B0502040204020203" pitchFamily="34" charset="0"/>
-                <a:cs typeface="Segoe UI" panose="020B0502040204020203" pitchFamily="34" charset="0"/>
-              </a:rPr>
-              <a:t>Miss detection rates </a:t>
-            </a:r>
-            <a:r>
-              <a:rPr lang="it-IT" altLang="it-IT" sz="2000" dirty="0" err="1">
-                <a:latin typeface="Segoe UI" panose="020B0502040204020203" pitchFamily="34" charset="0"/>
-                <a:cs typeface="Segoe UI" panose="020B0502040204020203" pitchFamily="34" charset="0"/>
-              </a:rPr>
-              <a:t>varies</a:t>
-            </a:r>
-            <a:r>
-              <a:rPr lang="it-IT" altLang="it-IT" sz="2000" dirty="0">
-                <a:latin typeface="Segoe UI" panose="020B0502040204020203" pitchFamily="34" charset="0"/>
-                <a:cs typeface="Segoe UI" panose="020B0502040204020203" pitchFamily="34" charset="0"/>
-              </a:rPr>
-              <a:t> between 20% and 35% </a:t>
-            </a:r>
-            <a:r>
-              <a:rPr lang="it-IT" altLang="it-IT" sz="2000" dirty="0" err="1">
-                <a:latin typeface="Segoe UI" panose="020B0502040204020203" pitchFamily="34" charset="0"/>
-                <a:cs typeface="Segoe UI" panose="020B0502040204020203" pitchFamily="34" charset="0"/>
-              </a:rPr>
-              <a:t>across</a:t>
-            </a:r>
-            <a:r>
-              <a:rPr lang="it-IT" altLang="it-IT" sz="2000" dirty="0">
-                <a:latin typeface="Segoe UI" panose="020B0502040204020203" pitchFamily="34" charset="0"/>
-                <a:cs typeface="Segoe UI" panose="020B0502040204020203" pitchFamily="34" charset="0"/>
-              </a:rPr>
-              <a:t> </a:t>
-            </a:r>
-            <a:r>
-              <a:rPr lang="it-IT" altLang="it-IT" sz="2000" dirty="0" err="1">
-                <a:latin typeface="Segoe UI" panose="020B0502040204020203" pitchFamily="34" charset="0"/>
-                <a:cs typeface="Segoe UI" panose="020B0502040204020203" pitchFamily="34" charset="0"/>
-              </a:rPr>
-              <a:t>simulations</a:t>
-            </a:r>
-            <a:endParaRPr lang="it-IT" altLang="it-IT" sz="2000" dirty="0">
-              <a:latin typeface="Segoe UI" panose="020B0502040204020203" pitchFamily="34" charset="0"/>
-              <a:cs typeface="Segoe UI" panose="020B0502040204020203" pitchFamily="34" charset="0"/>
-            </a:endParaRPr>
-          </a:p>
-          <a:p>
-            <a:pPr marL="342900" indent="-342900">
-              <a:buFont typeface="Arial" panose="020B0604020202020204" pitchFamily="34" charset="0"/>
-              <a:buChar char="•"/>
-            </a:pPr>
-            <a:endParaRPr lang="it-IT" altLang="it-IT" sz="2000" dirty="0">
-              <a:latin typeface="Segoe UI" panose="020B0502040204020203" pitchFamily="34" charset="0"/>
-              <a:cs typeface="Segoe UI" panose="020B0502040204020203" pitchFamily="34" charset="0"/>
-            </a:endParaRPr>
-          </a:p>
-          <a:p>
-            <a:pPr marL="342900" indent="-342900">
-              <a:buFont typeface="Arial" panose="020B0604020202020204" pitchFamily="34" charset="0"/>
-              <a:buChar char="•"/>
-            </a:pPr>
-            <a:r>
-              <a:rPr lang="en-US" altLang="it-IT" sz="2000" dirty="0">
-                <a:latin typeface="Segoe UI" panose="020B0502040204020203" pitchFamily="34" charset="0"/>
-                <a:cs typeface="Segoe UI" panose="020B0502040204020203" pitchFamily="34" charset="0"/>
-              </a:rPr>
-              <a:t>Attacker unable to reconstruct messages perfectly due to partial knowledge of transmission powers</a:t>
-            </a:r>
-          </a:p>
-          <a:p>
-            <a:pPr marL="342900" indent="-342900">
-              <a:buFont typeface="Arial" panose="020B0604020202020204" pitchFamily="34" charset="0"/>
-              <a:buChar char="•"/>
-            </a:pPr>
-            <a:endParaRPr lang="en-US" altLang="it-IT" sz="2000" dirty="0">
-              <a:latin typeface="Segoe UI" panose="020B0502040204020203" pitchFamily="34" charset="0"/>
-              <a:cs typeface="Segoe UI" panose="020B0502040204020203" pitchFamily="34" charset="0"/>
-            </a:endParaRPr>
-          </a:p>
-          <a:p>
-            <a:pPr marL="342900" indent="-342900">
-              <a:buFont typeface="Arial" panose="020B0604020202020204" pitchFamily="34" charset="0"/>
-              <a:buChar char="•"/>
-            </a:pPr>
-            <a:r>
-              <a:rPr lang="it-IT" altLang="it-IT" sz="2000" dirty="0">
-                <a:latin typeface="Segoe UI" panose="020B0502040204020203" pitchFamily="34" charset="0"/>
-                <a:cs typeface="Segoe UI" panose="020B0502040204020203" pitchFamily="34" charset="0"/>
-              </a:rPr>
-              <a:t>Results </a:t>
-            </a:r>
-            <a:r>
-              <a:rPr lang="it-IT" altLang="it-IT" sz="2000" dirty="0" err="1">
-                <a:latin typeface="Segoe UI" panose="020B0502040204020203" pitchFamily="34" charset="0"/>
-                <a:cs typeface="Segoe UI" panose="020B0502040204020203" pitchFamily="34" charset="0"/>
-              </a:rPr>
-              <a:t>confirm</a:t>
-            </a:r>
-            <a:r>
-              <a:rPr lang="it-IT" altLang="it-IT" sz="2000" dirty="0">
-                <a:latin typeface="Segoe UI" panose="020B0502040204020203" pitchFamily="34" charset="0"/>
-                <a:cs typeface="Segoe UI" panose="020B0502040204020203" pitchFamily="34" charset="0"/>
-              </a:rPr>
-              <a:t> the solidity of the decoding methods, </a:t>
-            </a:r>
-            <a:r>
-              <a:rPr lang="it-IT" altLang="it-IT" sz="2000" dirty="0" err="1">
-                <a:latin typeface="Segoe UI" panose="020B0502040204020203" pitchFamily="34" charset="0"/>
-                <a:cs typeface="Segoe UI" panose="020B0502040204020203" pitchFamily="34" charset="0"/>
-              </a:rPr>
-              <a:t>able</a:t>
-            </a:r>
-            <a:r>
-              <a:rPr lang="it-IT" altLang="it-IT" sz="2000" dirty="0">
-                <a:latin typeface="Segoe UI" panose="020B0502040204020203" pitchFamily="34" charset="0"/>
-                <a:cs typeface="Segoe UI" panose="020B0502040204020203" pitchFamily="34" charset="0"/>
-              </a:rPr>
-              <a:t> to </a:t>
-            </a:r>
-            <a:r>
-              <a:rPr lang="it-IT" altLang="it-IT" sz="2000" dirty="0" err="1">
-                <a:latin typeface="Segoe UI" panose="020B0502040204020203" pitchFamily="34" charset="0"/>
-                <a:cs typeface="Segoe UI" panose="020B0502040204020203" pitchFamily="34" charset="0"/>
-              </a:rPr>
-              <a:t>detect</a:t>
-            </a:r>
-            <a:r>
-              <a:rPr lang="it-IT" altLang="it-IT" sz="2000" dirty="0">
-                <a:latin typeface="Segoe UI" panose="020B0502040204020203" pitchFamily="34" charset="0"/>
-                <a:cs typeface="Segoe UI" panose="020B0502040204020203" pitchFamily="34" charset="0"/>
-              </a:rPr>
-              <a:t> good </a:t>
-            </a:r>
-            <a:r>
-              <a:rPr lang="it-IT" altLang="it-IT" sz="2000" dirty="0" err="1">
-                <a:latin typeface="Segoe UI" panose="020B0502040204020203" pitchFamily="34" charset="0"/>
-                <a:cs typeface="Segoe UI" panose="020B0502040204020203" pitchFamily="34" charset="0"/>
-              </a:rPr>
-              <a:t>portions</a:t>
-            </a:r>
-            <a:r>
-              <a:rPr lang="it-IT" altLang="it-IT" sz="2000" dirty="0">
-                <a:latin typeface="Segoe UI" panose="020B0502040204020203" pitchFamily="34" charset="0"/>
-                <a:cs typeface="Segoe UI" panose="020B0502040204020203" pitchFamily="34" charset="0"/>
-              </a:rPr>
-              <a:t> of </a:t>
-            </a:r>
-            <a:r>
-              <a:rPr lang="it-IT" altLang="it-IT" sz="2000" dirty="0" err="1">
-                <a:latin typeface="Segoe UI" panose="020B0502040204020203" pitchFamily="34" charset="0"/>
-                <a:cs typeface="Segoe UI" panose="020B0502040204020203" pitchFamily="34" charset="0"/>
-              </a:rPr>
-              <a:t>invalid</a:t>
-            </a:r>
-            <a:r>
-              <a:rPr lang="it-IT" altLang="it-IT" sz="2000" dirty="0">
-                <a:latin typeface="Segoe UI" panose="020B0502040204020203" pitchFamily="34" charset="0"/>
-                <a:cs typeface="Segoe UI" panose="020B0502040204020203" pitchFamily="34" charset="0"/>
-              </a:rPr>
-              <a:t> </a:t>
-            </a:r>
-            <a:r>
-              <a:rPr lang="it-IT" altLang="it-IT" sz="2000" dirty="0" err="1">
-                <a:latin typeface="Segoe UI" panose="020B0502040204020203" pitchFamily="34" charset="0"/>
-                <a:cs typeface="Segoe UI" panose="020B0502040204020203" pitchFamily="34" charset="0"/>
-              </a:rPr>
-              <a:t>messages</a:t>
-            </a:r>
-            <a:endParaRPr lang="it-IT" altLang="it-IT" sz="2000" dirty="0">
-              <a:latin typeface="Segoe UI" panose="020B0502040204020203" pitchFamily="34" charset="0"/>
-              <a:cs typeface="Segoe UI" panose="020B0502040204020203" pitchFamily="34" charset="0"/>
-            </a:endParaRPr>
-          </a:p>
-          <a:p>
-            <a:pPr marL="285750" indent="-285750">
-              <a:buFontTx/>
-              <a:buChar char="-"/>
-            </a:pPr>
-            <a:endParaRPr lang="it-IT" sz="2000" dirty="0">
-              <a:latin typeface="Segoe UI" panose="020B0502040204020203" pitchFamily="34" charset="0"/>
-              <a:cs typeface="Segoe UI" panose="020B0502040204020203" pitchFamily="34" charset="0"/>
-            </a:endParaRPr>
-          </a:p>
-        </p:txBody>
-      </p:sp>
-    </p:spTree>
-    <p:extLst>
-      <p:ext uri="{BB962C8B-B14F-4D97-AF65-F5344CB8AC3E}">
-        <p14:creationId xmlns:p14="http://schemas.microsoft.com/office/powerpoint/2010/main" val="3384419873"/>
-      </p:ext>
-    </p:extLst>
-  </p:cSld>
-  <p:clrMapOvr>
-    <a:masterClrMapping/>
-  </p:clrMapOvr>
-</p:sld>
-</file>
-
-<file path=ppt/slides/slide12.xml><?xml version="1.0" encoding="utf-8"?>
-<p:sld xmlns:a="http://schemas.openxmlformats.org/drawingml/2006/main" xmlns:r="http://schemas.openxmlformats.org/officeDocument/2006/relationships" xmlns:p="http://schemas.openxmlformats.org/presentationml/2006/main">
-  <p:cSld>
-    <p:spTree>
-      <p:nvGrpSpPr>
-        <p:cNvPr id="1" name=""/>
-        <p:cNvGrpSpPr/>
-        <p:nvPr/>
-      </p:nvGrpSpPr>
-      <p:grpSpPr>
-        <a:xfrm>
-          <a:off x="0" y="0"/>
-          <a:ext cx="0" cy="0"/>
-          <a:chOff x="0" y="0"/>
-          <a:chExt cx="0" cy="0"/>
-        </a:xfrm>
-      </p:grpSpPr>
-      <p:sp>
-        <p:nvSpPr>
-          <p:cNvPr id="2" name="Title 1">
-            <a:extLst>
-              <a:ext uri="{FF2B5EF4-FFF2-40B4-BE49-F238E27FC236}">
-                <a16:creationId xmlns:a16="http://schemas.microsoft.com/office/drawing/2014/main" id="{A20241D5-7C6B-45F6-9B01-BE455CD8AD0B}"/>
-              </a:ext>
-            </a:extLst>
-          </p:cNvPr>
-          <p:cNvSpPr>
-            <a:spLocks noGrp="1"/>
-          </p:cNvSpPr>
-          <p:nvPr>
-            <p:ph type="title"/>
-          </p:nvPr>
-        </p:nvSpPr>
-        <p:spPr>
-          <a:xfrm>
-            <a:off x="0" y="26902"/>
-            <a:ext cx="7061507" cy="1114425"/>
-          </a:xfrm>
-        </p:spPr>
-        <p:txBody>
-          <a:bodyPr>
-            <a:noAutofit/>
-          </a:bodyPr>
-          <a:lstStyle/>
-          <a:p>
-            <a:r>
-              <a:rPr lang="en-US" sz="3600" dirty="0">
-                <a:latin typeface="Segoe UI" panose="020B0502040204020203" pitchFamily="34" charset="0"/>
-                <a:cs typeface="Segoe UI" panose="020B0502040204020203" pitchFamily="34" charset="0"/>
-              </a:rPr>
-              <a:t>Conclusions &amp; Future Work</a:t>
-            </a:r>
-          </a:p>
-        </p:txBody>
-      </p:sp>
-      <p:sp>
-        <p:nvSpPr>
-          <p:cNvPr id="4" name="Slide Number Placeholder 3">
-            <a:extLst>
-              <a:ext uri="{FF2B5EF4-FFF2-40B4-BE49-F238E27FC236}">
-                <a16:creationId xmlns:a16="http://schemas.microsoft.com/office/drawing/2014/main" id="{0FD64D78-A03B-45A9-9177-047825E632C0}"/>
-              </a:ext>
-            </a:extLst>
-          </p:cNvPr>
-          <p:cNvSpPr>
-            <a:spLocks noGrp="1"/>
-          </p:cNvSpPr>
-          <p:nvPr>
-            <p:ph type="sldNum" sz="quarter" idx="4"/>
-          </p:nvPr>
-        </p:nvSpPr>
-        <p:spPr>
-          <a:xfrm>
-            <a:off x="6143105" y="6365195"/>
-            <a:ext cx="2841321" cy="365125"/>
-          </a:xfrm>
-        </p:spPr>
-        <p:txBody>
-          <a:bodyPr/>
-          <a:lstStyle/>
-          <a:p>
-            <a:r>
-              <a:rPr lang="en-US" sz="1200" dirty="0">
-                <a:latin typeface="Segoe UI" panose="020B0502040204020203" pitchFamily="34" charset="0"/>
-                <a:cs typeface="Segoe UI" panose="020B0502040204020203" pitchFamily="34" charset="0"/>
-              </a:rPr>
-              <a:t>PLA Bluetooth Environment– 2/N</a:t>
+              <a:t>PLA Bluetooth Environment– 11/11</a:t>
             </a:r>
           </a:p>
         </p:txBody>
@@ -3188,7 +2705,7 @@
                 <a:latin typeface="Segoe UI" panose="020B0502040204020203" pitchFamily="34" charset="0"/>
                 <a:cs typeface="Segoe UI" panose="020B0502040204020203" pitchFamily="34" charset="0"/>
               </a:rPr>
-              <a:t>PLA Bluetooth Environment– 2/N</a:t>
+              <a:t>PLA Bluetooth Environment– 2/11</a:t>
             </a:r>
           </a:p>
         </p:txBody>
@@ -3482,7 +2999,7 @@
                 <a:latin typeface="Segoe UI" panose="020B0502040204020203" pitchFamily="34" charset="0"/>
                 <a:cs typeface="Segoe UI" panose="020B0502040204020203" pitchFamily="34" charset="0"/>
               </a:rPr>
-              <a:t>PLA Bluetooth Environment– 2/N</a:t>
+              <a:t>PLA Bluetooth Environment– 3/11</a:t>
             </a:r>
           </a:p>
         </p:txBody>
@@ -3648,7 +3165,7 @@
                 <a:latin typeface="Segoe UI" panose="020B0502040204020203" pitchFamily="34" charset="0"/>
                 <a:cs typeface="Segoe UI" panose="020B0502040204020203" pitchFamily="34" charset="0"/>
               </a:rPr>
-              <a:t>PLA Bluetooth Environment– 2/N</a:t>
+              <a:t>PLA Bluetooth Environment– 4/11</a:t>
             </a:r>
           </a:p>
         </p:txBody>
@@ -3814,7 +3331,7 @@
                 <a:latin typeface="Segoe UI" panose="020B0502040204020203" pitchFamily="34" charset="0"/>
                 <a:cs typeface="Segoe UI" panose="020B0502040204020203" pitchFamily="34" charset="0"/>
               </a:rPr>
-              <a:t>PLA Bluetooth Environment– 2/N</a:t>
+              <a:t>PLA Bluetooth Environment– 5/11</a:t>
             </a:r>
           </a:p>
         </p:txBody>
@@ -3980,7 +3497,7 @@
                 <a:latin typeface="Segoe UI" panose="020B0502040204020203" pitchFamily="34" charset="0"/>
                 <a:cs typeface="Segoe UI" panose="020B0502040204020203" pitchFamily="34" charset="0"/>
               </a:rPr>
-              <a:t>PLA Bluetooth Environment– 2/N</a:t>
+              <a:t>PLA Bluetooth Environment– 6/12</a:t>
             </a:r>
           </a:p>
         </p:txBody>
@@ -4152,7 +3669,7 @@
               <a:t> </a:t>
             </a:r>
             <a:r>
-              <a:rPr lang="it-IT" altLang="it-IT" sz="2000" dirty="0" err="1">
+              <a:rPr lang="en-US" altLang="it-IT" sz="2000" dirty="0">
                 <a:latin typeface="Segoe UI" panose="020B0502040204020203" pitchFamily="34" charset="0"/>
                 <a:cs typeface="Segoe UI" panose="020B0502040204020203" pitchFamily="34" charset="0"/>
               </a:rPr>
@@ -4270,7 +3787,7 @@
               <a:tabLst/>
             </a:pPr>
             <a:r>
-              <a:rPr lang="it-IT" altLang="it-IT" sz="2000" dirty="0" err="1">
+              <a:rPr lang="en-US" altLang="it-IT" sz="2000" dirty="0">
                 <a:latin typeface="Segoe UI" panose="020B0502040204020203" pitchFamily="34" charset="0"/>
                 <a:cs typeface="Segoe UI" panose="020B0502040204020203" pitchFamily="34" charset="0"/>
               </a:rPr>
@@ -4581,11 +4098,11 @@
           <a:lstStyle/>
           <a:p>
             <a:r>
-              <a:rPr lang="en-US" sz="3200" dirty="0">
-                <a:latin typeface="Segoe UI" panose="020B0502040204020203" pitchFamily="34" charset="0"/>
-                <a:cs typeface="Segoe UI" panose="020B0502040204020203" pitchFamily="34" charset="0"/>
-              </a:rPr>
-              <a:t>False Alarm and Miss Detection Study</a:t>
+              <a:rPr lang="en-US" sz="3600" dirty="0">
+                <a:latin typeface="Segoe UI" panose="020B0502040204020203" pitchFamily="34" charset="0"/>
+                <a:cs typeface="Segoe UI" panose="020B0502040204020203" pitchFamily="34" charset="0"/>
+              </a:rPr>
+              <a:t>FA (False Alarm) Study</a:t>
             </a:r>
           </a:p>
         </p:txBody>
@@ -4621,22 +4138,333 @@
                 <a:latin typeface="Segoe UI" panose="020B0502040204020203" pitchFamily="34" charset="0"/>
                 <a:cs typeface="Segoe UI" panose="020B0502040204020203" pitchFamily="34" charset="0"/>
               </a:rPr>
-              <a:t>PLA Bluetooth Environment– 2/N</a:t>
-            </a:r>
+              <a:t>PLA Bluetooth Environment– 7/11</a:t>
+            </a:r>
+          </a:p>
+        </p:txBody>
+      </p:sp>
+      <p:sp>
+        <p:nvSpPr>
+          <p:cNvPr id="6" name="CasellaDiTesto 5">
+            <a:extLst>
+              <a:ext uri="{FF2B5EF4-FFF2-40B4-BE49-F238E27FC236}">
+                <a16:creationId xmlns:a16="http://schemas.microsoft.com/office/drawing/2014/main" id="{0C3825A1-BC2D-A575-E5DA-F3AAE95E3E9E}"/>
+              </a:ext>
+            </a:extLst>
+          </p:cNvPr>
+          <p:cNvSpPr txBox="1"/>
+          <p:nvPr/>
+        </p:nvSpPr>
+        <p:spPr>
+          <a:xfrm>
+            <a:off x="159574" y="1530999"/>
+            <a:ext cx="5759001" cy="5016758"/>
+          </a:xfrm>
+          <a:prstGeom prst="rect">
+            <a:avLst/>
+          </a:prstGeom>
+          <a:noFill/>
+        </p:spPr>
+        <p:txBody>
+          <a:bodyPr wrap="square" rtlCol="0">
+            <a:spAutoFit/>
+          </a:bodyPr>
+          <a:lstStyle/>
+          <a:p>
+            <a:r>
+              <a:rPr lang="it-IT" sz="2000" u="sng" dirty="0">
+                <a:latin typeface="Segoe UI" panose="020B0502040204020203" pitchFamily="34" charset="0"/>
+                <a:cs typeface="Segoe UI" panose="020B0502040204020203" pitchFamily="34" charset="0"/>
+              </a:rPr>
+              <a:t>False Alarm</a:t>
+            </a:r>
+            <a:r>
+              <a:rPr lang="it-IT" sz="2000" dirty="0">
+                <a:latin typeface="Segoe UI" panose="020B0502040204020203" pitchFamily="34" charset="0"/>
+                <a:cs typeface="Segoe UI" panose="020B0502040204020203" pitchFamily="34" charset="0"/>
+              </a:rPr>
+              <a:t>: only </a:t>
+            </a:r>
+            <a:r>
+              <a:rPr lang="it-IT" sz="2000" i="1" dirty="0" err="1">
+                <a:latin typeface="Segoe UI" panose="020B0502040204020203" pitchFamily="34" charset="0"/>
+                <a:cs typeface="Segoe UI" panose="020B0502040204020203" pitchFamily="34" charset="0"/>
+              </a:rPr>
+              <a:t>authenticate</a:t>
+            </a:r>
+            <a:r>
+              <a:rPr lang="it-IT" sz="2000" dirty="0">
+                <a:latin typeface="Segoe UI" panose="020B0502040204020203" pitchFamily="34" charset="0"/>
+                <a:cs typeface="Segoe UI" panose="020B0502040204020203" pitchFamily="34" charset="0"/>
+              </a:rPr>
+              <a:t> </a:t>
+            </a:r>
+            <a:r>
+              <a:rPr lang="it-IT" sz="2000" dirty="0" err="1">
+                <a:latin typeface="Segoe UI" panose="020B0502040204020203" pitchFamily="34" charset="0"/>
+                <a:cs typeface="Segoe UI" panose="020B0502040204020203" pitchFamily="34" charset="0"/>
+              </a:rPr>
+              <a:t>messages</a:t>
+            </a:r>
+            <a:r>
+              <a:rPr lang="it-IT" sz="2000" dirty="0">
+                <a:latin typeface="Segoe UI" panose="020B0502040204020203" pitchFamily="34" charset="0"/>
+                <a:cs typeface="Segoe UI" panose="020B0502040204020203" pitchFamily="34" charset="0"/>
+              </a:rPr>
+              <a:t> are </a:t>
+            </a:r>
+            <a:r>
+              <a:rPr lang="it-IT" sz="2000" dirty="0" err="1">
+                <a:latin typeface="Segoe UI" panose="020B0502040204020203" pitchFamily="34" charset="0"/>
+                <a:cs typeface="Segoe UI" panose="020B0502040204020203" pitchFamily="34" charset="0"/>
+              </a:rPr>
+              <a:t>sent</a:t>
+            </a:r>
+            <a:r>
+              <a:rPr lang="it-IT" sz="2000" dirty="0">
+                <a:latin typeface="Segoe UI" panose="020B0502040204020203" pitchFamily="34" charset="0"/>
+                <a:cs typeface="Segoe UI" panose="020B0502040204020203" pitchFamily="34" charset="0"/>
+              </a:rPr>
+              <a:t> and check how many of those are </a:t>
+            </a:r>
+            <a:r>
+              <a:rPr lang="it-IT" sz="2000" dirty="0" err="1">
+                <a:latin typeface="Segoe UI" panose="020B0502040204020203" pitchFamily="34" charset="0"/>
+                <a:cs typeface="Segoe UI" panose="020B0502040204020203" pitchFamily="34" charset="0"/>
+              </a:rPr>
+              <a:t>interpreted</a:t>
+            </a:r>
+            <a:r>
+              <a:rPr lang="it-IT" sz="2000" dirty="0">
+                <a:latin typeface="Segoe UI" panose="020B0502040204020203" pitchFamily="34" charset="0"/>
+                <a:cs typeface="Segoe UI" panose="020B0502040204020203" pitchFamily="34" charset="0"/>
+              </a:rPr>
+              <a:t> as </a:t>
+            </a:r>
+            <a:r>
+              <a:rPr lang="it-IT" sz="2000" i="1" dirty="0" err="1">
+                <a:latin typeface="Segoe UI" panose="020B0502040204020203" pitchFamily="34" charset="0"/>
+                <a:cs typeface="Segoe UI" panose="020B0502040204020203" pitchFamily="34" charset="0"/>
+              </a:rPr>
+              <a:t>wrong</a:t>
+            </a:r>
+            <a:r>
+              <a:rPr lang="it-IT" sz="2000" dirty="0">
+                <a:latin typeface="Segoe UI" panose="020B0502040204020203" pitchFamily="34" charset="0"/>
+                <a:cs typeface="Segoe UI" panose="020B0502040204020203" pitchFamily="34" charset="0"/>
+              </a:rPr>
+              <a:t> (</a:t>
+            </a:r>
+            <a:r>
+              <a:rPr lang="it-IT" sz="2000" i="1" dirty="0">
+                <a:latin typeface="Segoe UI" panose="020B0502040204020203" pitchFamily="34" charset="0"/>
+                <a:cs typeface="Segoe UI" panose="020B0502040204020203" pitchFamily="34" charset="0"/>
+              </a:rPr>
+              <a:t>false </a:t>
+            </a:r>
+            <a:r>
+              <a:rPr lang="it-IT" sz="2000" i="1" dirty="0" err="1">
+                <a:latin typeface="Segoe UI" panose="020B0502040204020203" pitchFamily="34" charset="0"/>
+                <a:cs typeface="Segoe UI" panose="020B0502040204020203" pitchFamily="34" charset="0"/>
+              </a:rPr>
+              <a:t>negatives</a:t>
+            </a:r>
+            <a:r>
+              <a:rPr lang="it-IT" sz="2000" dirty="0">
+                <a:latin typeface="Segoe UI" panose="020B0502040204020203" pitchFamily="34" charset="0"/>
+                <a:cs typeface="Segoe UI" panose="020B0502040204020203" pitchFamily="34" charset="0"/>
+              </a:rPr>
+              <a:t>)</a:t>
+            </a:r>
+          </a:p>
+          <a:p>
+            <a:pPr marL="285750" indent="-285750">
+              <a:buFontTx/>
+              <a:buChar char="-"/>
+            </a:pPr>
+            <a:endParaRPr lang="it-IT" sz="2000" dirty="0">
+              <a:latin typeface="Segoe UI" panose="020B0502040204020203" pitchFamily="34" charset="0"/>
+              <a:cs typeface="Segoe UI" panose="020B0502040204020203" pitchFamily="34" charset="0"/>
+            </a:endParaRPr>
+          </a:p>
+          <a:p>
+            <a:r>
+              <a:rPr lang="it-IT" altLang="it-IT" sz="2000" u="sng" dirty="0">
+                <a:latin typeface="Segoe UI" panose="020B0502040204020203" pitchFamily="34" charset="0"/>
+                <a:cs typeface="Segoe UI" panose="020B0502040204020203" pitchFamily="34" charset="0"/>
+              </a:rPr>
+              <a:t>Parametrized</a:t>
+            </a:r>
+            <a:r>
+              <a:rPr lang="it-IT" altLang="it-IT" sz="2000" dirty="0">
+                <a:latin typeface="Segoe UI" panose="020B0502040204020203" pitchFamily="34" charset="0"/>
+                <a:cs typeface="Segoe UI" panose="020B0502040204020203" pitchFamily="34" charset="0"/>
+              </a:rPr>
+              <a:t> simulation to test the transmissions:</a:t>
+            </a:r>
+          </a:p>
+          <a:p>
+            <a:endParaRPr lang="it-IT" altLang="it-IT" sz="2000" dirty="0">
+              <a:latin typeface="Segoe UI" panose="020B0502040204020203" pitchFamily="34" charset="0"/>
+              <a:cs typeface="Segoe UI" panose="020B0502040204020203" pitchFamily="34" charset="0"/>
+            </a:endParaRPr>
+          </a:p>
+          <a:p>
+            <a:pPr marL="457200" indent="-457200">
+              <a:buFont typeface="+mj-lt"/>
+              <a:buAutoNum type="arabicPeriod"/>
+            </a:pPr>
+            <a:r>
+              <a:rPr lang="it-IT" altLang="it-IT" sz="2000" dirty="0" err="1">
+                <a:latin typeface="Segoe UI" panose="020B0502040204020203" pitchFamily="34" charset="0"/>
+                <a:cs typeface="Segoe UI" panose="020B0502040204020203" pitchFamily="34" charset="0"/>
+              </a:rPr>
+              <a:t>Varied</a:t>
+            </a:r>
+            <a:r>
+              <a:rPr lang="it-IT" altLang="it-IT" sz="2000" dirty="0">
+                <a:latin typeface="Segoe UI" panose="020B0502040204020203" pitchFamily="34" charset="0"/>
+                <a:cs typeface="Segoe UI" panose="020B0502040204020203" pitchFamily="34" charset="0"/>
+              </a:rPr>
+              <a:t> distance and SNR to test different </a:t>
+            </a:r>
+            <a:r>
+              <a:rPr lang="it-IT" altLang="it-IT" sz="2000" dirty="0" err="1">
+                <a:latin typeface="Segoe UI" panose="020B0502040204020203" pitchFamily="34" charset="0"/>
+                <a:cs typeface="Segoe UI" panose="020B0502040204020203" pitchFamily="34" charset="0"/>
+              </a:rPr>
+              <a:t>configurations</a:t>
+            </a:r>
+            <a:endParaRPr lang="it-IT" altLang="it-IT" sz="2000" dirty="0">
+              <a:latin typeface="Segoe UI" panose="020B0502040204020203" pitchFamily="34" charset="0"/>
+              <a:cs typeface="Segoe UI" panose="020B0502040204020203" pitchFamily="34" charset="0"/>
+            </a:endParaRPr>
+          </a:p>
+          <a:p>
+            <a:pPr marL="457200" indent="-457200">
+              <a:buFont typeface="+mj-lt"/>
+              <a:buAutoNum type="arabicPeriod"/>
+            </a:pPr>
+            <a:endParaRPr lang="it-IT" altLang="it-IT" sz="2000" dirty="0">
+              <a:latin typeface="Segoe UI" panose="020B0502040204020203" pitchFamily="34" charset="0"/>
+              <a:cs typeface="Segoe UI" panose="020B0502040204020203" pitchFamily="34" charset="0"/>
+            </a:endParaRPr>
+          </a:p>
+          <a:p>
+            <a:pPr marL="457200" indent="-457200">
+              <a:buFont typeface="+mj-lt"/>
+              <a:buAutoNum type="arabicPeriod"/>
+            </a:pPr>
+            <a:r>
+              <a:rPr lang="it-IT" altLang="it-IT" sz="2000" dirty="0">
+                <a:latin typeface="Segoe UI" panose="020B0502040204020203" pitchFamily="34" charset="0"/>
+                <a:cs typeface="Segoe UI" panose="020B0502040204020203" pitchFamily="34" charset="0"/>
+              </a:rPr>
+              <a:t>Set error tolerance on key bits for authentication</a:t>
+            </a:r>
+          </a:p>
+          <a:p>
+            <a:pPr marL="457200" indent="-457200">
+              <a:buFont typeface="+mj-lt"/>
+              <a:buAutoNum type="arabicPeriod"/>
+            </a:pPr>
+            <a:endParaRPr lang="it-IT" altLang="it-IT" sz="2000" dirty="0">
+              <a:latin typeface="Segoe UI" panose="020B0502040204020203" pitchFamily="34" charset="0"/>
+              <a:cs typeface="Segoe UI" panose="020B0502040204020203" pitchFamily="34" charset="0"/>
+            </a:endParaRPr>
+          </a:p>
+          <a:p>
+            <a:pPr marL="457200" indent="-457200">
+              <a:buFont typeface="+mj-lt"/>
+              <a:buAutoNum type="arabicPeriod"/>
+            </a:pPr>
+            <a:r>
+              <a:rPr lang="it-IT" altLang="it-IT" sz="2000" dirty="0" err="1">
+                <a:latin typeface="Segoe UI" panose="020B0502040204020203" pitchFamily="34" charset="0"/>
+                <a:cs typeface="Segoe UI" panose="020B0502040204020203" pitchFamily="34" charset="0"/>
+              </a:rPr>
+              <a:t>Counted</a:t>
+            </a:r>
+            <a:r>
+              <a:rPr lang="it-IT" altLang="it-IT" sz="2000" dirty="0">
+                <a:latin typeface="Segoe UI" panose="020B0502040204020203" pitchFamily="34" charset="0"/>
+                <a:cs typeface="Segoe UI" panose="020B0502040204020203" pitchFamily="34" charset="0"/>
+              </a:rPr>
+              <a:t> </a:t>
+            </a:r>
+            <a:r>
+              <a:rPr lang="it-IT" altLang="it-IT" sz="2000" dirty="0" err="1">
+                <a:latin typeface="Segoe UI" panose="020B0502040204020203" pitchFamily="34" charset="0"/>
+                <a:cs typeface="Segoe UI" panose="020B0502040204020203" pitchFamily="34" charset="0"/>
+              </a:rPr>
+              <a:t>messages</a:t>
+            </a:r>
+            <a:r>
+              <a:rPr lang="it-IT" altLang="it-IT" sz="2000" dirty="0">
+                <a:latin typeface="Segoe UI" panose="020B0502040204020203" pitchFamily="34" charset="0"/>
+                <a:cs typeface="Segoe UI" panose="020B0502040204020203" pitchFamily="34" charset="0"/>
+              </a:rPr>
+              <a:t> </a:t>
+            </a:r>
+            <a:r>
+              <a:rPr lang="it-IT" altLang="it-IT" sz="2000" dirty="0" err="1">
+                <a:latin typeface="Segoe UI" panose="020B0502040204020203" pitchFamily="34" charset="0"/>
+                <a:cs typeface="Segoe UI" panose="020B0502040204020203" pitchFamily="34" charset="0"/>
+              </a:rPr>
+              <a:t>exceeding</a:t>
+            </a:r>
+            <a:r>
+              <a:rPr lang="it-IT" altLang="it-IT" sz="2000" dirty="0">
+                <a:latin typeface="Segoe UI" panose="020B0502040204020203" pitchFamily="34" charset="0"/>
+                <a:cs typeface="Segoe UI" panose="020B0502040204020203" pitchFamily="34" charset="0"/>
+              </a:rPr>
+              <a:t> tolerance as false </a:t>
+            </a:r>
+            <a:r>
+              <a:rPr lang="it-IT" altLang="it-IT" sz="2000" dirty="0" err="1">
+                <a:latin typeface="Segoe UI" panose="020B0502040204020203" pitchFamily="34" charset="0"/>
+                <a:cs typeface="Segoe UI" panose="020B0502040204020203" pitchFamily="34" charset="0"/>
+              </a:rPr>
+              <a:t>alarms</a:t>
+            </a:r>
+            <a:endParaRPr lang="it-IT" altLang="it-IT" sz="2000" dirty="0">
+              <a:latin typeface="Segoe UI" panose="020B0502040204020203" pitchFamily="34" charset="0"/>
+              <a:cs typeface="Segoe UI" panose="020B0502040204020203" pitchFamily="34" charset="0"/>
+            </a:endParaRPr>
+          </a:p>
+          <a:p>
+            <a:pPr marL="457200" indent="-457200">
+              <a:buFont typeface="+mj-lt"/>
+              <a:buAutoNum type="arabicPeriod"/>
+            </a:pPr>
+            <a:endParaRPr lang="it-IT" altLang="it-IT" sz="2000" dirty="0">
+              <a:latin typeface="Segoe UI" panose="020B0502040204020203" pitchFamily="34" charset="0"/>
+              <a:cs typeface="Segoe UI" panose="020B0502040204020203" pitchFamily="34" charset="0"/>
+            </a:endParaRPr>
+          </a:p>
+          <a:p>
+            <a:pPr marL="285750" indent="-285750">
+              <a:buFontTx/>
+              <a:buChar char="-"/>
+            </a:pPr>
+            <a:endParaRPr lang="it-IT" sz="2000" dirty="0">
+              <a:latin typeface="Segoe UI" panose="020B0502040204020203" pitchFamily="34" charset="0"/>
+              <a:cs typeface="Segoe UI" panose="020B0502040204020203" pitchFamily="34" charset="0"/>
+            </a:endParaRPr>
           </a:p>
         </p:txBody>
       </p:sp>
       <p:pic>
         <p:nvPicPr>
-          <p:cNvPr id="5" name="Immagine 4" descr="Immagine che contiene testo, diagramma, Carattere, schermata&#10;&#10;Descrizione generata automaticamente">
+          <p:cNvPr id="1026" name="Picture 2">
             <a:extLst>
               <a:ext uri="{FF2B5EF4-FFF2-40B4-BE49-F238E27FC236}">
-                <a16:creationId xmlns:a16="http://schemas.microsoft.com/office/drawing/2014/main" id="{0E8E772C-5482-1063-449A-9207B9A21511}"/>
+                <a16:creationId xmlns:a16="http://schemas.microsoft.com/office/drawing/2014/main" id="{754BB4A3-5615-9395-2DB2-8B89B490EFFE}"/>
               </a:ext>
             </a:extLst>
           </p:cNvPr>
           <p:cNvPicPr>
-            <a:picLocks noChangeAspect="1"/>
+            <a:picLocks noChangeAspect="1" noChangeArrowheads="1"/>
           </p:cNvPicPr>
           <p:nvPr/>
         </p:nvPicPr>
@@ -4648,26 +4476,37 @@
               </a:ext>
             </a:extLst>
           </a:blip>
+          <a:srcRect/>
           <a:stretch>
             <a:fillRect/>
           </a:stretch>
         </p:blipFill>
-        <p:spPr>
-          <a:xfrm>
-            <a:off x="1695519" y="1519237"/>
-            <a:ext cx="5419725" cy="3819525"/>
+        <p:spPr bwMode="auto">
+          <a:xfrm>
+            <a:off x="6143105" y="2436118"/>
+            <a:ext cx="2841321" cy="2284116"/>
           </a:xfrm>
           <a:prstGeom prst="rect">
             <a:avLst/>
           </a:prstGeom>
+          <a:noFill/>
+          <a:extLst>
+            <a:ext uri="{909E8E84-426E-40DD-AFC4-6F175D3DCCD1}">
+              <a14:hiddenFill xmlns:a14="http://schemas.microsoft.com/office/drawing/2010/main">
+                <a:solidFill>
+                  <a:srgbClr val="FFFFFF"/>
+                </a:solidFill>
+              </a14:hiddenFill>
+            </a:ext>
+          </a:extLst>
         </p:spPr>
       </p:pic>
       <p:sp>
         <p:nvSpPr>
-          <p:cNvPr id="8" name="CasellaDiTesto 7">
+          <p:cNvPr id="3" name="CasellaDiTesto 2">
             <a:extLst>
               <a:ext uri="{FF2B5EF4-FFF2-40B4-BE49-F238E27FC236}">
-                <a16:creationId xmlns:a16="http://schemas.microsoft.com/office/drawing/2014/main" id="{13448BF0-9D44-F098-BAD9-74D45F5A4869}"/>
+                <a16:creationId xmlns:a16="http://schemas.microsoft.com/office/drawing/2014/main" id="{19DFD1A4-E016-8FE0-AA32-1DEBEA7DFA06}"/>
               </a:ext>
             </a:extLst>
           </p:cNvPr>
@@ -4676,8 +4515,8 @@
         </p:nvSpPr>
         <p:spPr>
           <a:xfrm>
-            <a:off x="2413879" y="5544201"/>
-            <a:ext cx="4316241" cy="307777"/>
+            <a:off x="6349953" y="4875394"/>
+            <a:ext cx="2427623" cy="861774"/>
           </a:xfrm>
           <a:prstGeom prst="rect">
             <a:avLst/>
@@ -4690,27 +4529,124 @@
           </a:bodyPr>
           <a:lstStyle/>
           <a:p>
-            <a:r>
-              <a:rPr lang="it-IT" sz="1400" dirty="0"/>
-              <a:t>Source: </a:t>
-            </a:r>
-            <a:r>
-              <a:rPr lang="it-IT" sz="1400" dirty="0">
+            <a:pPr algn="ctr"/>
+            <a:r>
+              <a:rPr lang="it-IT" sz="1000" dirty="0"/>
+              <a:t>Source:</a:t>
+            </a:r>
+          </a:p>
+          <a:p>
+            <a:pPr algn="ctr"/>
+            <a:r>
+              <a:rPr lang="it-IT" sz="1000" dirty="0">
                 <a:hlinkClick r:id="rId3"/>
               </a:rPr>
-              <a:t>https://gru.stanford.edu/doku.php/tutorials/sdt</a:t>
-            </a:r>
-            <a:r>
-              <a:rPr lang="it-IT" sz="1400" dirty="0"/>
+              <a:t>https://www.researchgate.net/figure/PDF-of-test-statistics-Miss-detection-and-false-alarm-cannot-be-reduced-simultaneously_fig1_252063675</a:t>
+            </a:r>
+            <a:r>
+              <a:rPr lang="it-IT" sz="1000" dirty="0"/>
               <a:t> </a:t>
             </a:r>
+          </a:p>
+        </p:txBody>
+      </p:sp>
+      <p:sp>
+        <p:nvSpPr>
+          <p:cNvPr id="10" name="Freccia in giù 9">
+            <a:extLst>
+              <a:ext uri="{FF2B5EF4-FFF2-40B4-BE49-F238E27FC236}">
+                <a16:creationId xmlns:a16="http://schemas.microsoft.com/office/drawing/2014/main" id="{2487D63C-AF62-E80F-FF5D-6BD5FCCE1BD7}"/>
+              </a:ext>
+            </a:extLst>
+          </p:cNvPr>
+          <p:cNvSpPr/>
+          <p:nvPr/>
+        </p:nvSpPr>
+        <p:spPr>
+          <a:xfrm>
+            <a:off x="7907482" y="1672936"/>
+            <a:ext cx="332509" cy="763182"/>
+          </a:xfrm>
+          <a:prstGeom prst="downArrow">
+            <a:avLst/>
+          </a:prstGeom>
+        </p:spPr>
+        <p:style>
+          <a:lnRef idx="2">
+            <a:schemeClr val="accent1">
+              <a:shade val="15000"/>
+            </a:schemeClr>
+          </a:lnRef>
+          <a:fillRef idx="1">
+            <a:schemeClr val="accent1"/>
+          </a:fillRef>
+          <a:effectRef idx="0">
+            <a:schemeClr val="accent1"/>
+          </a:effectRef>
+          <a:fontRef idx="minor">
+            <a:schemeClr val="lt1"/>
+          </a:fontRef>
+        </p:style>
+        <p:txBody>
+          <a:bodyPr rtlCol="0" anchor="ctr"/>
+          <a:lstStyle/>
+          <a:p>
+            <a:pPr algn="ctr"/>
+            <a:endParaRPr lang="it-IT"/>
+          </a:p>
+        </p:txBody>
+      </p:sp>
+      <p:sp>
+        <p:nvSpPr>
+          <p:cNvPr id="11" name="Rettangolo 10">
+            <a:extLst>
+              <a:ext uri="{FF2B5EF4-FFF2-40B4-BE49-F238E27FC236}">
+                <a16:creationId xmlns:a16="http://schemas.microsoft.com/office/drawing/2014/main" id="{1DB23971-6256-6B0A-F2DC-B43D56258A9C}"/>
+              </a:ext>
+            </a:extLst>
+          </p:cNvPr>
+          <p:cNvSpPr/>
+          <p:nvPr/>
+        </p:nvSpPr>
+        <p:spPr>
+          <a:xfrm>
+            <a:off x="7450282" y="2805545"/>
+            <a:ext cx="1413163" cy="2069849"/>
+          </a:xfrm>
+          <a:prstGeom prst="rect">
+            <a:avLst/>
+          </a:prstGeom>
+          <a:noFill/>
+        </p:spPr>
+        <p:style>
+          <a:lnRef idx="2">
+            <a:schemeClr val="accent1">
+              <a:shade val="15000"/>
+            </a:schemeClr>
+          </a:lnRef>
+          <a:fillRef idx="1">
+            <a:schemeClr val="accent1"/>
+          </a:fillRef>
+          <a:effectRef idx="0">
+            <a:schemeClr val="accent1"/>
+          </a:effectRef>
+          <a:fontRef idx="minor">
+            <a:schemeClr val="lt1"/>
+          </a:fontRef>
+        </p:style>
+        <p:txBody>
+          <a:bodyPr rtlCol="0" anchor="ctr"/>
+          <a:lstStyle/>
+          <a:p>
+            <a:pPr algn="ctr"/>
+            <a:endParaRPr lang="it-IT"/>
           </a:p>
         </p:txBody>
       </p:sp>
     </p:spTree>
     <p:extLst>
       <p:ext uri="{BB962C8B-B14F-4D97-AF65-F5344CB8AC3E}">
-        <p14:creationId xmlns:p14="http://schemas.microsoft.com/office/powerpoint/2010/main" val="1131974987"/>
+        <p14:creationId xmlns:p14="http://schemas.microsoft.com/office/powerpoint/2010/main" val="26372625"/>
       </p:ext>
     </p:extLst>
   </p:cSld>
@@ -4770,7 +4706,7 @@
                 <a:latin typeface="Segoe UI" panose="020B0502040204020203" pitchFamily="34" charset="0"/>
                 <a:cs typeface="Segoe UI" panose="020B0502040204020203" pitchFamily="34" charset="0"/>
               </a:rPr>
-              <a:t>FA (False Alarm) Study</a:t>
+              <a:t>FA (False Alarm) Study - Results</a:t>
             </a:r>
           </a:p>
         </p:txBody>
@@ -4806,7 +4742,7 @@
                 <a:latin typeface="Segoe UI" panose="020B0502040204020203" pitchFamily="34" charset="0"/>
                 <a:cs typeface="Segoe UI" panose="020B0502040204020203" pitchFamily="34" charset="0"/>
               </a:rPr>
-              <a:t>PLA Bluetooth Environment– 2/N</a:t>
+              <a:t>PLA Bluetooth Environment– 8/11</a:t>
             </a:r>
           </a:p>
         </p:txBody>
@@ -4825,8 +4761,8 @@
         </p:nvSpPr>
         <p:spPr>
           <a:xfrm>
-            <a:off x="508593" y="2138280"/>
-            <a:ext cx="8343900" cy="3785652"/>
+            <a:off x="400050" y="2168211"/>
+            <a:ext cx="8343900" cy="3170099"/>
           </a:xfrm>
           <a:prstGeom prst="rect">
             <a:avLst/>
@@ -4840,135 +4776,25 @@
           <a:lstStyle/>
           <a:p>
             <a:r>
-              <a:rPr lang="it-IT" sz="2000" u="sng" dirty="0">
-                <a:latin typeface="Segoe UI" panose="020B0502040204020203" pitchFamily="34" charset="0"/>
-                <a:cs typeface="Segoe UI" panose="020B0502040204020203" pitchFamily="34" charset="0"/>
-              </a:rPr>
-              <a:t>False Alarm</a:t>
-            </a:r>
-            <a:r>
-              <a:rPr lang="it-IT" sz="2000" dirty="0">
-                <a:latin typeface="Segoe UI" panose="020B0502040204020203" pitchFamily="34" charset="0"/>
-                <a:cs typeface="Segoe UI" panose="020B0502040204020203" pitchFamily="34" charset="0"/>
-              </a:rPr>
-              <a:t>: only </a:t>
-            </a:r>
-            <a:r>
-              <a:rPr lang="it-IT" sz="2000" i="1" dirty="0" err="1">
-                <a:latin typeface="Segoe UI" panose="020B0502040204020203" pitchFamily="34" charset="0"/>
-                <a:cs typeface="Segoe UI" panose="020B0502040204020203" pitchFamily="34" charset="0"/>
-              </a:rPr>
-              <a:t>authenticate</a:t>
-            </a:r>
-            <a:r>
-              <a:rPr lang="it-IT" sz="2000" dirty="0">
-                <a:latin typeface="Segoe UI" panose="020B0502040204020203" pitchFamily="34" charset="0"/>
-                <a:cs typeface="Segoe UI" panose="020B0502040204020203" pitchFamily="34" charset="0"/>
-              </a:rPr>
-              <a:t> </a:t>
-            </a:r>
-            <a:r>
-              <a:rPr lang="it-IT" sz="2000" dirty="0" err="1">
-                <a:latin typeface="Segoe UI" panose="020B0502040204020203" pitchFamily="34" charset="0"/>
-                <a:cs typeface="Segoe UI" panose="020B0502040204020203" pitchFamily="34" charset="0"/>
-              </a:rPr>
-              <a:t>messages</a:t>
-            </a:r>
-            <a:r>
-              <a:rPr lang="it-IT" sz="2000" dirty="0">
-                <a:latin typeface="Segoe UI" panose="020B0502040204020203" pitchFamily="34" charset="0"/>
-                <a:cs typeface="Segoe UI" panose="020B0502040204020203" pitchFamily="34" charset="0"/>
-              </a:rPr>
-              <a:t> are </a:t>
-            </a:r>
-            <a:r>
-              <a:rPr lang="it-IT" sz="2000" dirty="0" err="1">
-                <a:latin typeface="Segoe UI" panose="020B0502040204020203" pitchFamily="34" charset="0"/>
-                <a:cs typeface="Segoe UI" panose="020B0502040204020203" pitchFamily="34" charset="0"/>
-              </a:rPr>
-              <a:t>sent</a:t>
-            </a:r>
-            <a:r>
-              <a:rPr lang="it-IT" sz="2000" dirty="0">
-                <a:latin typeface="Segoe UI" panose="020B0502040204020203" pitchFamily="34" charset="0"/>
-                <a:cs typeface="Segoe UI" panose="020B0502040204020203" pitchFamily="34" charset="0"/>
-              </a:rPr>
-              <a:t> and check how many of those are </a:t>
-            </a:r>
-            <a:r>
-              <a:rPr lang="it-IT" sz="2000" dirty="0" err="1">
-                <a:latin typeface="Segoe UI" panose="020B0502040204020203" pitchFamily="34" charset="0"/>
-                <a:cs typeface="Segoe UI" panose="020B0502040204020203" pitchFamily="34" charset="0"/>
-              </a:rPr>
-              <a:t>interpreted</a:t>
-            </a:r>
-            <a:r>
-              <a:rPr lang="it-IT" sz="2000" dirty="0">
-                <a:latin typeface="Segoe UI" panose="020B0502040204020203" pitchFamily="34" charset="0"/>
-                <a:cs typeface="Segoe UI" panose="020B0502040204020203" pitchFamily="34" charset="0"/>
-              </a:rPr>
-              <a:t> as </a:t>
-            </a:r>
-            <a:r>
-              <a:rPr lang="it-IT" sz="2000" i="1" dirty="0" err="1">
-                <a:latin typeface="Segoe UI" panose="020B0502040204020203" pitchFamily="34" charset="0"/>
-                <a:cs typeface="Segoe UI" panose="020B0502040204020203" pitchFamily="34" charset="0"/>
-              </a:rPr>
-              <a:t>wrong</a:t>
-            </a:r>
-            <a:r>
-              <a:rPr lang="it-IT" sz="2000" dirty="0">
-                <a:latin typeface="Segoe UI" panose="020B0502040204020203" pitchFamily="34" charset="0"/>
-                <a:cs typeface="Segoe UI" panose="020B0502040204020203" pitchFamily="34" charset="0"/>
-              </a:rPr>
-              <a:t> (</a:t>
-            </a:r>
-            <a:r>
-              <a:rPr lang="it-IT" sz="2000" i="1" dirty="0">
-                <a:latin typeface="Segoe UI" panose="020B0502040204020203" pitchFamily="34" charset="0"/>
-                <a:cs typeface="Segoe UI" panose="020B0502040204020203" pitchFamily="34" charset="0"/>
-              </a:rPr>
-              <a:t>false </a:t>
-            </a:r>
-            <a:r>
-              <a:rPr lang="it-IT" sz="2000" i="1" dirty="0" err="1">
-                <a:latin typeface="Segoe UI" panose="020B0502040204020203" pitchFamily="34" charset="0"/>
-                <a:cs typeface="Segoe UI" panose="020B0502040204020203" pitchFamily="34" charset="0"/>
-              </a:rPr>
-              <a:t>negatives</a:t>
-            </a:r>
-            <a:r>
-              <a:rPr lang="it-IT" sz="2000" dirty="0">
-                <a:latin typeface="Segoe UI" panose="020B0502040204020203" pitchFamily="34" charset="0"/>
-                <a:cs typeface="Segoe UI" panose="020B0502040204020203" pitchFamily="34" charset="0"/>
-              </a:rPr>
-              <a:t>)</a:t>
-            </a:r>
-          </a:p>
-          <a:p>
-            <a:pPr marL="285750" indent="-285750">
-              <a:buFontTx/>
-              <a:buChar char="-"/>
-            </a:pPr>
-            <a:endParaRPr lang="it-IT" sz="2000" dirty="0">
-              <a:latin typeface="Segoe UI" panose="020B0502040204020203" pitchFamily="34" charset="0"/>
-              <a:cs typeface="Segoe UI" panose="020B0502040204020203" pitchFamily="34" charset="0"/>
-            </a:endParaRPr>
-          </a:p>
-          <a:p>
-            <a:r>
-              <a:rPr lang="it-IT" altLang="it-IT" sz="2000" u="sng" dirty="0">
-                <a:latin typeface="Segoe UI" panose="020B0502040204020203" pitchFamily="34" charset="0"/>
-                <a:cs typeface="Segoe UI" panose="020B0502040204020203" pitchFamily="34" charset="0"/>
-              </a:rPr>
-              <a:t>Parametrized</a:t>
-            </a:r>
-            <a:r>
               <a:rPr lang="it-IT" altLang="it-IT" sz="2000" dirty="0">
                 <a:latin typeface="Segoe UI" panose="020B0502040204020203" pitchFamily="34" charset="0"/>
                 <a:cs typeface="Segoe UI" panose="020B0502040204020203" pitchFamily="34" charset="0"/>
               </a:rPr>
-              <a:t> simulation to test the transmissions:</a:t>
+              <a:t>This simulation </a:t>
+            </a:r>
+            <a:r>
+              <a:rPr lang="it-IT" altLang="it-IT" sz="2000" dirty="0" err="1">
+                <a:latin typeface="Segoe UI" panose="020B0502040204020203" pitchFamily="34" charset="0"/>
+                <a:cs typeface="Segoe UI" panose="020B0502040204020203" pitchFamily="34" charset="0"/>
+              </a:rPr>
+              <a:t>reported</a:t>
+            </a:r>
+            <a:r>
+              <a:rPr lang="it-IT" altLang="it-IT" sz="2000" dirty="0">
+                <a:latin typeface="Segoe UI" panose="020B0502040204020203" pitchFamily="34" charset="0"/>
+                <a:cs typeface="Segoe UI" panose="020B0502040204020203" pitchFamily="34" charset="0"/>
+              </a:rPr>
+              <a:t> the following results:</a:t>
             </a:r>
           </a:p>
           <a:p>
@@ -4978,133 +4804,77 @@
             </a:endParaRPr>
           </a:p>
           <a:p>
-            <a:pPr marL="457200" indent="-457200">
-              <a:buFont typeface="+mj-lt"/>
-              <a:buAutoNum type="arabicPeriod"/>
-            </a:pPr>
+            <a:pPr marL="342900" indent="-342900">
+              <a:buFont typeface="Arial" panose="020B0604020202020204" pitchFamily="34" charset="0"/>
+              <a:buChar char="•"/>
+            </a:pPr>
+            <a:r>
+              <a:rPr lang="it-IT" altLang="it-IT" sz="2000" dirty="0">
+                <a:latin typeface="Segoe UI" panose="020B0502040204020203" pitchFamily="34" charset="0"/>
+                <a:cs typeface="Segoe UI" panose="020B0502040204020203" pitchFamily="34" charset="0"/>
+              </a:rPr>
+              <a:t>Observed 0% false alarm rate </a:t>
+            </a:r>
             <a:r>
               <a:rPr lang="it-IT" altLang="it-IT" sz="2000" dirty="0" err="1">
                 <a:latin typeface="Segoe UI" panose="020B0502040204020203" pitchFamily="34" charset="0"/>
                 <a:cs typeface="Segoe UI" panose="020B0502040204020203" pitchFamily="34" charset="0"/>
               </a:rPr>
-              <a:t>Varied</a:t>
+              <a:t>across</a:t>
             </a:r>
             <a:r>
               <a:rPr lang="it-IT" altLang="it-IT" sz="2000" dirty="0">
                 <a:latin typeface="Segoe UI" panose="020B0502040204020203" pitchFamily="34" charset="0"/>
                 <a:cs typeface="Segoe UI" panose="020B0502040204020203" pitchFamily="34" charset="0"/>
               </a:rPr>
-              <a:t> distance and SNR to test different </a:t>
-            </a:r>
-            <a:r>
-              <a:rPr lang="it-IT" altLang="it-IT" sz="2000" dirty="0" err="1">
-                <a:latin typeface="Segoe UI" panose="020B0502040204020203" pitchFamily="34" charset="0"/>
-                <a:cs typeface="Segoe UI" panose="020B0502040204020203" pitchFamily="34" charset="0"/>
-              </a:rPr>
-              <a:t>configurations</a:t>
-            </a:r>
+              <a:t> all distance-SNR pairs</a:t>
+            </a:r>
+          </a:p>
+          <a:p>
+            <a:pPr marL="342900" indent="-342900">
+              <a:buFont typeface="Arial" panose="020B0604020202020204" pitchFamily="34" charset="0"/>
+              <a:buChar char="•"/>
+            </a:pPr>
             <a:endParaRPr lang="it-IT" altLang="it-IT" sz="2000" dirty="0">
               <a:latin typeface="Segoe UI" panose="020B0502040204020203" pitchFamily="34" charset="0"/>
               <a:cs typeface="Segoe UI" panose="020B0502040204020203" pitchFamily="34" charset="0"/>
             </a:endParaRPr>
           </a:p>
           <a:p>
-            <a:pPr marL="457200" indent="-457200">
-              <a:buFont typeface="+mj-lt"/>
-              <a:buAutoNum type="arabicPeriod"/>
-            </a:pPr>
-            <a:endParaRPr lang="it-IT" altLang="it-IT" sz="2000" dirty="0">
+            <a:pPr marL="342900" indent="-342900">
+              <a:buFont typeface="Arial" panose="020B0604020202020204" pitchFamily="34" charset="0"/>
+              <a:buChar char="•"/>
+            </a:pPr>
+            <a:r>
+              <a:rPr lang="en-US" altLang="it-IT" sz="2000" dirty="0">
+                <a:latin typeface="Segoe UI" panose="020B0502040204020203" pitchFamily="34" charset="0"/>
+                <a:cs typeface="Segoe UI" panose="020B0502040204020203" pitchFamily="34" charset="0"/>
+              </a:rPr>
+              <a:t>Variable decoding algorithm effectively kept key bit errors below the set threshold</a:t>
+            </a:r>
+          </a:p>
+          <a:p>
+            <a:pPr marL="342900" indent="-342900">
+              <a:buFont typeface="Arial" panose="020B0604020202020204" pitchFamily="34" charset="0"/>
+              <a:buChar char="•"/>
+            </a:pPr>
+            <a:endParaRPr lang="en-US" altLang="it-IT" sz="2000" dirty="0">
               <a:latin typeface="Segoe UI" panose="020B0502040204020203" pitchFamily="34" charset="0"/>
               <a:cs typeface="Segoe UI" panose="020B0502040204020203" pitchFamily="34" charset="0"/>
             </a:endParaRPr>
           </a:p>
           <a:p>
-            <a:pPr marL="457200" indent="-457200">
-              <a:buFont typeface="+mj-lt"/>
-              <a:buAutoNum type="arabicPeriod"/>
-            </a:pPr>
-            <a:r>
-              <a:rPr lang="it-IT" altLang="it-IT" sz="2000" dirty="0">
-                <a:latin typeface="Segoe UI" panose="020B0502040204020203" pitchFamily="34" charset="0"/>
-                <a:cs typeface="Segoe UI" panose="020B0502040204020203" pitchFamily="34" charset="0"/>
-              </a:rPr>
-              <a:t>Set error tolerance on key bits for authentication</a:t>
-            </a:r>
-          </a:p>
-          <a:p>
-            <a:pPr marL="457200" indent="-457200">
-              <a:buFont typeface="+mj-lt"/>
-              <a:buAutoNum type="arabicPeriod"/>
-            </a:pPr>
-            <a:endParaRPr lang="it-IT" altLang="it-IT" sz="2000" dirty="0">
-              <a:latin typeface="Segoe UI" panose="020B0502040204020203" pitchFamily="34" charset="0"/>
-              <a:cs typeface="Segoe UI" panose="020B0502040204020203" pitchFamily="34" charset="0"/>
-            </a:endParaRPr>
-          </a:p>
-          <a:p>
-            <a:pPr marL="457200" indent="-457200">
-              <a:buFont typeface="+mj-lt"/>
-              <a:buAutoNum type="arabicPeriod"/>
-            </a:pPr>
-            <a:r>
-              <a:rPr lang="it-IT" altLang="it-IT" sz="2000" dirty="0" err="1">
-                <a:latin typeface="Segoe UI" panose="020B0502040204020203" pitchFamily="34" charset="0"/>
-                <a:cs typeface="Segoe UI" panose="020B0502040204020203" pitchFamily="34" charset="0"/>
-              </a:rPr>
-              <a:t>Counted</a:t>
-            </a:r>
-            <a:r>
-              <a:rPr lang="it-IT" altLang="it-IT" sz="2000" dirty="0">
-                <a:latin typeface="Segoe UI" panose="020B0502040204020203" pitchFamily="34" charset="0"/>
-                <a:cs typeface="Segoe UI" panose="020B0502040204020203" pitchFamily="34" charset="0"/>
-              </a:rPr>
-              <a:t> </a:t>
-            </a:r>
-            <a:r>
-              <a:rPr lang="it-IT" altLang="it-IT" sz="2000" dirty="0" err="1">
-                <a:latin typeface="Segoe UI" panose="020B0502040204020203" pitchFamily="34" charset="0"/>
-                <a:cs typeface="Segoe UI" panose="020B0502040204020203" pitchFamily="34" charset="0"/>
-              </a:rPr>
-              <a:t>messages</a:t>
-            </a:r>
-            <a:r>
-              <a:rPr lang="it-IT" altLang="it-IT" sz="2000" dirty="0">
-                <a:latin typeface="Segoe UI" panose="020B0502040204020203" pitchFamily="34" charset="0"/>
-                <a:cs typeface="Segoe UI" panose="020B0502040204020203" pitchFamily="34" charset="0"/>
-              </a:rPr>
-              <a:t> </a:t>
-            </a:r>
-            <a:r>
-              <a:rPr lang="it-IT" altLang="it-IT" sz="2000" dirty="0" err="1">
-                <a:latin typeface="Segoe UI" panose="020B0502040204020203" pitchFamily="34" charset="0"/>
-                <a:cs typeface="Segoe UI" panose="020B0502040204020203" pitchFamily="34" charset="0"/>
-              </a:rPr>
-              <a:t>exceeding</a:t>
-            </a:r>
-            <a:r>
-              <a:rPr lang="it-IT" altLang="it-IT" sz="2000" dirty="0">
-                <a:latin typeface="Segoe UI" panose="020B0502040204020203" pitchFamily="34" charset="0"/>
-                <a:cs typeface="Segoe UI" panose="020B0502040204020203" pitchFamily="34" charset="0"/>
-              </a:rPr>
-              <a:t> tolerance as false </a:t>
-            </a:r>
-            <a:r>
-              <a:rPr lang="it-IT" altLang="it-IT" sz="2000" dirty="0" err="1">
-                <a:latin typeface="Segoe UI" panose="020B0502040204020203" pitchFamily="34" charset="0"/>
-                <a:cs typeface="Segoe UI" panose="020B0502040204020203" pitchFamily="34" charset="0"/>
-              </a:rPr>
-              <a:t>alarms</a:t>
-            </a:r>
-            <a:endParaRPr lang="it-IT" altLang="it-IT" sz="2000" dirty="0">
-              <a:latin typeface="Segoe UI" panose="020B0502040204020203" pitchFamily="34" charset="0"/>
-              <a:cs typeface="Segoe UI" panose="020B0502040204020203" pitchFamily="34" charset="0"/>
-            </a:endParaRPr>
-          </a:p>
-          <a:p>
-            <a:pPr marL="457200" indent="-457200">
-              <a:buFont typeface="+mj-lt"/>
-              <a:buAutoNum type="arabicPeriod"/>
-            </a:pPr>
+            <a:pPr marL="342900" indent="-342900">
+              <a:buFont typeface="Arial" panose="020B0604020202020204" pitchFamily="34" charset="0"/>
+              <a:buChar char="•"/>
+            </a:pPr>
+            <a:r>
+              <a:rPr lang="en-US" altLang="it-IT" sz="2000" dirty="0">
+                <a:latin typeface="Segoe UI" panose="020B0502040204020203" pitchFamily="34" charset="0"/>
+                <a:cs typeface="Segoe UI" panose="020B0502040204020203" pitchFamily="34" charset="0"/>
+              </a:rPr>
+              <a:t>Results validated the effectiveness of the tolerance and the decoding algorithm chosen</a:t>
+            </a:r>
             <a:endParaRPr lang="it-IT" altLang="it-IT" sz="2000" dirty="0">
               <a:latin typeface="Segoe UI" panose="020B0502040204020203" pitchFamily="34" charset="0"/>
               <a:cs typeface="Segoe UI" panose="020B0502040204020203" pitchFamily="34" charset="0"/>
@@ -5125,7 +4895,7 @@
     </p:spTree>
     <p:extLst>
       <p:ext uri="{BB962C8B-B14F-4D97-AF65-F5344CB8AC3E}">
-        <p14:creationId xmlns:p14="http://schemas.microsoft.com/office/powerpoint/2010/main" val="26372625"/>
+        <p14:creationId xmlns:p14="http://schemas.microsoft.com/office/powerpoint/2010/main" val="335616924"/>
       </p:ext>
     </p:extLst>
   </p:cSld>
@@ -5185,7 +4955,7 @@
                 <a:latin typeface="Segoe UI" panose="020B0502040204020203" pitchFamily="34" charset="0"/>
                 <a:cs typeface="Segoe UI" panose="020B0502040204020203" pitchFamily="34" charset="0"/>
               </a:rPr>
-              <a:t>FA (False Alarm) Study - Results</a:t>
+              <a:t>MD (Miss Detection) Study</a:t>
             </a:r>
           </a:p>
         </p:txBody>
@@ -5221,17 +4991,17 @@
                 <a:latin typeface="Segoe UI" panose="020B0502040204020203" pitchFamily="34" charset="0"/>
                 <a:cs typeface="Segoe UI" panose="020B0502040204020203" pitchFamily="34" charset="0"/>
               </a:rPr>
-              <a:t>PLA Bluetooth Environment– 2/N</a:t>
+              <a:t>PLA Bluetooth Environment– 9/11</a:t>
             </a:r>
           </a:p>
         </p:txBody>
       </p:sp>
       <p:sp>
         <p:nvSpPr>
-          <p:cNvPr id="6" name="CasellaDiTesto 5">
+          <p:cNvPr id="7" name="CasellaDiTesto 6">
             <a:extLst>
               <a:ext uri="{FF2B5EF4-FFF2-40B4-BE49-F238E27FC236}">
-                <a16:creationId xmlns:a16="http://schemas.microsoft.com/office/drawing/2014/main" id="{0C3825A1-BC2D-A575-E5DA-F3AAE95E3E9E}"/>
+                <a16:creationId xmlns:a16="http://schemas.microsoft.com/office/drawing/2014/main" id="{3D360244-5C2D-E0AE-5CC8-59298765925D}"/>
               </a:ext>
             </a:extLst>
           </p:cNvPr>
@@ -5240,8 +5010,433 @@
         </p:nvSpPr>
         <p:spPr>
           <a:xfrm>
-            <a:off x="400050" y="2168211"/>
-            <a:ext cx="8343900" cy="3170099"/>
+            <a:off x="159574" y="1286446"/>
+            <a:ext cx="5888386" cy="4708981"/>
+          </a:xfrm>
+          <a:prstGeom prst="rect">
+            <a:avLst/>
+          </a:prstGeom>
+          <a:noFill/>
+        </p:spPr>
+        <p:txBody>
+          <a:bodyPr wrap="square">
+            <a:spAutoFit/>
+          </a:bodyPr>
+          <a:lstStyle/>
+          <a:p>
+            <a:r>
+              <a:rPr lang="it-IT" sz="2000" u="sng" dirty="0">
+                <a:latin typeface="Segoe UI" panose="020B0502040204020203" pitchFamily="34" charset="0"/>
+                <a:cs typeface="Segoe UI" panose="020B0502040204020203" pitchFamily="34" charset="0"/>
+              </a:rPr>
+              <a:t>Miss Detection</a:t>
+            </a:r>
+            <a:r>
+              <a:rPr lang="it-IT" sz="2000" dirty="0">
+                <a:latin typeface="Segoe UI" panose="020B0502040204020203" pitchFamily="34" charset="0"/>
+                <a:cs typeface="Segoe UI" panose="020B0502040204020203" pitchFamily="34" charset="0"/>
+              </a:rPr>
+              <a:t>: only </a:t>
+            </a:r>
+            <a:r>
+              <a:rPr lang="it-IT" sz="2000" i="1" dirty="0">
+                <a:latin typeface="Segoe UI" panose="020B0502040204020203" pitchFamily="34" charset="0"/>
+                <a:cs typeface="Segoe UI" panose="020B0502040204020203" pitchFamily="34" charset="0"/>
+              </a:rPr>
+              <a:t>non-</a:t>
+            </a:r>
+            <a:r>
+              <a:rPr lang="it-IT" sz="2000" i="1" dirty="0" err="1">
+                <a:latin typeface="Segoe UI" panose="020B0502040204020203" pitchFamily="34" charset="0"/>
+                <a:cs typeface="Segoe UI" panose="020B0502040204020203" pitchFamily="34" charset="0"/>
+              </a:rPr>
+              <a:t>authenticate</a:t>
+            </a:r>
+            <a:r>
+              <a:rPr lang="it-IT" sz="2000" dirty="0">
+                <a:latin typeface="Segoe UI" panose="020B0502040204020203" pitchFamily="34" charset="0"/>
+                <a:cs typeface="Segoe UI" panose="020B0502040204020203" pitchFamily="34" charset="0"/>
+              </a:rPr>
+              <a:t> </a:t>
+            </a:r>
+            <a:r>
+              <a:rPr lang="it-IT" sz="2000" dirty="0" err="1">
+                <a:latin typeface="Segoe UI" panose="020B0502040204020203" pitchFamily="34" charset="0"/>
+                <a:cs typeface="Segoe UI" panose="020B0502040204020203" pitchFamily="34" charset="0"/>
+              </a:rPr>
+              <a:t>messages</a:t>
+            </a:r>
+            <a:r>
+              <a:rPr lang="it-IT" sz="2000" dirty="0">
+                <a:latin typeface="Segoe UI" panose="020B0502040204020203" pitchFamily="34" charset="0"/>
+                <a:cs typeface="Segoe UI" panose="020B0502040204020203" pitchFamily="34" charset="0"/>
+              </a:rPr>
+              <a:t> are </a:t>
+            </a:r>
+            <a:r>
+              <a:rPr lang="it-IT" sz="2000" dirty="0" err="1">
+                <a:latin typeface="Segoe UI" panose="020B0502040204020203" pitchFamily="34" charset="0"/>
+                <a:cs typeface="Segoe UI" panose="020B0502040204020203" pitchFamily="34" charset="0"/>
+              </a:rPr>
+              <a:t>sent</a:t>
+            </a:r>
+            <a:r>
+              <a:rPr lang="it-IT" sz="2000" dirty="0">
+                <a:latin typeface="Segoe UI" panose="020B0502040204020203" pitchFamily="34" charset="0"/>
+                <a:cs typeface="Segoe UI" panose="020B0502040204020203" pitchFamily="34" charset="0"/>
+              </a:rPr>
+              <a:t> and check how many of those are </a:t>
+            </a:r>
+            <a:r>
+              <a:rPr lang="it-IT" sz="2000" dirty="0" err="1">
+                <a:latin typeface="Segoe UI" panose="020B0502040204020203" pitchFamily="34" charset="0"/>
+                <a:cs typeface="Segoe UI" panose="020B0502040204020203" pitchFamily="34" charset="0"/>
+              </a:rPr>
+              <a:t>interpreted</a:t>
+            </a:r>
+            <a:r>
+              <a:rPr lang="it-IT" sz="2000" dirty="0">
+                <a:latin typeface="Segoe UI" panose="020B0502040204020203" pitchFamily="34" charset="0"/>
+                <a:cs typeface="Segoe UI" panose="020B0502040204020203" pitchFamily="34" charset="0"/>
+              </a:rPr>
+              <a:t> as </a:t>
+            </a:r>
+            <a:r>
+              <a:rPr lang="it-IT" sz="2000" i="1" dirty="0" err="1">
+                <a:latin typeface="Segoe UI" panose="020B0502040204020203" pitchFamily="34" charset="0"/>
+                <a:cs typeface="Segoe UI" panose="020B0502040204020203" pitchFamily="34" charset="0"/>
+              </a:rPr>
+              <a:t>legitimate</a:t>
+            </a:r>
+            <a:r>
+              <a:rPr lang="it-IT" sz="2000" dirty="0">
+                <a:latin typeface="Segoe UI" panose="020B0502040204020203" pitchFamily="34" charset="0"/>
+                <a:cs typeface="Segoe UI" panose="020B0502040204020203" pitchFamily="34" charset="0"/>
+              </a:rPr>
+              <a:t> (false </a:t>
+            </a:r>
+            <a:r>
+              <a:rPr lang="it-IT" sz="2000" dirty="0" err="1">
+                <a:latin typeface="Segoe UI" panose="020B0502040204020203" pitchFamily="34" charset="0"/>
+                <a:cs typeface="Segoe UI" panose="020B0502040204020203" pitchFamily="34" charset="0"/>
+              </a:rPr>
+              <a:t>positives</a:t>
+            </a:r>
+            <a:r>
+              <a:rPr lang="it-IT" sz="2000" dirty="0">
+                <a:latin typeface="Segoe UI" panose="020B0502040204020203" pitchFamily="34" charset="0"/>
+                <a:cs typeface="Segoe UI" panose="020B0502040204020203" pitchFamily="34" charset="0"/>
+              </a:rPr>
+              <a:t>)</a:t>
+            </a:r>
+          </a:p>
+          <a:p>
+            <a:pPr marL="285750" indent="-285750">
+              <a:buFontTx/>
+              <a:buChar char="-"/>
+            </a:pPr>
+            <a:endParaRPr lang="it-IT" sz="2000" dirty="0">
+              <a:latin typeface="Segoe UI" panose="020B0502040204020203" pitchFamily="34" charset="0"/>
+              <a:cs typeface="Segoe UI" panose="020B0502040204020203" pitchFamily="34" charset="0"/>
+            </a:endParaRPr>
+          </a:p>
+          <a:p>
+            <a:r>
+              <a:rPr lang="it-IT" altLang="it-IT" sz="2000" u="sng" dirty="0">
+                <a:latin typeface="Segoe UI" panose="020B0502040204020203" pitchFamily="34" charset="0"/>
+                <a:cs typeface="Segoe UI" panose="020B0502040204020203" pitchFamily="34" charset="0"/>
+              </a:rPr>
+              <a:t>Parametrized</a:t>
+            </a:r>
+            <a:r>
+              <a:rPr lang="it-IT" altLang="it-IT" sz="2000" dirty="0">
+                <a:latin typeface="Segoe UI" panose="020B0502040204020203" pitchFamily="34" charset="0"/>
+                <a:cs typeface="Segoe UI" panose="020B0502040204020203" pitchFamily="34" charset="0"/>
+              </a:rPr>
+              <a:t> simulation to test the transmissions:</a:t>
+            </a:r>
+          </a:p>
+          <a:p>
+            <a:endParaRPr lang="it-IT" altLang="it-IT" sz="2000" dirty="0">
+              <a:latin typeface="Segoe UI" panose="020B0502040204020203" pitchFamily="34" charset="0"/>
+              <a:cs typeface="Segoe UI" panose="020B0502040204020203" pitchFamily="34" charset="0"/>
+            </a:endParaRPr>
+          </a:p>
+          <a:p>
+            <a:pPr marL="457200" indent="-457200">
+              <a:buFont typeface="+mj-lt"/>
+              <a:buAutoNum type="arabicPeriod"/>
+            </a:pPr>
+            <a:r>
+              <a:rPr lang="it-IT" altLang="it-IT" sz="2000" dirty="0" err="1">
+                <a:latin typeface="Segoe UI" panose="020B0502040204020203" pitchFamily="34" charset="0"/>
+                <a:cs typeface="Segoe UI" panose="020B0502040204020203" pitchFamily="34" charset="0"/>
+              </a:rPr>
+              <a:t>Varied</a:t>
+            </a:r>
+            <a:r>
+              <a:rPr lang="it-IT" altLang="it-IT" sz="2000" dirty="0">
+                <a:latin typeface="Segoe UI" panose="020B0502040204020203" pitchFamily="34" charset="0"/>
+                <a:cs typeface="Segoe UI" panose="020B0502040204020203" pitchFamily="34" charset="0"/>
+              </a:rPr>
+              <a:t> parameters as previous </a:t>
+            </a:r>
+            <a:r>
+              <a:rPr lang="it-IT" altLang="it-IT" sz="2000" dirty="0" err="1">
+                <a:latin typeface="Segoe UI" panose="020B0502040204020203" pitchFamily="34" charset="0"/>
+                <a:cs typeface="Segoe UI" panose="020B0502040204020203" pitchFamily="34" charset="0"/>
+              </a:rPr>
+              <a:t>configurations</a:t>
+            </a:r>
+            <a:r>
+              <a:rPr lang="it-IT" altLang="it-IT" sz="2000" dirty="0">
+                <a:latin typeface="Segoe UI" panose="020B0502040204020203" pitchFamily="34" charset="0"/>
+                <a:cs typeface="Segoe UI" panose="020B0502040204020203" pitchFamily="34" charset="0"/>
+              </a:rPr>
+              <a:t> </a:t>
+            </a:r>
+            <a:r>
+              <a:rPr lang="it-IT" altLang="it-IT" sz="2000" dirty="0" err="1">
+                <a:latin typeface="Segoe UI" panose="020B0502040204020203" pitchFamily="34" charset="0"/>
+                <a:cs typeface="Segoe UI" panose="020B0502040204020203" pitchFamily="34" charset="0"/>
+              </a:rPr>
+              <a:t>showed</a:t>
+            </a:r>
+            <a:endParaRPr lang="it-IT" altLang="it-IT" sz="2000" dirty="0">
+              <a:latin typeface="Segoe UI" panose="020B0502040204020203" pitchFamily="34" charset="0"/>
+              <a:cs typeface="Segoe UI" panose="020B0502040204020203" pitchFamily="34" charset="0"/>
+            </a:endParaRPr>
+          </a:p>
+          <a:p>
+            <a:pPr marL="457200" indent="-457200">
+              <a:buFont typeface="+mj-lt"/>
+              <a:buAutoNum type="arabicPeriod"/>
+            </a:pPr>
+            <a:endParaRPr lang="it-IT" altLang="it-IT" sz="2000" dirty="0">
+              <a:latin typeface="Segoe UI" panose="020B0502040204020203" pitchFamily="34" charset="0"/>
+              <a:cs typeface="Segoe UI" panose="020B0502040204020203" pitchFamily="34" charset="0"/>
+            </a:endParaRPr>
+          </a:p>
+          <a:p>
+            <a:pPr marL="457200" indent="-457200">
+              <a:buFont typeface="+mj-lt"/>
+              <a:buAutoNum type="arabicPeriod"/>
+            </a:pPr>
+            <a:r>
+              <a:rPr lang="it-IT" altLang="it-IT" sz="2000" dirty="0">
+                <a:latin typeface="Segoe UI" panose="020B0502040204020203" pitchFamily="34" charset="0"/>
+                <a:cs typeface="Segoe UI" panose="020B0502040204020203" pitchFamily="34" charset="0"/>
+              </a:rPr>
+              <a:t>Assumed </a:t>
+            </a:r>
+            <a:r>
+              <a:rPr lang="it-IT" altLang="it-IT" sz="2000" dirty="0" err="1">
+                <a:latin typeface="Segoe UI" panose="020B0502040204020203" pitchFamily="34" charset="0"/>
+                <a:cs typeface="Segoe UI" panose="020B0502040204020203" pitchFamily="34" charset="0"/>
+              </a:rPr>
+              <a:t>realistic</a:t>
+            </a:r>
+            <a:r>
+              <a:rPr lang="it-IT" altLang="it-IT" sz="2000" dirty="0">
+                <a:latin typeface="Segoe UI" panose="020B0502040204020203" pitchFamily="34" charset="0"/>
+                <a:cs typeface="Segoe UI" panose="020B0502040204020203" pitchFamily="34" charset="0"/>
+              </a:rPr>
+              <a:t> threat model: </a:t>
+            </a:r>
+            <a:r>
+              <a:rPr lang="it-IT" altLang="it-IT" sz="2000" dirty="0" err="1">
+                <a:latin typeface="Segoe UI" panose="020B0502040204020203" pitchFamily="34" charset="0"/>
+                <a:cs typeface="Segoe UI" panose="020B0502040204020203" pitchFamily="34" charset="0"/>
+              </a:rPr>
+              <a:t>attacker</a:t>
+            </a:r>
+            <a:r>
+              <a:rPr lang="it-IT" altLang="it-IT" sz="2000" dirty="0">
+                <a:latin typeface="Segoe UI" panose="020B0502040204020203" pitchFamily="34" charset="0"/>
+                <a:cs typeface="Segoe UI" panose="020B0502040204020203" pitchFamily="34" charset="0"/>
+              </a:rPr>
+              <a:t> </a:t>
+            </a:r>
+            <a:r>
+              <a:rPr lang="it-IT" altLang="it-IT" sz="2000" dirty="0" err="1">
+                <a:latin typeface="Segoe UI" panose="020B0502040204020203" pitchFamily="34" charset="0"/>
+                <a:cs typeface="Segoe UI" panose="020B0502040204020203" pitchFamily="34" charset="0"/>
+              </a:rPr>
+              <a:t>having</a:t>
+            </a:r>
+            <a:r>
+              <a:rPr lang="it-IT" altLang="it-IT" sz="2000" dirty="0">
+                <a:latin typeface="Segoe UI" panose="020B0502040204020203" pitchFamily="34" charset="0"/>
+                <a:cs typeface="Segoe UI" panose="020B0502040204020203" pitchFamily="34" charset="0"/>
+              </a:rPr>
+              <a:t> knowledge of channel </a:t>
+            </a:r>
+            <a:r>
+              <a:rPr lang="it-IT" altLang="it-IT" sz="2000" dirty="0" err="1">
+                <a:latin typeface="Segoe UI" panose="020B0502040204020203" pitchFamily="34" charset="0"/>
+                <a:cs typeface="Segoe UI" panose="020B0502040204020203" pitchFamily="34" charset="0"/>
+              </a:rPr>
+              <a:t>parameteres</a:t>
+            </a:r>
+            <a:r>
+              <a:rPr lang="it-IT" altLang="it-IT" sz="2000" dirty="0">
+                <a:latin typeface="Segoe UI" panose="020B0502040204020203" pitchFamily="34" charset="0"/>
+                <a:cs typeface="Segoe UI" panose="020B0502040204020203" pitchFamily="34" charset="0"/>
+              </a:rPr>
+              <a:t> and structure (MITM scenario)</a:t>
+            </a:r>
+          </a:p>
+          <a:p>
+            <a:pPr marL="457200" indent="-457200">
+              <a:buFont typeface="+mj-lt"/>
+              <a:buAutoNum type="arabicPeriod"/>
+            </a:pPr>
+            <a:endParaRPr lang="it-IT" altLang="it-IT" sz="2000" dirty="0">
+              <a:latin typeface="Segoe UI" panose="020B0502040204020203" pitchFamily="34" charset="0"/>
+              <a:cs typeface="Segoe UI" panose="020B0502040204020203" pitchFamily="34" charset="0"/>
+            </a:endParaRPr>
+          </a:p>
+          <a:p>
+            <a:pPr marL="457200" indent="-457200">
+              <a:buFont typeface="+mj-lt"/>
+              <a:buAutoNum type="arabicPeriod"/>
+            </a:pPr>
+            <a:r>
+              <a:rPr lang="it-IT" altLang="it-IT" sz="2000" dirty="0" err="1">
+                <a:latin typeface="Segoe UI" panose="020B0502040204020203" pitchFamily="34" charset="0"/>
+                <a:cs typeface="Segoe UI" panose="020B0502040204020203" pitchFamily="34" charset="0"/>
+              </a:rPr>
+              <a:t>Attacker</a:t>
+            </a:r>
+            <a:r>
+              <a:rPr lang="it-IT" altLang="it-IT" sz="2000" dirty="0">
+                <a:latin typeface="Segoe UI" panose="020B0502040204020203" pitchFamily="34" charset="0"/>
+                <a:cs typeface="Segoe UI" panose="020B0502040204020203" pitchFamily="34" charset="0"/>
+              </a:rPr>
+              <a:t> </a:t>
+            </a:r>
+            <a:r>
+              <a:rPr lang="it-IT" altLang="it-IT" sz="2000" dirty="0" err="1">
+                <a:latin typeface="Segoe UI" panose="020B0502040204020203" pitchFamily="34" charset="0"/>
+                <a:cs typeface="Segoe UI" panose="020B0502040204020203" pitchFamily="34" charset="0"/>
+              </a:rPr>
+              <a:t>trying</a:t>
+            </a:r>
+            <a:r>
+              <a:rPr lang="it-IT" altLang="it-IT" sz="2000" dirty="0">
+                <a:latin typeface="Segoe UI" panose="020B0502040204020203" pitchFamily="34" charset="0"/>
+                <a:cs typeface="Segoe UI" panose="020B0502040204020203" pitchFamily="34" charset="0"/>
+              </a:rPr>
+              <a:t> to decode signal based on </a:t>
+            </a:r>
+            <a:r>
+              <a:rPr lang="it-IT" altLang="it-IT" sz="2000" dirty="0" err="1">
+                <a:latin typeface="Segoe UI" panose="020B0502040204020203" pitchFamily="34" charset="0"/>
+                <a:cs typeface="Segoe UI" panose="020B0502040204020203" pitchFamily="34" charset="0"/>
+              </a:rPr>
+              <a:t>peaks</a:t>
+            </a:r>
+            <a:r>
+              <a:rPr lang="it-IT" altLang="it-IT" sz="2000" dirty="0">
+                <a:latin typeface="Segoe UI" panose="020B0502040204020203" pitchFamily="34" charset="0"/>
+                <a:cs typeface="Segoe UI" panose="020B0502040204020203" pitchFamily="34" charset="0"/>
+              </a:rPr>
+              <a:t> </a:t>
+            </a:r>
+            <a:r>
+              <a:rPr lang="it-IT" altLang="it-IT" sz="2000" dirty="0" err="1">
+                <a:latin typeface="Segoe UI" panose="020B0502040204020203" pitchFamily="34" charset="0"/>
+                <a:cs typeface="Segoe UI" panose="020B0502040204020203" pitchFamily="34" charset="0"/>
+              </a:rPr>
+              <a:t>similarly</a:t>
+            </a:r>
+            <a:r>
+              <a:rPr lang="it-IT" altLang="it-IT" sz="2000" dirty="0">
+                <a:latin typeface="Segoe UI" panose="020B0502040204020203" pitchFamily="34" charset="0"/>
+                <a:cs typeface="Segoe UI" panose="020B0502040204020203" pitchFamily="34" charset="0"/>
+              </a:rPr>
+              <a:t> to </a:t>
+            </a:r>
+            <a:r>
+              <a:rPr lang="it-IT" altLang="it-IT" sz="2000" dirty="0" err="1">
+                <a:latin typeface="Segoe UI" panose="020B0502040204020203" pitchFamily="34" charset="0"/>
+                <a:cs typeface="Segoe UI" panose="020B0502040204020203" pitchFamily="34" charset="0"/>
+              </a:rPr>
+              <a:t>legitimate</a:t>
+            </a:r>
+            <a:r>
+              <a:rPr lang="it-IT" altLang="it-IT" sz="2000" dirty="0">
+                <a:latin typeface="Segoe UI" panose="020B0502040204020203" pitchFamily="34" charset="0"/>
+                <a:cs typeface="Segoe UI" panose="020B0502040204020203" pitchFamily="34" charset="0"/>
+              </a:rPr>
+              <a:t> receiver</a:t>
+            </a:r>
+          </a:p>
+        </p:txBody>
+      </p:sp>
+      <p:pic>
+        <p:nvPicPr>
+          <p:cNvPr id="3" name="Picture 2">
+            <a:extLst>
+              <a:ext uri="{FF2B5EF4-FFF2-40B4-BE49-F238E27FC236}">
+                <a16:creationId xmlns:a16="http://schemas.microsoft.com/office/drawing/2014/main" id="{AFDD3414-C097-F0A0-DED9-DB2572499238}"/>
+              </a:ext>
+            </a:extLst>
+          </p:cNvPr>
+          <p:cNvPicPr>
+            <a:picLocks noChangeAspect="1" noChangeArrowheads="1"/>
+          </p:cNvPicPr>
+          <p:nvPr/>
+        </p:nvPicPr>
+        <p:blipFill>
+          <a:blip r:embed="rId2">
+            <a:extLst>
+              <a:ext uri="{28A0092B-C50C-407E-A947-70E740481C1C}">
+                <a14:useLocalDpi xmlns:a14="http://schemas.microsoft.com/office/drawing/2010/main" val="0"/>
+              </a:ext>
+            </a:extLst>
+          </a:blip>
+          <a:srcRect/>
+          <a:stretch>
+            <a:fillRect/>
+          </a:stretch>
+        </p:blipFill>
+        <p:spPr bwMode="auto">
+          <a:xfrm>
+            <a:off x="6143103" y="2421321"/>
+            <a:ext cx="2841321" cy="2284116"/>
+          </a:xfrm>
+          <a:prstGeom prst="rect">
+            <a:avLst/>
+          </a:prstGeom>
+          <a:noFill/>
+          <a:extLst>
+            <a:ext uri="{909E8E84-426E-40DD-AFC4-6F175D3DCCD1}">
+              <a14:hiddenFill xmlns:a14="http://schemas.microsoft.com/office/drawing/2010/main">
+                <a:solidFill>
+                  <a:srgbClr val="FFFFFF"/>
+                </a:solidFill>
+              </a14:hiddenFill>
+            </a:ext>
+          </a:extLst>
+        </p:spPr>
+      </p:pic>
+      <p:sp>
+        <p:nvSpPr>
+          <p:cNvPr id="5" name="CasellaDiTesto 4">
+            <a:extLst>
+              <a:ext uri="{FF2B5EF4-FFF2-40B4-BE49-F238E27FC236}">
+                <a16:creationId xmlns:a16="http://schemas.microsoft.com/office/drawing/2014/main" id="{BDE49FDF-31C3-2746-C073-5EE6DED4885F}"/>
+              </a:ext>
+            </a:extLst>
+          </p:cNvPr>
+          <p:cNvSpPr txBox="1"/>
+          <p:nvPr/>
+        </p:nvSpPr>
+        <p:spPr>
+          <a:xfrm>
+            <a:off x="6349951" y="4882082"/>
+            <a:ext cx="2427623" cy="861774"/>
           </a:xfrm>
           <a:prstGeom prst="rect">
             <a:avLst/>
@@ -5254,127 +5449,124 @@
           </a:bodyPr>
           <a:lstStyle/>
           <a:p>
-            <a:r>
-              <a:rPr lang="it-IT" altLang="it-IT" sz="2000" dirty="0">
-                <a:latin typeface="Segoe UI" panose="020B0502040204020203" pitchFamily="34" charset="0"/>
-                <a:cs typeface="Segoe UI" panose="020B0502040204020203" pitchFamily="34" charset="0"/>
-              </a:rPr>
-              <a:t>This simulation </a:t>
-            </a:r>
-            <a:r>
-              <a:rPr lang="it-IT" altLang="it-IT" sz="2000" dirty="0" err="1">
-                <a:latin typeface="Segoe UI" panose="020B0502040204020203" pitchFamily="34" charset="0"/>
-                <a:cs typeface="Segoe UI" panose="020B0502040204020203" pitchFamily="34" charset="0"/>
-              </a:rPr>
-              <a:t>reported</a:t>
-            </a:r>
-            <a:r>
-              <a:rPr lang="it-IT" altLang="it-IT" sz="2000" dirty="0">
-                <a:latin typeface="Segoe UI" panose="020B0502040204020203" pitchFamily="34" charset="0"/>
-                <a:cs typeface="Segoe UI" panose="020B0502040204020203" pitchFamily="34" charset="0"/>
-              </a:rPr>
-              <a:t> the following results:</a:t>
-            </a:r>
-          </a:p>
-          <a:p>
-            <a:endParaRPr lang="it-IT" altLang="it-IT" sz="2000" dirty="0">
-              <a:latin typeface="Segoe UI" panose="020B0502040204020203" pitchFamily="34" charset="0"/>
-              <a:cs typeface="Segoe UI" panose="020B0502040204020203" pitchFamily="34" charset="0"/>
-            </a:endParaRPr>
-          </a:p>
-          <a:p>
-            <a:pPr marL="342900" indent="-342900">
-              <a:buFont typeface="Arial" panose="020B0604020202020204" pitchFamily="34" charset="0"/>
-              <a:buChar char="•"/>
-            </a:pPr>
-            <a:r>
-              <a:rPr lang="it-IT" altLang="it-IT" sz="2000" dirty="0">
-                <a:latin typeface="Segoe UI" panose="020B0502040204020203" pitchFamily="34" charset="0"/>
-                <a:cs typeface="Segoe UI" panose="020B0502040204020203" pitchFamily="34" charset="0"/>
-              </a:rPr>
-              <a:t>Observed 0% false alarm rate </a:t>
-            </a:r>
-            <a:r>
-              <a:rPr lang="it-IT" altLang="it-IT" sz="2000" dirty="0" err="1">
-                <a:latin typeface="Segoe UI" panose="020B0502040204020203" pitchFamily="34" charset="0"/>
-                <a:cs typeface="Segoe UI" panose="020B0502040204020203" pitchFamily="34" charset="0"/>
-              </a:rPr>
-              <a:t>across</a:t>
-            </a:r>
-            <a:r>
-              <a:rPr lang="it-IT" altLang="it-IT" sz="2000" dirty="0">
-                <a:latin typeface="Segoe UI" panose="020B0502040204020203" pitchFamily="34" charset="0"/>
-                <a:cs typeface="Segoe UI" panose="020B0502040204020203" pitchFamily="34" charset="0"/>
-              </a:rPr>
-              <a:t> all distance-SNR pairs</a:t>
-            </a:r>
-          </a:p>
-          <a:p>
-            <a:pPr marL="342900" indent="-342900">
-              <a:buFont typeface="Arial" panose="020B0604020202020204" pitchFamily="34" charset="0"/>
-              <a:buChar char="•"/>
-            </a:pPr>
-            <a:endParaRPr lang="it-IT" altLang="it-IT" sz="2000" dirty="0">
-              <a:latin typeface="Segoe UI" panose="020B0502040204020203" pitchFamily="34" charset="0"/>
-              <a:cs typeface="Segoe UI" panose="020B0502040204020203" pitchFamily="34" charset="0"/>
-            </a:endParaRPr>
-          </a:p>
-          <a:p>
-            <a:pPr marL="342900" indent="-342900">
-              <a:buFont typeface="Arial" panose="020B0604020202020204" pitchFamily="34" charset="0"/>
-              <a:buChar char="•"/>
-            </a:pPr>
-            <a:r>
-              <a:rPr lang="en-US" altLang="it-IT" sz="2000" dirty="0">
-                <a:latin typeface="Segoe UI" panose="020B0502040204020203" pitchFamily="34" charset="0"/>
-                <a:cs typeface="Segoe UI" panose="020B0502040204020203" pitchFamily="34" charset="0"/>
-              </a:rPr>
-              <a:t>Variable decoding algorithm effectively kept key bit errors below the set threshold</a:t>
-            </a:r>
-          </a:p>
-          <a:p>
-            <a:pPr marL="342900" indent="-342900">
-              <a:buFont typeface="Arial" panose="020B0604020202020204" pitchFamily="34" charset="0"/>
-              <a:buChar char="•"/>
-            </a:pPr>
-            <a:endParaRPr lang="en-US" altLang="it-IT" sz="2000" dirty="0">
-              <a:latin typeface="Segoe UI" panose="020B0502040204020203" pitchFamily="34" charset="0"/>
-              <a:cs typeface="Segoe UI" panose="020B0502040204020203" pitchFamily="34" charset="0"/>
-            </a:endParaRPr>
-          </a:p>
-          <a:p>
-            <a:pPr marL="342900" indent="-342900">
-              <a:buFont typeface="Arial" panose="020B0604020202020204" pitchFamily="34" charset="0"/>
-              <a:buChar char="•"/>
-            </a:pPr>
-            <a:r>
-              <a:rPr lang="en-US" altLang="it-IT" sz="2000" dirty="0">
-                <a:latin typeface="Segoe UI" panose="020B0502040204020203" pitchFamily="34" charset="0"/>
-                <a:cs typeface="Segoe UI" panose="020B0502040204020203" pitchFamily="34" charset="0"/>
-              </a:rPr>
-              <a:t>Results validated the effectiveness of the tolerance and the decoding algorithm chosen</a:t>
-            </a:r>
-            <a:endParaRPr lang="it-IT" altLang="it-IT" sz="2000" dirty="0">
-              <a:latin typeface="Segoe UI" panose="020B0502040204020203" pitchFamily="34" charset="0"/>
-              <a:cs typeface="Segoe UI" panose="020B0502040204020203" pitchFamily="34" charset="0"/>
-            </a:endParaRPr>
-          </a:p>
-          <a:p>
-            <a:pPr marL="285750" indent="-285750">
-              <a:buFontTx/>
-              <a:buChar char="-"/>
-            </a:pPr>
-            <a:endParaRPr lang="it-IT" sz="2000" dirty="0">
-              <a:latin typeface="Segoe UI" panose="020B0502040204020203" pitchFamily="34" charset="0"/>
-              <a:cs typeface="Segoe UI" panose="020B0502040204020203" pitchFamily="34" charset="0"/>
-            </a:endParaRPr>
+            <a:pPr algn="ctr"/>
+            <a:r>
+              <a:rPr lang="it-IT" sz="1000" dirty="0"/>
+              <a:t>Source:</a:t>
+            </a:r>
+          </a:p>
+          <a:p>
+            <a:pPr algn="ctr"/>
+            <a:r>
+              <a:rPr lang="it-IT" sz="1000" dirty="0">
+                <a:hlinkClick r:id="rId3"/>
+              </a:rPr>
+              <a:t>https://www.researchgate.net/figure/PDF-of-test-statistics-Miss-detection-and-false-alarm-cannot-be-reduced-simultaneously_fig1_252063675</a:t>
+            </a:r>
+            <a:r>
+              <a:rPr lang="it-IT" sz="1000" dirty="0"/>
+              <a:t> </a:t>
+            </a:r>
+          </a:p>
+        </p:txBody>
+      </p:sp>
+      <p:sp>
+        <p:nvSpPr>
+          <p:cNvPr id="9" name="Freccia in giù 8">
+            <a:extLst>
+              <a:ext uri="{FF2B5EF4-FFF2-40B4-BE49-F238E27FC236}">
+                <a16:creationId xmlns:a16="http://schemas.microsoft.com/office/drawing/2014/main" id="{A26225AF-B196-BEE8-E22F-27BEE475A4E6}"/>
+              </a:ext>
+            </a:extLst>
+          </p:cNvPr>
+          <p:cNvSpPr/>
+          <p:nvPr/>
+        </p:nvSpPr>
+        <p:spPr>
+          <a:xfrm>
+            <a:off x="6499740" y="1676751"/>
+            <a:ext cx="332509" cy="763182"/>
+          </a:xfrm>
+          <a:prstGeom prst="downArrow">
+            <a:avLst/>
+          </a:prstGeom>
+        </p:spPr>
+        <p:style>
+          <a:lnRef idx="2">
+            <a:schemeClr val="accent1">
+              <a:shade val="15000"/>
+            </a:schemeClr>
+          </a:lnRef>
+          <a:fillRef idx="1">
+            <a:schemeClr val="accent1"/>
+          </a:fillRef>
+          <a:effectRef idx="0">
+            <a:schemeClr val="accent1"/>
+          </a:effectRef>
+          <a:fontRef idx="minor">
+            <a:schemeClr val="lt1"/>
+          </a:fontRef>
+        </p:style>
+        <p:txBody>
+          <a:bodyPr rtlCol="0" anchor="ctr"/>
+          <a:lstStyle/>
+          <a:p>
+            <a:pPr algn="ctr"/>
+            <a:endParaRPr lang="it-IT"/>
+          </a:p>
+        </p:txBody>
+      </p:sp>
+      <p:sp>
+        <p:nvSpPr>
+          <p:cNvPr id="10" name="Rettangolo 9">
+            <a:extLst>
+              <a:ext uri="{FF2B5EF4-FFF2-40B4-BE49-F238E27FC236}">
+                <a16:creationId xmlns:a16="http://schemas.microsoft.com/office/drawing/2014/main" id="{B4BF9BF0-443A-65B9-9EB8-E4CBB03EDE68}"/>
+              </a:ext>
+            </a:extLst>
+          </p:cNvPr>
+          <p:cNvSpPr/>
+          <p:nvPr/>
+        </p:nvSpPr>
+        <p:spPr>
+          <a:xfrm>
+            <a:off x="6042540" y="2809360"/>
+            <a:ext cx="1413163" cy="2069849"/>
+          </a:xfrm>
+          <a:prstGeom prst="rect">
+            <a:avLst/>
+          </a:prstGeom>
+          <a:noFill/>
+        </p:spPr>
+        <p:style>
+          <a:lnRef idx="2">
+            <a:schemeClr val="accent1">
+              <a:shade val="15000"/>
+            </a:schemeClr>
+          </a:lnRef>
+          <a:fillRef idx="1">
+            <a:schemeClr val="accent1"/>
+          </a:fillRef>
+          <a:effectRef idx="0">
+            <a:schemeClr val="accent1"/>
+          </a:effectRef>
+          <a:fontRef idx="minor">
+            <a:schemeClr val="lt1"/>
+          </a:fontRef>
+        </p:style>
+        <p:txBody>
+          <a:bodyPr rtlCol="0" anchor="ctr"/>
+          <a:lstStyle/>
+          <a:p>
+            <a:pPr algn="ctr"/>
+            <a:endParaRPr lang="it-IT"/>
           </a:p>
         </p:txBody>
       </p:sp>
     </p:spTree>
     <p:extLst>
       <p:ext uri="{BB962C8B-B14F-4D97-AF65-F5344CB8AC3E}">
-        <p14:creationId xmlns:p14="http://schemas.microsoft.com/office/powerpoint/2010/main" val="335616924"/>
+        <p14:creationId xmlns:p14="http://schemas.microsoft.com/office/powerpoint/2010/main" val="1263005583"/>
       </p:ext>
     </p:extLst>
   </p:cSld>

</xml_diff>

<commit_message>
final slides - v1
</commit_message>
<xml_diff>
--- a/Third Part - Physical Layer Device Authentication/Slides/PLA Bluetooth Environment.pptx
+++ b/Third Part - Physical Layer Device Authentication/Slides/PLA Bluetooth Environment.pptx
@@ -2650,8 +2650,8 @@
         </p:nvSpPr>
         <p:spPr>
           <a:xfrm>
-            <a:off x="446809" y="1433945"/>
-            <a:ext cx="8343900" cy="6388928"/>
+            <a:off x="262647" y="1391055"/>
+            <a:ext cx="8528062" cy="6431818"/>
           </a:xfrm>
           <a:prstGeom prst="rect">
             <a:avLst/>
@@ -3196,8 +3196,8 @@
         </p:nvSpPr>
         <p:spPr>
           <a:xfrm>
-            <a:off x="446809" y="1433945"/>
-            <a:ext cx="8343900" cy="9325630"/>
+            <a:off x="233464" y="1410511"/>
+            <a:ext cx="8557245" cy="9349064"/>
           </a:xfrm>
           <a:prstGeom prst="rect">
             <a:avLst/>
@@ -3590,8 +3590,8 @@
         </p:nvSpPr>
         <p:spPr bwMode="auto">
           <a:xfrm>
-            <a:off x="210065" y="1141327"/>
-            <a:ext cx="8774361" cy="5016758"/>
+            <a:off x="210065" y="1449104"/>
+            <a:ext cx="8774361" cy="4401205"/>
           </a:xfrm>
           <a:prstGeom prst="rect">
             <a:avLst/>
@@ -3654,129 +3654,53 @@
               <a:tabLst/>
             </a:pPr>
             <a:r>
+              <a:rPr lang="it-IT" altLang="it-IT" sz="2000" b="1" dirty="0" err="1">
+                <a:latin typeface="Segoe UI" panose="020B0502040204020203" pitchFamily="34" charset="0"/>
+                <a:cs typeface="Segoe UI" panose="020B0502040204020203" pitchFamily="34" charset="0"/>
+              </a:rPr>
+              <a:t>Parametrized</a:t>
+            </a:r>
+            <a:r>
               <a:rPr lang="it-IT" altLang="it-IT" sz="2000" b="1" dirty="0">
                 <a:latin typeface="Segoe UI" panose="020B0502040204020203" pitchFamily="34" charset="0"/>
                 <a:cs typeface="Segoe UI" panose="020B0502040204020203" pitchFamily="34" charset="0"/>
               </a:rPr>
-              <a:t>Experiment</a:t>
+              <a:t> </a:t>
+            </a:r>
+            <a:r>
+              <a:rPr lang="it-IT" altLang="it-IT" sz="2000" b="1" dirty="0" err="1">
+                <a:latin typeface="Segoe UI" panose="020B0502040204020203" pitchFamily="34" charset="0"/>
+                <a:cs typeface="Segoe UI" panose="020B0502040204020203" pitchFamily="34" charset="0"/>
+              </a:rPr>
+              <a:t>simulation</a:t>
+            </a:r>
+            <a:r>
+              <a:rPr lang="it-IT" altLang="it-IT" sz="2000" b="1" dirty="0">
+                <a:latin typeface="Segoe UI" panose="020B0502040204020203" pitchFamily="34" charset="0"/>
+                <a:cs typeface="Segoe UI" panose="020B0502040204020203" pitchFamily="34" charset="0"/>
+              </a:rPr>
+              <a:t> to design an </a:t>
+            </a:r>
+            <a:r>
+              <a:rPr lang="it-IT" altLang="it-IT" sz="2000" b="1" dirty="0" err="1">
+                <a:latin typeface="Segoe UI" panose="020B0502040204020203" pitchFamily="34" charset="0"/>
+                <a:cs typeface="Segoe UI" panose="020B0502040204020203" pitchFamily="34" charset="0"/>
+              </a:rPr>
+              <a:t>effective</a:t>
+            </a:r>
+            <a:r>
+              <a:rPr lang="it-IT" altLang="it-IT" sz="2000" b="1" dirty="0">
+                <a:latin typeface="Segoe UI" panose="020B0502040204020203" pitchFamily="34" charset="0"/>
+                <a:cs typeface="Segoe UI" panose="020B0502040204020203" pitchFamily="34" charset="0"/>
+              </a:rPr>
+              <a:t> decoding</a:t>
             </a:r>
             <a:r>
               <a:rPr lang="it-IT" altLang="it-IT" sz="2000" dirty="0">
                 <a:latin typeface="Segoe UI" panose="020B0502040204020203" pitchFamily="34" charset="0"/>
                 <a:cs typeface="Segoe UI" panose="020B0502040204020203" pitchFamily="34" charset="0"/>
               </a:rPr>
-              <a:t>:</a:t>
-            </a:r>
-            <a:endParaRPr lang="it-IT" altLang="it-IT" sz="2000" b="1" dirty="0">
-              <a:latin typeface="Segoe UI" panose="020B0502040204020203" pitchFamily="34" charset="0"/>
-              <a:cs typeface="Segoe UI" panose="020B0502040204020203" pitchFamily="34" charset="0"/>
-            </a:endParaRPr>
-          </a:p>
-          <a:p>
-            <a:pPr marR="0" lvl="0" fontAlgn="base">
-              <a:lnSpc>
-                <a:spcPct val="100000"/>
-              </a:lnSpc>
-              <a:spcBef>
-                <a:spcPct val="0"/>
-              </a:spcBef>
-              <a:spcAft>
-                <a:spcPct val="0"/>
-              </a:spcAft>
-              <a:buClrTx/>
-              <a:buSzTx/>
-              <a:tabLst/>
-            </a:pPr>
-            <a:endParaRPr lang="it-IT" altLang="it-IT" sz="2000" dirty="0">
-              <a:latin typeface="Segoe UI" panose="020B0502040204020203" pitchFamily="34" charset="0"/>
-              <a:cs typeface="Segoe UI" panose="020B0502040204020203" pitchFamily="34" charset="0"/>
-            </a:endParaRPr>
-          </a:p>
-          <a:p>
-            <a:pPr marR="0" lvl="0" fontAlgn="base">
-              <a:lnSpc>
-                <a:spcPct val="100000"/>
-              </a:lnSpc>
-              <a:spcBef>
-                <a:spcPct val="0"/>
-              </a:spcBef>
-              <a:spcAft>
-                <a:spcPct val="0"/>
-              </a:spcAft>
-              <a:buClrTx/>
-              <a:buSzTx/>
-              <a:tabLst/>
-            </a:pPr>
-            <a:r>
-              <a:rPr lang="it-IT" altLang="it-IT" sz="2000" dirty="0">
-                <a:latin typeface="Segoe UI" panose="020B0502040204020203" pitchFamily="34" charset="0"/>
-                <a:cs typeface="Segoe UI" panose="020B0502040204020203" pitchFamily="34" charset="0"/>
-              </a:rPr>
-              <a:t>Study of the behavior of wireless signals in Bluetooth with </a:t>
-            </a:r>
-            <a:r>
-              <a:rPr lang="it-IT" altLang="it-IT" sz="2000" dirty="0" err="1">
-                <a:latin typeface="Segoe UI" panose="020B0502040204020203" pitchFamily="34" charset="0"/>
-                <a:cs typeface="Segoe UI" panose="020B0502040204020203" pitchFamily="34" charset="0"/>
-              </a:rPr>
-              <a:t>parametrized</a:t>
-            </a:r>
-            <a:r>
-              <a:rPr lang="it-IT" altLang="it-IT" sz="2000" dirty="0">
-                <a:latin typeface="Segoe UI" panose="020B0502040204020203" pitchFamily="34" charset="0"/>
-                <a:cs typeface="Segoe UI" panose="020B0502040204020203" pitchFamily="34" charset="0"/>
-              </a:rPr>
-              <a:t> transmissions</a:t>
-            </a:r>
-          </a:p>
-          <a:p>
-            <a:pPr marR="0" lvl="0" fontAlgn="base">
-              <a:lnSpc>
-                <a:spcPct val="100000"/>
-              </a:lnSpc>
-              <a:spcBef>
-                <a:spcPct val="0"/>
-              </a:spcBef>
-              <a:spcAft>
-                <a:spcPct val="0"/>
-              </a:spcAft>
-              <a:buClrTx/>
-              <a:buSzTx/>
-              <a:tabLst/>
-            </a:pPr>
-            <a:endParaRPr lang="it-IT" altLang="it-IT" sz="2000" dirty="0">
-              <a:latin typeface="Segoe UI" panose="020B0502040204020203" pitchFamily="34" charset="0"/>
-              <a:cs typeface="Segoe UI" panose="020B0502040204020203" pitchFamily="34" charset="0"/>
-            </a:endParaRPr>
-          </a:p>
-          <a:p>
-            <a:pPr marR="0" lvl="0" fontAlgn="base">
-              <a:lnSpc>
-                <a:spcPct val="100000"/>
-              </a:lnSpc>
-              <a:spcBef>
-                <a:spcPct val="0"/>
-              </a:spcBef>
-              <a:spcAft>
-                <a:spcPct val="0"/>
-              </a:spcAft>
-              <a:buClrTx/>
-              <a:buSzTx/>
-              <a:tabLst/>
-            </a:pPr>
-            <a:r>
-              <a:rPr lang="it-IT" altLang="it-IT" sz="2000" b="1" dirty="0">
-                <a:latin typeface="Segoe UI" panose="020B0502040204020203" pitchFamily="34" charset="0"/>
-                <a:cs typeface="Segoe UI" panose="020B0502040204020203" pitchFamily="34" charset="0"/>
-              </a:rPr>
-              <a:t>Implementation</a:t>
-            </a:r>
-            <a:r>
-              <a:rPr lang="it-IT" altLang="it-IT" sz="2000" dirty="0">
-                <a:latin typeface="Segoe UI" panose="020B0502040204020203" pitchFamily="34" charset="0"/>
-                <a:cs typeface="Segoe UI" panose="020B0502040204020203" pitchFamily="34" charset="0"/>
-              </a:rPr>
-              <a:t>:</a:t>
+              <a:t>: </a:t>
             </a:r>
             <a:endParaRPr lang="it-IT" altLang="it-IT" sz="2000" b="1" dirty="0">
               <a:latin typeface="Segoe UI" panose="020B0502040204020203" pitchFamily="34" charset="0"/>
@@ -3939,21 +3863,35 @@
                 <a:latin typeface="Segoe UI" panose="020B0502040204020203" pitchFamily="34" charset="0"/>
                 <a:cs typeface="Segoe UI" panose="020B0502040204020203" pitchFamily="34" charset="0"/>
               </a:rPr>
-              <a:t> signal </a:t>
+              <a:t> </a:t>
             </a:r>
             <a:r>
               <a:rPr lang="it-IT" altLang="it-IT" sz="2000" dirty="0" err="1">
                 <a:latin typeface="Segoe UI" panose="020B0502040204020203" pitchFamily="34" charset="0"/>
                 <a:cs typeface="Segoe UI" panose="020B0502040204020203" pitchFamily="34" charset="0"/>
               </a:rPr>
-              <a:t>decay</a:t>
+              <a:t>signal</a:t>
             </a:r>
             <a:r>
               <a:rPr lang="it-IT" altLang="it-IT" sz="2000" dirty="0">
                 <a:latin typeface="Segoe UI" panose="020B0502040204020203" pitchFamily="34" charset="0"/>
                 <a:cs typeface="Segoe UI" panose="020B0502040204020203" pitchFamily="34" charset="0"/>
               </a:rPr>
-              <a:t> </a:t>
+              <a:t> decay over </a:t>
+            </a:r>
+            <a:r>
+              <a:rPr lang="it-IT" altLang="it-IT" sz="2000" dirty="0" err="1">
+                <a:latin typeface="Segoe UI" panose="020B0502040204020203" pitchFamily="34" charset="0"/>
+                <a:cs typeface="Segoe UI" panose="020B0502040204020203" pitchFamily="34" charset="0"/>
+              </a:rPr>
+              <a:t>several</a:t>
+            </a:r>
+            <a:r>
+              <a:rPr lang="it-IT" altLang="it-IT" sz="2000" dirty="0">
+                <a:latin typeface="Segoe UI" panose="020B0502040204020203" pitchFamily="34" charset="0"/>
+                <a:cs typeface="Segoe UI" panose="020B0502040204020203" pitchFamily="34" charset="0"/>
+              </a:rPr>
+              <a:t> transmissions</a:t>
             </a:r>
           </a:p>
           <a:p>
@@ -3979,46 +3917,115 @@
             </a:endParaRPr>
           </a:p>
           <a:p>
-            <a:pPr marL="457200" marR="0" lvl="0" indent="-457200" fontAlgn="base">
-              <a:lnSpc>
-                <a:spcPct val="100000"/>
-              </a:lnSpc>
+            <a:pPr marL="457200" indent="-457200" fontAlgn="base">
               <a:spcBef>
                 <a:spcPct val="0"/>
               </a:spcBef>
               <a:spcAft>
                 <a:spcPct val="0"/>
               </a:spcAft>
-              <a:buClrTx/>
-              <a:buSzTx/>
               <a:buFont typeface="+mj-lt"/>
               <a:buAutoNum type="arabicPeriod"/>
-              <a:tabLst/>
             </a:pPr>
             <a:r>
               <a:rPr lang="it-IT" altLang="it-IT" sz="2000" dirty="0">
                 <a:latin typeface="Segoe UI" panose="020B0502040204020203" pitchFamily="34" charset="0"/>
                 <a:cs typeface="Segoe UI" panose="020B0502040204020203" pitchFamily="34" charset="0"/>
               </a:rPr>
-              <a:t>Applied white noise (AWGN) to simulate channel effect</a:t>
-            </a:r>
-          </a:p>
-          <a:p>
-            <a:pPr marL="457200" marR="0" lvl="0" indent="-457200" fontAlgn="base">
-              <a:lnSpc>
-                <a:spcPct val="100000"/>
-              </a:lnSpc>
+              <a:t>Tested decoding of </a:t>
+            </a:r>
+            <a:r>
+              <a:rPr lang="it-IT" altLang="it-IT" sz="2000" dirty="0" err="1">
+                <a:latin typeface="Segoe UI" panose="020B0502040204020203" pitchFamily="34" charset="0"/>
+                <a:cs typeface="Segoe UI" panose="020B0502040204020203" pitchFamily="34" charset="0"/>
+              </a:rPr>
+              <a:t>received</a:t>
+            </a:r>
+            <a:r>
+              <a:rPr lang="it-IT" altLang="it-IT" sz="2000" dirty="0">
+                <a:latin typeface="Segoe UI" panose="020B0502040204020203" pitchFamily="34" charset="0"/>
+                <a:cs typeface="Segoe UI" panose="020B0502040204020203" pitchFamily="34" charset="0"/>
+              </a:rPr>
+              <a:t> </a:t>
+            </a:r>
+            <a:r>
+              <a:rPr lang="it-IT" altLang="it-IT" sz="2000" dirty="0" err="1">
+                <a:latin typeface="Segoe UI" panose="020B0502040204020203" pitchFamily="34" charset="0"/>
+                <a:cs typeface="Segoe UI" panose="020B0502040204020203" pitchFamily="34" charset="0"/>
+              </a:rPr>
+              <a:t>signals</a:t>
+            </a:r>
+            <a:r>
+              <a:rPr lang="it-IT" altLang="it-IT" sz="2000" dirty="0">
+                <a:latin typeface="Segoe UI" panose="020B0502040204020203" pitchFamily="34" charset="0"/>
+                <a:cs typeface="Segoe UI" panose="020B0502040204020203" pitchFamily="34" charset="0"/>
+              </a:rPr>
+              <a:t> with a </a:t>
+            </a:r>
+            <a:r>
+              <a:rPr lang="it-IT" altLang="it-IT" sz="2000" dirty="0" err="1">
+                <a:latin typeface="Segoe UI" panose="020B0502040204020203" pitchFamily="34" charset="0"/>
+                <a:cs typeface="Segoe UI" panose="020B0502040204020203" pitchFamily="34" charset="0"/>
+              </a:rPr>
+              <a:t>simple</a:t>
+            </a:r>
+            <a:r>
+              <a:rPr lang="it-IT" altLang="it-IT" sz="2000" dirty="0">
+                <a:latin typeface="Segoe UI" panose="020B0502040204020203" pitchFamily="34" charset="0"/>
+                <a:cs typeface="Segoe UI" panose="020B0502040204020203" pitchFamily="34" charset="0"/>
+              </a:rPr>
+              <a:t> </a:t>
+            </a:r>
+            <a:r>
+              <a:rPr lang="it-IT" altLang="it-IT" sz="2000" dirty="0" err="1">
+                <a:latin typeface="Segoe UI" panose="020B0502040204020203" pitchFamily="34" charset="0"/>
+                <a:cs typeface="Segoe UI" panose="020B0502040204020203" pitchFamily="34" charset="0"/>
+              </a:rPr>
+              <a:t>fixed-threshold</a:t>
+            </a:r>
+            <a:r>
+              <a:rPr lang="it-IT" altLang="it-IT" sz="2000" dirty="0">
+                <a:latin typeface="Segoe UI" panose="020B0502040204020203" pitchFamily="34" charset="0"/>
+                <a:cs typeface="Segoe UI" panose="020B0502040204020203" pitchFamily="34" charset="0"/>
+              </a:rPr>
+              <a:t> </a:t>
+            </a:r>
+            <a:r>
+              <a:rPr lang="it-IT" altLang="it-IT" sz="2000" dirty="0" err="1">
+                <a:latin typeface="Segoe UI" panose="020B0502040204020203" pitchFamily="34" charset="0"/>
+                <a:cs typeface="Segoe UI" panose="020B0502040204020203" pitchFamily="34" charset="0"/>
+              </a:rPr>
+              <a:t>based</a:t>
+            </a:r>
+            <a:r>
+              <a:rPr lang="it-IT" altLang="it-IT" sz="2000" dirty="0">
+                <a:latin typeface="Segoe UI" panose="020B0502040204020203" pitchFamily="34" charset="0"/>
+                <a:cs typeface="Segoe UI" panose="020B0502040204020203" pitchFamily="34" charset="0"/>
+              </a:rPr>
+              <a:t> </a:t>
+            </a:r>
+            <a:r>
+              <a:rPr lang="it-IT" altLang="it-IT" sz="2000" dirty="0" err="1">
+                <a:latin typeface="Segoe UI" panose="020B0502040204020203" pitchFamily="34" charset="0"/>
+                <a:cs typeface="Segoe UI" panose="020B0502040204020203" pitchFamily="34" charset="0"/>
+              </a:rPr>
+              <a:t>method</a:t>
+            </a:r>
+            <a:endParaRPr lang="it-IT" altLang="it-IT" sz="2000" dirty="0">
+              <a:latin typeface="Segoe UI" panose="020B0502040204020203" pitchFamily="34" charset="0"/>
+              <a:cs typeface="Segoe UI" panose="020B0502040204020203" pitchFamily="34" charset="0"/>
+            </a:endParaRPr>
+          </a:p>
+          <a:p>
+            <a:pPr marL="457200" indent="-457200" fontAlgn="base">
               <a:spcBef>
                 <a:spcPct val="0"/>
               </a:spcBef>
               <a:spcAft>
                 <a:spcPct val="0"/>
               </a:spcAft>
-              <a:buClrTx/>
-              <a:buSzTx/>
               <a:buFont typeface="+mj-lt"/>
               <a:buAutoNum type="arabicPeriod"/>
-              <a:tabLst/>
             </a:pPr>
             <a:endParaRPr lang="it-IT" altLang="it-IT" sz="2000" dirty="0">
               <a:latin typeface="Segoe UI" panose="020B0502040204020203" pitchFamily="34" charset="0"/>
@@ -4026,34 +4033,91 @@
             </a:endParaRPr>
           </a:p>
           <a:p>
-            <a:pPr marL="457200" marR="0" lvl="0" indent="-457200" fontAlgn="base">
-              <a:lnSpc>
-                <a:spcPct val="100000"/>
-              </a:lnSpc>
+            <a:pPr marL="457200" indent="-457200" fontAlgn="base">
               <a:spcBef>
                 <a:spcPct val="0"/>
               </a:spcBef>
               <a:spcAft>
                 <a:spcPct val="0"/>
               </a:spcAft>
-              <a:buClrTx/>
-              <a:buSzTx/>
               <a:buFont typeface="+mj-lt"/>
               <a:buAutoNum type="arabicPeriod"/>
-              <a:tabLst/>
-            </a:pPr>
+            </a:pPr>
+            <a:r>
+              <a:rPr lang="it-IT" altLang="it-IT" sz="2000" dirty="0">
+                <a:latin typeface="Segoe UI" panose="020B0502040204020203" pitchFamily="34" charset="0"/>
+                <a:cs typeface="Segoe UI" panose="020B0502040204020203" pitchFamily="34" charset="0"/>
+              </a:rPr>
+              <a:t>Design of an </a:t>
+            </a:r>
             <a:r>
               <a:rPr lang="it-IT" altLang="it-IT" sz="2000" dirty="0" err="1">
                 <a:latin typeface="Segoe UI" panose="020B0502040204020203" pitchFamily="34" charset="0"/>
                 <a:cs typeface="Segoe UI" panose="020B0502040204020203" pitchFamily="34" charset="0"/>
               </a:rPr>
-              <a:t>Tested</a:t>
+              <a:t>effective</a:t>
             </a:r>
             <a:r>
               <a:rPr lang="it-IT" altLang="it-IT" sz="2000" dirty="0">
                 <a:latin typeface="Segoe UI" panose="020B0502040204020203" pitchFamily="34" charset="0"/>
                 <a:cs typeface="Segoe UI" panose="020B0502040204020203" pitchFamily="34" charset="0"/>
               </a:rPr>
+              <a:t> decoding </a:t>
+            </a:r>
+            <a:r>
+              <a:rPr lang="it-IT" altLang="it-IT" sz="2000" dirty="0" err="1">
+                <a:latin typeface="Segoe UI" panose="020B0502040204020203" pitchFamily="34" charset="0"/>
+                <a:cs typeface="Segoe UI" panose="020B0502040204020203" pitchFamily="34" charset="0"/>
+              </a:rPr>
+              <a:t>based</a:t>
+            </a:r>
+            <a:r>
+              <a:rPr lang="it-IT" altLang="it-IT" sz="2000" dirty="0">
+                <a:latin typeface="Segoe UI" panose="020B0502040204020203" pitchFamily="34" charset="0"/>
+                <a:cs typeface="Segoe UI" panose="020B0502040204020203" pitchFamily="34" charset="0"/>
+              </a:rPr>
+              <a:t> on </a:t>
+            </a:r>
+            <a:r>
+              <a:rPr lang="it-IT" altLang="it-IT" sz="2000" dirty="0" err="1">
+                <a:latin typeface="Segoe UI" panose="020B0502040204020203" pitchFamily="34" charset="0"/>
+                <a:cs typeface="Segoe UI" panose="020B0502040204020203" pitchFamily="34" charset="0"/>
+              </a:rPr>
+              <a:t>variable-threshold</a:t>
+            </a:r>
+            <a:r>
+              <a:rPr lang="it-IT" altLang="it-IT" sz="2000" dirty="0">
+                <a:latin typeface="Segoe UI" panose="020B0502040204020203" pitchFamily="34" charset="0"/>
+                <a:cs typeface="Segoe UI" panose="020B0502040204020203" pitchFamily="34" charset="0"/>
+              </a:rPr>
+              <a:t> by </a:t>
+            </a:r>
+            <a:r>
+              <a:rPr lang="it-IT" altLang="it-IT" sz="2000" dirty="0" err="1">
+                <a:latin typeface="Segoe UI" panose="020B0502040204020203" pitchFamily="34" charset="0"/>
+                <a:cs typeface="Segoe UI" panose="020B0502040204020203" pitchFamily="34" charset="0"/>
+              </a:rPr>
+              <a:t>observing</a:t>
+            </a:r>
+            <a:r>
+              <a:rPr lang="it-IT" altLang="it-IT" sz="2000" dirty="0">
+                <a:latin typeface="Segoe UI" panose="020B0502040204020203" pitchFamily="34" charset="0"/>
+                <a:cs typeface="Segoe UI" panose="020B0502040204020203" pitchFamily="34" charset="0"/>
+              </a:rPr>
+              <a:t> the </a:t>
+            </a:r>
+            <a:r>
+              <a:rPr lang="it-IT" altLang="it-IT" sz="2000" dirty="0" err="1">
+                <a:latin typeface="Segoe UI" panose="020B0502040204020203" pitchFamily="34" charset="0"/>
+                <a:cs typeface="Segoe UI" panose="020B0502040204020203" pitchFamily="34" charset="0"/>
+              </a:rPr>
+              <a:t>collected</a:t>
+            </a:r>
+            <a:r>
+              <a:rPr lang="it-IT" altLang="it-IT" sz="2000" dirty="0">
+                <a:latin typeface="Segoe UI" panose="020B0502040204020203" pitchFamily="34" charset="0"/>
+                <a:cs typeface="Segoe UI" panose="020B0502040204020203" pitchFamily="34" charset="0"/>
+              </a:rPr>
               <a:t> </a:t>
             </a:r>
             <a:r>
@@ -4061,15 +4125,45 @@
                 <a:latin typeface="Segoe UI" panose="020B0502040204020203" pitchFamily="34" charset="0"/>
                 <a:cs typeface="Segoe UI" panose="020B0502040204020203" pitchFamily="34" charset="0"/>
               </a:rPr>
-              <a:t>fixed</a:t>
+              <a:t>results</a:t>
             </a:r>
             <a:r>
               <a:rPr lang="it-IT" altLang="it-IT" sz="2000" dirty="0">
                 <a:latin typeface="Segoe UI" panose="020B0502040204020203" pitchFamily="34" charset="0"/>
                 <a:cs typeface="Segoe UI" panose="020B0502040204020203" pitchFamily="34" charset="0"/>
               </a:rPr>
-              <a:t>-threshold/variable-threshold decoding methods</a:t>
-            </a:r>
+              <a:t> from the </a:t>
+            </a:r>
+            <a:r>
+              <a:rPr lang="it-IT" altLang="it-IT" sz="2000" dirty="0" err="1">
+                <a:latin typeface="Segoe UI" panose="020B0502040204020203" pitchFamily="34" charset="0"/>
+                <a:cs typeface="Segoe UI" panose="020B0502040204020203" pitchFamily="34" charset="0"/>
+              </a:rPr>
+              <a:t>several</a:t>
+            </a:r>
+            <a:r>
+              <a:rPr lang="it-IT" altLang="it-IT" sz="2000" dirty="0">
+                <a:latin typeface="Segoe UI" panose="020B0502040204020203" pitchFamily="34" charset="0"/>
+                <a:cs typeface="Segoe UI" panose="020B0502040204020203" pitchFamily="34" charset="0"/>
+              </a:rPr>
+              <a:t> transmissions</a:t>
+            </a:r>
+          </a:p>
+          <a:p>
+            <a:pPr marL="457200" indent="-457200" fontAlgn="base">
+              <a:spcBef>
+                <a:spcPct val="0"/>
+              </a:spcBef>
+              <a:spcAft>
+                <a:spcPct val="0"/>
+              </a:spcAft>
+              <a:buFont typeface="+mj-lt"/>
+              <a:buAutoNum type="arabicPeriod"/>
+            </a:pPr>
+            <a:endParaRPr lang="it-IT" altLang="it-IT" sz="2000" dirty="0">
+              <a:latin typeface="Segoe UI" panose="020B0502040204020203" pitchFamily="34" charset="0"/>
+              <a:cs typeface="Segoe UI" panose="020B0502040204020203" pitchFamily="34" charset="0"/>
+            </a:endParaRPr>
           </a:p>
         </p:txBody>
       </p:sp>

</xml_diff>

<commit_message>
Small fixes for ortography
</commit_message>
<xml_diff>
--- a/Third Part - Physical Layer Device Authentication/Slides/PLA Bluetooth Environment.pptx
+++ b/Third Part - Physical Layer Device Authentication/Slides/PLA Bluetooth Environment.pptx
@@ -206,7 +206,7 @@
           <a:p>
             <a:fld id="{0E4AAC6D-2322-45B9-8ECA-34DF280B0776}" type="datetimeFigureOut">
               <a:rPr lang="en-US" smtClean="0"/>
-              <a:t>6/25/2024</a:t>
+              <a:t>6/30/2024</a:t>
             </a:fld>
             <a:endParaRPr lang="en-US"/>
           </a:p>
@@ -3274,7 +3274,7 @@
                 <a:latin typeface="Segoe UI" panose="020B0502040204020203" pitchFamily="34" charset="0"/>
                 <a:cs typeface="Segoe UI" panose="020B0502040204020203" pitchFamily="34" charset="0"/>
               </a:rPr>
-              <a:t>We considered the transmission of binary signals between a transmitter and receiver, formed by an authentication key and data message.</a:t>
+              <a:t>We considered the transmission of binary signals between a transmitter and receiver, formed by an authentication key and data message</a:t>
             </a:r>
           </a:p>
           <a:p>
@@ -3293,7 +3293,7 @@
                 <a:latin typeface="Segoe UI" panose="020B0502040204020203" pitchFamily="34" charset="0"/>
                 <a:cs typeface="Segoe UI" panose="020B0502040204020203" pitchFamily="34" charset="0"/>
               </a:rPr>
-              <a:t>We developed a decoding algorithm able to reconstruct the received signal and split it into the two packets (key and data). </a:t>
+              <a:t>We developed a decoding algorithm able to reconstruct the received signal and split it into the two packets (key and data)</a:t>
             </a:r>
           </a:p>
           <a:p>
@@ -3316,7 +3316,7 @@
                 <a:latin typeface="Segoe UI" panose="020B0502040204020203" pitchFamily="34" charset="0"/>
                 <a:cs typeface="Segoe UI" panose="020B0502040204020203" pitchFamily="34" charset="0"/>
               </a:rPr>
-              <a:t>We tested the strength of the decoding in classifying legitimate and not legitimate signals. </a:t>
+              <a:t>We tested the strength of the decoding in classifying legitimate and not legitimate signals</a:t>
             </a:r>
           </a:p>
           <a:p>
@@ -5411,21 +5411,21 @@
                 <a:latin typeface="Segoe UI" panose="020B0502040204020203" pitchFamily="34" charset="0"/>
                 <a:cs typeface="Segoe UI" panose="020B0502040204020203" pitchFamily="34" charset="0"/>
               </a:rPr>
-              <a:t> knowledge of channel </a:t>
-            </a:r>
-            <a:r>
-              <a:rPr lang="it-IT" altLang="it-IT" sz="2000" dirty="0" err="1">
-                <a:latin typeface="Segoe UI" panose="020B0502040204020203" pitchFamily="34" charset="0"/>
-                <a:cs typeface="Segoe UI" panose="020B0502040204020203" pitchFamily="34" charset="0"/>
-              </a:rPr>
-              <a:t>parameteres</a:t>
+              <a:t> knowledge of </a:t>
+            </a:r>
+            <a:r>
+              <a:rPr lang="it-IT" altLang="it-IT" sz="2000">
+                <a:latin typeface="Segoe UI" panose="020B0502040204020203" pitchFamily="34" charset="0"/>
+                <a:cs typeface="Segoe UI" panose="020B0502040204020203" pitchFamily="34" charset="0"/>
+              </a:rPr>
+              <a:t>channel parameters </a:t>
             </a:r>
             <a:r>
               <a:rPr lang="it-IT" altLang="it-IT" sz="2000" dirty="0">
                 <a:latin typeface="Segoe UI" panose="020B0502040204020203" pitchFamily="34" charset="0"/>
                 <a:cs typeface="Segoe UI" panose="020B0502040204020203" pitchFamily="34" charset="0"/>
               </a:rPr>
-              <a:t> and structure (MITM scenario)</a:t>
+              <a:t>and structure (MITM scenario)</a:t>
             </a:r>
           </a:p>
           <a:p>

</xml_diff>